<commit_message>
Updated visualizations of scenarios 1,2,3
</commit_message>
<xml_diff>
--- a/5. Results/Results.pptx
+++ b/5. Results/Results.pptx
@@ -6,7 +6,15 @@
   </p:sldMasterIdLst>
   <p:sldIdLst>
     <p:sldId id="256" r:id="rId2"/>
-    <p:sldId id="257" r:id="rId3"/>
+    <p:sldId id="262" r:id="rId3"/>
+    <p:sldId id="261" r:id="rId4"/>
+    <p:sldId id="257" r:id="rId5"/>
+    <p:sldId id="265" r:id="rId6"/>
+    <p:sldId id="259" r:id="rId7"/>
+    <p:sldId id="260" r:id="rId8"/>
+    <p:sldId id="266" r:id="rId9"/>
+    <p:sldId id="263" r:id="rId10"/>
+    <p:sldId id="264" r:id="rId11"/>
   </p:sldIdLst>
   <p:sldSz cx="12192000" cy="6858000"/>
   <p:notesSz cx="6858000" cy="9144000"/>
@@ -105,6 +113,11 @@
       </a:defRPr>
     </a:lvl9pPr>
   </p:defaultTextStyle>
+  <p:extLst>
+    <p:ext uri="{EFAFB233-063F-42B5-8137-9DF3F51BA10A}">
+      <p15:sldGuideLst xmlns:p15="http://schemas.microsoft.com/office/powerpoint/2012/main"/>
+    </p:ext>
+  </p:extLst>
 </p:presentation>
 </file>
 
@@ -3345,10 +3358,10 @@
       </p:grpSpPr>
       <p:pic>
         <p:nvPicPr>
-          <p:cNvPr id="5" name="Picture 4">
-            <a:extLst>
-              <a:ext uri="{FF2B5EF4-FFF2-40B4-BE49-F238E27FC236}">
-                <a16:creationId xmlns:a16="http://schemas.microsoft.com/office/drawing/2014/main" id="{D3A55BB1-8C8D-4C3E-1840-C75E34A446D9}"/>
+          <p:cNvPr id="7" name="Picture 6">
+            <a:extLst>
+              <a:ext uri="{FF2B5EF4-FFF2-40B4-BE49-F238E27FC236}">
+                <a16:creationId xmlns:a16="http://schemas.microsoft.com/office/drawing/2014/main" id="{665E7336-ECCD-241B-F36B-FFD471A34438}"/>
               </a:ext>
             </a:extLst>
           </p:cNvPr>
@@ -3358,15 +3371,20 @@
           <p:nvPr/>
         </p:nvPicPr>
         <p:blipFill>
-          <a:blip r:embed="rId2"/>
-          <a:stretch>
-            <a:fillRect/>
-          </a:stretch>
+          <a:blip r:embed="rId2">
+            <a:extLst>
+              <a:ext uri="{28A0092B-C50C-407E-A947-70E740481C1C}">
+                <a14:useLocalDpi xmlns:a14="http://schemas.microsoft.com/office/drawing/2010/main" val="0"/>
+              </a:ext>
+            </a:extLst>
+          </a:blip>
+          <a:srcRect/>
+          <a:stretch/>
         </p:blipFill>
         <p:spPr>
           <a:xfrm>
-            <a:off x="541188" y="0"/>
-            <a:ext cx="2997200" cy="6858000"/>
+            <a:off x="1529950" y="0"/>
+            <a:ext cx="2889796" cy="6771611"/>
           </a:xfrm>
           <a:prstGeom prst="rect">
             <a:avLst/>
@@ -3375,10 +3393,10 @@
       </p:pic>
       <p:pic>
         <p:nvPicPr>
-          <p:cNvPr id="7" name="Picture 6">
-            <a:extLst>
-              <a:ext uri="{FF2B5EF4-FFF2-40B4-BE49-F238E27FC236}">
-                <a16:creationId xmlns:a16="http://schemas.microsoft.com/office/drawing/2014/main" id="{665E7336-ECCD-241B-F36B-FFD471A34438}"/>
+          <p:cNvPr id="9" name="Picture 8">
+            <a:extLst>
+              <a:ext uri="{FF2B5EF4-FFF2-40B4-BE49-F238E27FC236}">
+                <a16:creationId xmlns:a16="http://schemas.microsoft.com/office/drawing/2014/main" id="{A9020683-ECB2-C371-54C4-0AF0068E272D}"/>
               </a:ext>
             </a:extLst>
           </p:cNvPr>
@@ -3388,15 +3406,20 @@
           <p:nvPr/>
         </p:nvPicPr>
         <p:blipFill>
-          <a:blip r:embed="rId3"/>
-          <a:stretch>
-            <a:fillRect/>
-          </a:stretch>
+          <a:blip r:embed="rId3">
+            <a:extLst>
+              <a:ext uri="{28A0092B-C50C-407E-A947-70E740481C1C}">
+                <a14:useLocalDpi xmlns:a14="http://schemas.microsoft.com/office/drawing/2010/main" val="0"/>
+              </a:ext>
+            </a:extLst>
+          </a:blip>
+          <a:srcRect/>
+          <a:stretch/>
         </p:blipFill>
         <p:spPr>
           <a:xfrm>
-            <a:off x="3538388" y="0"/>
-            <a:ext cx="2889796" cy="6858000"/>
+            <a:off x="5055885" y="0"/>
+            <a:ext cx="2548694" cy="6858000"/>
           </a:xfrm>
           <a:prstGeom prst="rect">
             <a:avLst/>
@@ -3405,10 +3428,10 @@
       </p:pic>
       <p:pic>
         <p:nvPicPr>
-          <p:cNvPr id="9" name="Picture 8">
-            <a:extLst>
-              <a:ext uri="{FF2B5EF4-FFF2-40B4-BE49-F238E27FC236}">
-                <a16:creationId xmlns:a16="http://schemas.microsoft.com/office/drawing/2014/main" id="{A9020683-ECB2-C371-54C4-0AF0068E272D}"/>
+          <p:cNvPr id="11" name="Picture 10">
+            <a:extLst>
+              <a:ext uri="{FF2B5EF4-FFF2-40B4-BE49-F238E27FC236}">
+                <a16:creationId xmlns:a16="http://schemas.microsoft.com/office/drawing/2014/main" id="{20765FAA-1CB6-8114-1A48-B4B559DE4BCD}"/>
               </a:ext>
             </a:extLst>
           </p:cNvPr>
@@ -3418,27 +3441,68 @@
           <p:nvPr/>
         </p:nvPicPr>
         <p:blipFill>
-          <a:blip r:embed="rId4"/>
-          <a:stretch>
-            <a:fillRect/>
-          </a:stretch>
+          <a:blip r:embed="rId4">
+            <a:extLst>
+              <a:ext uri="{28A0092B-C50C-407E-A947-70E740481C1C}">
+                <a14:useLocalDpi xmlns:a14="http://schemas.microsoft.com/office/drawing/2010/main" val="0"/>
+              </a:ext>
+            </a:extLst>
+          </a:blip>
+          <a:srcRect/>
+          <a:stretch/>
         </p:blipFill>
         <p:spPr>
           <a:xfrm>
-            <a:off x="6428184" y="0"/>
-            <a:ext cx="2876479" cy="6858000"/>
+            <a:off x="8366760" y="0"/>
+            <a:ext cx="3529584" cy="6824266"/>
           </a:xfrm>
           <a:prstGeom prst="rect">
             <a:avLst/>
           </a:prstGeom>
         </p:spPr>
       </p:pic>
+      <p:sp>
+        <p:nvSpPr>
+          <p:cNvPr id="12" name="TextBox 11">
+            <a:extLst>
+              <a:ext uri="{FF2B5EF4-FFF2-40B4-BE49-F238E27FC236}">
+                <a16:creationId xmlns:a16="http://schemas.microsoft.com/office/drawing/2014/main" id="{D9F742BD-0753-6B01-1B04-1AC32192CC51}"/>
+              </a:ext>
+            </a:extLst>
+          </p:cNvPr>
+          <p:cNvSpPr txBox="1"/>
+          <p:nvPr/>
+        </p:nvSpPr>
+        <p:spPr>
+          <a:xfrm rot="16200000">
+            <a:off x="-522724" y="3244334"/>
+            <a:ext cx="1758495" cy="369332"/>
+          </a:xfrm>
+          <a:prstGeom prst="rect">
+            <a:avLst/>
+          </a:prstGeom>
+          <a:noFill/>
+        </p:spPr>
+        <p:txBody>
+          <a:bodyPr wrap="none" rtlCol="0">
+            <a:spAutoFit/>
+          </a:bodyPr>
+          <a:lstStyle/>
+          <a:p>
+            <a:r>
+              <a:rPr lang="en-GB" dirty="0"/>
+              <a:t>Current Scenario</a:t>
+            </a:r>
+            <a:endParaRPr lang="en-DE" dirty="0"/>
+          </a:p>
+        </p:txBody>
+      </p:sp>
       <p:pic>
         <p:nvPicPr>
-          <p:cNvPr id="11" name="Picture 10">
-            <a:extLst>
-              <a:ext uri="{FF2B5EF4-FFF2-40B4-BE49-F238E27FC236}">
-                <a16:creationId xmlns:a16="http://schemas.microsoft.com/office/drawing/2014/main" id="{20765FAA-1CB6-8114-1A48-B4B559DE4BCD}"/>
+          <p:cNvPr id="15" name="Picture 14">
+            <a:extLst>
+              <a:ext uri="{FF2B5EF4-FFF2-40B4-BE49-F238E27FC236}">
+                <a16:creationId xmlns:a16="http://schemas.microsoft.com/office/drawing/2014/main" id="{7B19EC38-1BF3-A718-0585-A574FB2C3710}"/>
               </a:ext>
             </a:extLst>
           </p:cNvPr>
@@ -3447,64 +3511,27 @@
           </p:cNvPicPr>
           <p:nvPr/>
         </p:nvPicPr>
-        <p:blipFill>
+        <p:blipFill rotWithShape="1">
           <a:blip r:embed="rId5"/>
-          <a:stretch>
-            <a:fillRect/>
-          </a:stretch>
+          <a:srcRect t="21251"/>
+          <a:stretch/>
         </p:blipFill>
         <p:spPr>
           <a:xfrm>
-            <a:off x="9298859" y="0"/>
-            <a:ext cx="2895600" cy="6858000"/>
+            <a:off x="2974848" y="1201976"/>
+            <a:ext cx="1165895" cy="675780"/>
           </a:xfrm>
           <a:prstGeom prst="rect">
             <a:avLst/>
           </a:prstGeom>
         </p:spPr>
       </p:pic>
-      <p:sp>
-        <p:nvSpPr>
-          <p:cNvPr id="12" name="TextBox 11">
-            <a:extLst>
-              <a:ext uri="{FF2B5EF4-FFF2-40B4-BE49-F238E27FC236}">
-                <a16:creationId xmlns:a16="http://schemas.microsoft.com/office/drawing/2014/main" id="{D9F742BD-0753-6B01-1B04-1AC32192CC51}"/>
-              </a:ext>
-            </a:extLst>
-          </p:cNvPr>
-          <p:cNvSpPr txBox="1"/>
-          <p:nvPr/>
-        </p:nvSpPr>
-        <p:spPr>
-          <a:xfrm rot="16200000">
-            <a:off x="-472872" y="3244334"/>
-            <a:ext cx="1658787" cy="369332"/>
-          </a:xfrm>
-          <a:prstGeom prst="rect">
-            <a:avLst/>
-          </a:prstGeom>
-          <a:noFill/>
-        </p:spPr>
-        <p:txBody>
-          <a:bodyPr wrap="none" rtlCol="0">
-            <a:spAutoFit/>
-          </a:bodyPr>
-          <a:lstStyle/>
-          <a:p>
-            <a:r>
-              <a:rPr lang="en-GB" dirty="0"/>
-              <a:t>Sector Coupling</a:t>
-            </a:r>
-            <a:endParaRPr lang="en-DE" dirty="0"/>
-          </a:p>
-        </p:txBody>
-      </p:sp>
       <p:pic>
         <p:nvPicPr>
-          <p:cNvPr id="15" name="Picture 14">
-            <a:extLst>
-              <a:ext uri="{FF2B5EF4-FFF2-40B4-BE49-F238E27FC236}">
-                <a16:creationId xmlns:a16="http://schemas.microsoft.com/office/drawing/2014/main" id="{7B19EC38-1BF3-A718-0585-A574FB2C3710}"/>
+          <p:cNvPr id="17" name="Picture 16">
+            <a:extLst>
+              <a:ext uri="{FF2B5EF4-FFF2-40B4-BE49-F238E27FC236}">
+                <a16:creationId xmlns:a16="http://schemas.microsoft.com/office/drawing/2014/main" id="{B8B3546C-DCE6-5B2E-9F3C-00080D8CDB82}"/>
               </a:ext>
             </a:extLst>
           </p:cNvPr>
@@ -3513,46 +3540,15 @@
           </p:cNvPicPr>
           <p:nvPr/>
         </p:nvPicPr>
-        <p:blipFill>
+        <p:blipFill rotWithShape="1">
           <a:blip r:embed="rId6"/>
-          <a:stretch>
-            <a:fillRect/>
-          </a:stretch>
+          <a:srcRect b="50000"/>
+          <a:stretch/>
         </p:blipFill>
         <p:spPr>
           <a:xfrm>
-            <a:off x="4390778" y="1478708"/>
-            <a:ext cx="1165895" cy="858146"/>
-          </a:xfrm>
-          <a:prstGeom prst="rect">
-            <a:avLst/>
-          </a:prstGeom>
-        </p:spPr>
-      </p:pic>
-      <p:pic>
-        <p:nvPicPr>
-          <p:cNvPr id="17" name="Picture 16">
-            <a:extLst>
-              <a:ext uri="{FF2B5EF4-FFF2-40B4-BE49-F238E27FC236}">
-                <a16:creationId xmlns:a16="http://schemas.microsoft.com/office/drawing/2014/main" id="{B8B3546C-DCE6-5B2E-9F3C-00080D8CDB82}"/>
-              </a:ext>
-            </a:extLst>
-          </p:cNvPr>
-          <p:cNvPicPr>
-            <a:picLocks noChangeAspect="1"/>
-          </p:cNvPicPr>
-          <p:nvPr/>
-        </p:nvPicPr>
-        <p:blipFill>
-          <a:blip r:embed="rId7"/>
-          <a:stretch>
-            <a:fillRect/>
-          </a:stretch>
-        </p:blipFill>
-        <p:spPr>
-          <a:xfrm>
-            <a:off x="7970542" y="1690764"/>
-            <a:ext cx="1454842" cy="436453"/>
+            <a:off x="6790966" y="1522758"/>
+            <a:ext cx="1246610" cy="186991"/>
           </a:xfrm>
           <a:prstGeom prst="rect">
             <a:avLst/>
@@ -3572,7 +3568,7 @@
 </p:sld>
 </file>
 
-<file path=ppt/slides/slide2.xml><?xml version="1.0" encoding="utf-8"?>
+<file path=ppt/slides/slide10.xml><?xml version="1.0" encoding="utf-8"?>
 <p:sld xmlns:a="http://schemas.openxmlformats.org/drawingml/2006/main" xmlns:r="http://schemas.openxmlformats.org/officeDocument/2006/relationships" xmlns:p="http://schemas.openxmlformats.org/presentationml/2006/main">
   <p:cSld>
     <p:spTree>
@@ -3580,7 +3576,7 @@
         <p:cNvPr id="1" name="">
           <a:extLst>
             <a:ext uri="{FF2B5EF4-FFF2-40B4-BE49-F238E27FC236}">
-              <a16:creationId xmlns:a16="http://schemas.microsoft.com/office/drawing/2014/main" id="{1CA8BE0E-3765-6478-FA22-53B06EB5CFCC}"/>
+              <a16:creationId xmlns:a16="http://schemas.microsoft.com/office/drawing/2014/main" id="{54592D78-252B-F02C-B27B-67E24B4F1B93}"/>
             </a:ext>
           </a:extLst>
         </p:cNvPr>
@@ -3600,7 +3596,7 @@
           <p:cNvPr id="12" name="TextBox 11">
             <a:extLst>
               <a:ext uri="{FF2B5EF4-FFF2-40B4-BE49-F238E27FC236}">
-                <a16:creationId xmlns:a16="http://schemas.microsoft.com/office/drawing/2014/main" id="{A2532CE6-181A-F944-9110-E91F637E3F92}"/>
+                <a16:creationId xmlns:a16="http://schemas.microsoft.com/office/drawing/2014/main" id="{DF693795-8318-0A76-0DE1-54B563712F48}"/>
               </a:ext>
             </a:extLst>
           </p:cNvPr>
@@ -3609,8 +3605,8 @@
         </p:nvSpPr>
         <p:spPr>
           <a:xfrm rot="16200000">
-            <a:off x="-472872" y="3244334"/>
-            <a:ext cx="1658787" cy="369332"/>
+            <a:off x="-1523731" y="3244334"/>
+            <a:ext cx="3760517" cy="369332"/>
           </a:xfrm>
           <a:prstGeom prst="rect">
             <a:avLst/>
@@ -3625,7 +3621,7 @@
           <a:p>
             <a:r>
               <a:rPr lang="en-GB" dirty="0"/>
-              <a:t>Sector Coupling</a:t>
+              <a:t>Sector Coupling with Energy Efficiency</a:t>
             </a:r>
             <a:endParaRPr lang="en-DE" dirty="0"/>
           </a:p>
@@ -3636,7 +3632,7 @@
           <p:cNvPr id="3" name="Picture 2">
             <a:extLst>
               <a:ext uri="{FF2B5EF4-FFF2-40B4-BE49-F238E27FC236}">
-                <a16:creationId xmlns:a16="http://schemas.microsoft.com/office/drawing/2014/main" id="{CE1C223E-F676-4D78-4539-E5C9BDAAF55D}"/>
+                <a16:creationId xmlns:a16="http://schemas.microsoft.com/office/drawing/2014/main" id="{24DBF8B3-EB75-5220-A5E9-7482861EEDDA}"/>
               </a:ext>
             </a:extLst>
           </p:cNvPr>
@@ -3666,7 +3662,7 @@
           <p:cNvPr id="6" name="Picture 5">
             <a:extLst>
               <a:ext uri="{FF2B5EF4-FFF2-40B4-BE49-F238E27FC236}">
-                <a16:creationId xmlns:a16="http://schemas.microsoft.com/office/drawing/2014/main" id="{11864D1E-6ADB-4C9C-A097-2D40DFCF88EE}"/>
+                <a16:creationId xmlns:a16="http://schemas.microsoft.com/office/drawing/2014/main" id="{88CD6AD4-4B8A-2386-85E0-C355018038E3}"/>
               </a:ext>
             </a:extLst>
           </p:cNvPr>
@@ -3696,7 +3692,7 @@
           <p:cNvPr id="10" name="Picture 9">
             <a:extLst>
               <a:ext uri="{FF2B5EF4-FFF2-40B4-BE49-F238E27FC236}">
-                <a16:creationId xmlns:a16="http://schemas.microsoft.com/office/drawing/2014/main" id="{708EEF21-566B-68BB-160B-961CB11DB979}"/>
+                <a16:creationId xmlns:a16="http://schemas.microsoft.com/office/drawing/2014/main" id="{B0A7FD44-B198-B676-C106-DA4FB61463A7}"/>
               </a:ext>
             </a:extLst>
           </p:cNvPr>
@@ -3726,7 +3722,7 @@
           <p:cNvPr id="14" name="Picture 13">
             <a:extLst>
               <a:ext uri="{FF2B5EF4-FFF2-40B4-BE49-F238E27FC236}">
-                <a16:creationId xmlns:a16="http://schemas.microsoft.com/office/drawing/2014/main" id="{3610038E-49A6-9C6A-8322-599D26C3B586}"/>
+                <a16:creationId xmlns:a16="http://schemas.microsoft.com/office/drawing/2014/main" id="{1D996439-A740-FC7F-9880-DD9C7BDBD634}"/>
               </a:ext>
             </a:extLst>
           </p:cNvPr>
@@ -3754,7 +3750,7 @@
     </p:spTree>
     <p:extLst>
       <p:ext uri="{BB962C8B-B14F-4D97-AF65-F5344CB8AC3E}">
-        <p14:creationId xmlns:p14="http://schemas.microsoft.com/office/powerpoint/2010/main" val="2289082910"/>
+        <p14:creationId xmlns:p14="http://schemas.microsoft.com/office/powerpoint/2010/main" val="1393889523"/>
       </p:ext>
     </p:extLst>
   </p:cSld>
@@ -3881,6 +3877,1977 @@
       </p:par>
     </p:tnLst>
   </p:timing>
+</p:sld>
+</file>
+
+<file path=ppt/slides/slide2.xml><?xml version="1.0" encoding="utf-8"?>
+<p:sld xmlns:a="http://schemas.openxmlformats.org/drawingml/2006/main" xmlns:r="http://schemas.openxmlformats.org/officeDocument/2006/relationships" xmlns:p="http://schemas.openxmlformats.org/presentationml/2006/main">
+  <p:cSld>
+    <p:spTree>
+      <p:nvGrpSpPr>
+        <p:cNvPr id="1" name="">
+          <a:extLst>
+            <a:ext uri="{FF2B5EF4-FFF2-40B4-BE49-F238E27FC236}">
+              <a16:creationId xmlns:a16="http://schemas.microsoft.com/office/drawing/2014/main" id="{69EBA3FE-27DA-0A43-7599-5974FE718B5C}"/>
+            </a:ext>
+          </a:extLst>
+        </p:cNvPr>
+        <p:cNvGrpSpPr/>
+        <p:nvPr/>
+      </p:nvGrpSpPr>
+      <p:grpSpPr>
+        <a:xfrm>
+          <a:off x="0" y="0"/>
+          <a:ext cx="0" cy="0"/>
+          <a:chOff x="0" y="0"/>
+          <a:chExt cx="0" cy="0"/>
+        </a:xfrm>
+      </p:grpSpPr>
+      <p:sp>
+        <p:nvSpPr>
+          <p:cNvPr id="12" name="TextBox 11">
+            <a:extLst>
+              <a:ext uri="{FF2B5EF4-FFF2-40B4-BE49-F238E27FC236}">
+                <a16:creationId xmlns:a16="http://schemas.microsoft.com/office/drawing/2014/main" id="{2828788F-638D-999D-037F-7BDA98452176}"/>
+              </a:ext>
+            </a:extLst>
+          </p:cNvPr>
+          <p:cNvSpPr txBox="1"/>
+          <p:nvPr/>
+        </p:nvSpPr>
+        <p:spPr>
+          <a:xfrm rot="16200000">
+            <a:off x="-522724" y="3244334"/>
+            <a:ext cx="1758495" cy="369332"/>
+          </a:xfrm>
+          <a:prstGeom prst="rect">
+            <a:avLst/>
+          </a:prstGeom>
+          <a:noFill/>
+        </p:spPr>
+        <p:txBody>
+          <a:bodyPr wrap="none" rtlCol="0">
+            <a:spAutoFit/>
+          </a:bodyPr>
+          <a:lstStyle/>
+          <a:p>
+            <a:r>
+              <a:rPr lang="en-GB" dirty="0"/>
+              <a:t>Current Scenario</a:t>
+            </a:r>
+            <a:endParaRPr lang="en-DE" dirty="0"/>
+          </a:p>
+        </p:txBody>
+      </p:sp>
+      <p:pic>
+        <p:nvPicPr>
+          <p:cNvPr id="6" name="Picture 5">
+            <a:extLst>
+              <a:ext uri="{FF2B5EF4-FFF2-40B4-BE49-F238E27FC236}">
+                <a16:creationId xmlns:a16="http://schemas.microsoft.com/office/drawing/2014/main" id="{82FE952A-875B-3096-319D-9F497EDCB1B1}"/>
+              </a:ext>
+            </a:extLst>
+          </p:cNvPr>
+          <p:cNvPicPr>
+            <a:picLocks noChangeAspect="1"/>
+          </p:cNvPicPr>
+          <p:nvPr/>
+        </p:nvPicPr>
+        <p:blipFill>
+          <a:blip r:embed="rId2">
+            <a:extLst>
+              <a:ext uri="{28A0092B-C50C-407E-A947-70E740481C1C}">
+                <a14:useLocalDpi xmlns:a14="http://schemas.microsoft.com/office/drawing/2010/main" val="0"/>
+              </a:ext>
+            </a:extLst>
+          </a:blip>
+          <a:srcRect/>
+          <a:stretch/>
+        </p:blipFill>
+        <p:spPr>
+          <a:xfrm>
+            <a:off x="862506" y="-1"/>
+            <a:ext cx="7101917" cy="5175041"/>
+          </a:xfrm>
+          <a:prstGeom prst="rect">
+            <a:avLst/>
+          </a:prstGeom>
+        </p:spPr>
+      </p:pic>
+      <p:pic>
+        <p:nvPicPr>
+          <p:cNvPr id="10" name="Picture 9">
+            <a:extLst>
+              <a:ext uri="{FF2B5EF4-FFF2-40B4-BE49-F238E27FC236}">
+                <a16:creationId xmlns:a16="http://schemas.microsoft.com/office/drawing/2014/main" id="{DCA74904-619B-BA6C-3B60-07387DF21255}"/>
+              </a:ext>
+            </a:extLst>
+          </p:cNvPr>
+          <p:cNvPicPr>
+            <a:picLocks noChangeAspect="1"/>
+          </p:cNvPicPr>
+          <p:nvPr/>
+        </p:nvPicPr>
+        <p:blipFill>
+          <a:blip r:embed="rId3">
+            <a:extLst>
+              <a:ext uri="{28A0092B-C50C-407E-A947-70E740481C1C}">
+                <a14:useLocalDpi xmlns:a14="http://schemas.microsoft.com/office/drawing/2010/main" val="0"/>
+              </a:ext>
+            </a:extLst>
+          </a:blip>
+          <a:srcRect/>
+          <a:stretch/>
+        </p:blipFill>
+        <p:spPr>
+          <a:xfrm>
+            <a:off x="5129784" y="1869229"/>
+            <a:ext cx="6726653" cy="4885063"/>
+          </a:xfrm>
+          <a:prstGeom prst="rect">
+            <a:avLst/>
+          </a:prstGeom>
+        </p:spPr>
+      </p:pic>
+      <p:pic>
+        <p:nvPicPr>
+          <p:cNvPr id="14" name="Picture 13">
+            <a:extLst>
+              <a:ext uri="{FF2B5EF4-FFF2-40B4-BE49-F238E27FC236}">
+                <a16:creationId xmlns:a16="http://schemas.microsoft.com/office/drawing/2014/main" id="{6E278801-AEA4-78D0-072F-85307257564A}"/>
+              </a:ext>
+            </a:extLst>
+          </p:cNvPr>
+          <p:cNvPicPr>
+            <a:picLocks noChangeAspect="1"/>
+          </p:cNvPicPr>
+          <p:nvPr/>
+        </p:nvPicPr>
+        <p:blipFill>
+          <a:blip r:embed="rId4"/>
+          <a:stretch>
+            <a:fillRect/>
+          </a:stretch>
+        </p:blipFill>
+        <p:spPr>
+          <a:xfrm>
+            <a:off x="8493110" y="186004"/>
+            <a:ext cx="1267002" cy="2495898"/>
+          </a:xfrm>
+          <a:prstGeom prst="rect">
+            <a:avLst/>
+          </a:prstGeom>
+        </p:spPr>
+      </p:pic>
+    </p:spTree>
+    <p:extLst>
+      <p:ext uri="{BB962C8B-B14F-4D97-AF65-F5344CB8AC3E}">
+        <p14:creationId xmlns:p14="http://schemas.microsoft.com/office/powerpoint/2010/main" val="1532570830"/>
+      </p:ext>
+    </p:extLst>
+  </p:cSld>
+  <p:clrMapOvr>
+    <a:masterClrMapping/>
+  </p:clrMapOvr>
+  <p:timing>
+    <p:tnLst>
+      <p:par>
+        <p:cTn id="1" dur="indefinite" restart="never" nodeType="tmRoot">
+          <p:childTnLst>
+            <p:seq concurrent="1" nextAc="seek">
+              <p:cTn id="2" dur="indefinite" nodeType="mainSeq">
+                <p:childTnLst>
+                  <p:par>
+                    <p:cTn id="3" fill="hold">
+                      <p:stCondLst>
+                        <p:cond delay="indefinite"/>
+                      </p:stCondLst>
+                      <p:childTnLst>
+                        <p:par>
+                          <p:cTn id="4" fill="hold">
+                            <p:stCondLst>
+                              <p:cond delay="0"/>
+                            </p:stCondLst>
+                            <p:childTnLst>
+                              <p:par>
+                                <p:cTn id="5" presetID="1" presetClass="entr" presetSubtype="0" fill="hold" nodeType="clickEffect">
+                                  <p:stCondLst>
+                                    <p:cond delay="0"/>
+                                  </p:stCondLst>
+                                  <p:childTnLst>
+                                    <p:set>
+                                      <p:cBhvr>
+                                        <p:cTn id="6" dur="1" fill="hold">
+                                          <p:stCondLst>
+                                            <p:cond delay="0"/>
+                                          </p:stCondLst>
+                                        </p:cTn>
+                                        <p:tgtEl>
+                                          <p:spTgt spid="6"/>
+                                        </p:tgtEl>
+                                        <p:attrNameLst>
+                                          <p:attrName>style.visibility</p:attrName>
+                                        </p:attrNameLst>
+                                      </p:cBhvr>
+                                      <p:to>
+                                        <p:strVal val="visible"/>
+                                      </p:to>
+                                    </p:set>
+                                  </p:childTnLst>
+                                </p:cTn>
+                              </p:par>
+                            </p:childTnLst>
+                          </p:cTn>
+                        </p:par>
+                      </p:childTnLst>
+                    </p:cTn>
+                  </p:par>
+                  <p:par>
+                    <p:cTn id="7" fill="hold">
+                      <p:stCondLst>
+                        <p:cond delay="indefinite"/>
+                      </p:stCondLst>
+                      <p:childTnLst>
+                        <p:par>
+                          <p:cTn id="8" fill="hold">
+                            <p:stCondLst>
+                              <p:cond delay="0"/>
+                            </p:stCondLst>
+                            <p:childTnLst>
+                              <p:par>
+                                <p:cTn id="9" presetID="1" presetClass="entr" presetSubtype="0" fill="hold" nodeType="clickEffect">
+                                  <p:stCondLst>
+                                    <p:cond delay="0"/>
+                                  </p:stCondLst>
+                                  <p:childTnLst>
+                                    <p:set>
+                                      <p:cBhvr>
+                                        <p:cTn id="10" dur="1" fill="hold">
+                                          <p:stCondLst>
+                                            <p:cond delay="0"/>
+                                          </p:stCondLst>
+                                        </p:cTn>
+                                        <p:tgtEl>
+                                          <p:spTgt spid="10"/>
+                                        </p:tgtEl>
+                                        <p:attrNameLst>
+                                          <p:attrName>style.visibility</p:attrName>
+                                        </p:attrNameLst>
+                                      </p:cBhvr>
+                                      <p:to>
+                                        <p:strVal val="visible"/>
+                                      </p:to>
+                                    </p:set>
+                                  </p:childTnLst>
+                                </p:cTn>
+                              </p:par>
+                            </p:childTnLst>
+                          </p:cTn>
+                        </p:par>
+                      </p:childTnLst>
+                    </p:cTn>
+                  </p:par>
+                </p:childTnLst>
+              </p:cTn>
+              <p:prevCondLst>
+                <p:cond evt="onPrev" delay="0">
+                  <p:tgtEl>
+                    <p:sldTgt/>
+                  </p:tgtEl>
+                </p:cond>
+              </p:prevCondLst>
+              <p:nextCondLst>
+                <p:cond evt="onNext" delay="0">
+                  <p:tgtEl>
+                    <p:sldTgt/>
+                  </p:tgtEl>
+                </p:cond>
+              </p:nextCondLst>
+            </p:seq>
+          </p:childTnLst>
+        </p:cTn>
+      </p:par>
+    </p:tnLst>
+  </p:timing>
+</p:sld>
+</file>
+
+<file path=ppt/slides/slide3.xml><?xml version="1.0" encoding="utf-8"?>
+<p:sld xmlns:a="http://schemas.openxmlformats.org/drawingml/2006/main" xmlns:r="http://schemas.openxmlformats.org/officeDocument/2006/relationships" xmlns:p="http://schemas.openxmlformats.org/presentationml/2006/main">
+  <p:cSld>
+    <p:spTree>
+      <p:nvGrpSpPr>
+        <p:cNvPr id="1" name="">
+          <a:extLst>
+            <a:ext uri="{FF2B5EF4-FFF2-40B4-BE49-F238E27FC236}">
+              <a16:creationId xmlns:a16="http://schemas.microsoft.com/office/drawing/2014/main" id="{ABAAA14A-AA16-3B59-A6DA-E79149A07A70}"/>
+            </a:ext>
+          </a:extLst>
+        </p:cNvPr>
+        <p:cNvGrpSpPr/>
+        <p:nvPr/>
+      </p:nvGrpSpPr>
+      <p:grpSpPr>
+        <a:xfrm>
+          <a:off x="0" y="0"/>
+          <a:ext cx="0" cy="0"/>
+          <a:chOff x="0" y="0"/>
+          <a:chExt cx="0" cy="0"/>
+        </a:xfrm>
+      </p:grpSpPr>
+      <p:pic>
+        <p:nvPicPr>
+          <p:cNvPr id="5" name="Picture 4">
+            <a:extLst>
+              <a:ext uri="{FF2B5EF4-FFF2-40B4-BE49-F238E27FC236}">
+                <a16:creationId xmlns:a16="http://schemas.microsoft.com/office/drawing/2014/main" id="{0E83D52A-AE44-F50A-756A-91E36955F954}"/>
+              </a:ext>
+            </a:extLst>
+          </p:cNvPr>
+          <p:cNvPicPr>
+            <a:picLocks noChangeAspect="1"/>
+          </p:cNvPicPr>
+          <p:nvPr/>
+        </p:nvPicPr>
+        <p:blipFill>
+          <a:blip r:embed="rId2">
+            <a:extLst>
+              <a:ext uri="{28A0092B-C50C-407E-A947-70E740481C1C}">
+                <a14:useLocalDpi xmlns:a14="http://schemas.microsoft.com/office/drawing/2010/main" val="0"/>
+              </a:ext>
+            </a:extLst>
+          </a:blip>
+          <a:srcRect/>
+          <a:stretch/>
+        </p:blipFill>
+        <p:spPr>
+          <a:xfrm>
+            <a:off x="663981" y="0"/>
+            <a:ext cx="2751614" cy="6858000"/>
+          </a:xfrm>
+          <a:prstGeom prst="rect">
+            <a:avLst/>
+          </a:prstGeom>
+        </p:spPr>
+      </p:pic>
+      <p:pic>
+        <p:nvPicPr>
+          <p:cNvPr id="7" name="Picture 6">
+            <a:extLst>
+              <a:ext uri="{FF2B5EF4-FFF2-40B4-BE49-F238E27FC236}">
+                <a16:creationId xmlns:a16="http://schemas.microsoft.com/office/drawing/2014/main" id="{9E74C881-FDE8-7539-75C8-3D62CE219C31}"/>
+              </a:ext>
+            </a:extLst>
+          </p:cNvPr>
+          <p:cNvPicPr>
+            <a:picLocks noChangeAspect="1"/>
+          </p:cNvPicPr>
+          <p:nvPr/>
+        </p:nvPicPr>
+        <p:blipFill>
+          <a:blip r:embed="rId3">
+            <a:extLst>
+              <a:ext uri="{28A0092B-C50C-407E-A947-70E740481C1C}">
+                <a14:useLocalDpi xmlns:a14="http://schemas.microsoft.com/office/drawing/2010/main" val="0"/>
+              </a:ext>
+            </a:extLst>
+          </a:blip>
+          <a:srcRect/>
+          <a:stretch/>
+        </p:blipFill>
+        <p:spPr>
+          <a:xfrm>
+            <a:off x="3558412" y="0"/>
+            <a:ext cx="2849748" cy="6858000"/>
+          </a:xfrm>
+          <a:prstGeom prst="rect">
+            <a:avLst/>
+          </a:prstGeom>
+        </p:spPr>
+      </p:pic>
+      <p:pic>
+        <p:nvPicPr>
+          <p:cNvPr id="9" name="Picture 8">
+            <a:extLst>
+              <a:ext uri="{FF2B5EF4-FFF2-40B4-BE49-F238E27FC236}">
+                <a16:creationId xmlns:a16="http://schemas.microsoft.com/office/drawing/2014/main" id="{CA4FBDB7-E5EB-A72A-16E7-E4D22938A87F}"/>
+              </a:ext>
+            </a:extLst>
+          </p:cNvPr>
+          <p:cNvPicPr>
+            <a:picLocks noChangeAspect="1"/>
+          </p:cNvPicPr>
+          <p:nvPr/>
+        </p:nvPicPr>
+        <p:blipFill>
+          <a:blip r:embed="rId4">
+            <a:extLst>
+              <a:ext uri="{28A0092B-C50C-407E-A947-70E740481C1C}">
+                <a14:useLocalDpi xmlns:a14="http://schemas.microsoft.com/office/drawing/2010/main" val="0"/>
+              </a:ext>
+            </a:extLst>
+          </a:blip>
+          <a:srcRect/>
+          <a:stretch/>
+        </p:blipFill>
+        <p:spPr>
+          <a:xfrm>
+            <a:off x="6472076" y="0"/>
+            <a:ext cx="2788695" cy="6858000"/>
+          </a:xfrm>
+          <a:prstGeom prst="rect">
+            <a:avLst/>
+          </a:prstGeom>
+        </p:spPr>
+      </p:pic>
+      <p:pic>
+        <p:nvPicPr>
+          <p:cNvPr id="11" name="Picture 10">
+            <a:extLst>
+              <a:ext uri="{FF2B5EF4-FFF2-40B4-BE49-F238E27FC236}">
+                <a16:creationId xmlns:a16="http://schemas.microsoft.com/office/drawing/2014/main" id="{84041CD0-8541-B32D-A147-5E592C5C2128}"/>
+              </a:ext>
+            </a:extLst>
+          </p:cNvPr>
+          <p:cNvPicPr>
+            <a:picLocks noChangeAspect="1"/>
+          </p:cNvPicPr>
+          <p:nvPr/>
+        </p:nvPicPr>
+        <p:blipFill>
+          <a:blip r:embed="rId5">
+            <a:extLst>
+              <a:ext uri="{28A0092B-C50C-407E-A947-70E740481C1C}">
+                <a14:useLocalDpi xmlns:a14="http://schemas.microsoft.com/office/drawing/2010/main" val="0"/>
+              </a:ext>
+            </a:extLst>
+          </a:blip>
+          <a:srcRect/>
+          <a:stretch/>
+        </p:blipFill>
+        <p:spPr>
+          <a:xfrm>
+            <a:off x="9313329" y="0"/>
+            <a:ext cx="2866660" cy="6858000"/>
+          </a:xfrm>
+          <a:prstGeom prst="rect">
+            <a:avLst/>
+          </a:prstGeom>
+        </p:spPr>
+      </p:pic>
+      <p:sp>
+        <p:nvSpPr>
+          <p:cNvPr id="12" name="TextBox 11">
+            <a:extLst>
+              <a:ext uri="{FF2B5EF4-FFF2-40B4-BE49-F238E27FC236}">
+                <a16:creationId xmlns:a16="http://schemas.microsoft.com/office/drawing/2014/main" id="{02082C32-CFC9-0B19-0193-F627683DD14F}"/>
+              </a:ext>
+            </a:extLst>
+          </p:cNvPr>
+          <p:cNvSpPr txBox="1"/>
+          <p:nvPr/>
+        </p:nvSpPr>
+        <p:spPr>
+          <a:xfrm rot="16200000">
+            <a:off x="64326" y="3244334"/>
+            <a:ext cx="584391" cy="369332"/>
+          </a:xfrm>
+          <a:prstGeom prst="rect">
+            <a:avLst/>
+          </a:prstGeom>
+          <a:noFill/>
+        </p:spPr>
+        <p:txBody>
+          <a:bodyPr wrap="none" rtlCol="0">
+            <a:spAutoFit/>
+          </a:bodyPr>
+          <a:lstStyle/>
+          <a:p>
+            <a:r>
+              <a:rPr lang="en-GB" dirty="0"/>
+              <a:t>BAU</a:t>
+            </a:r>
+            <a:endParaRPr lang="en-DE" dirty="0"/>
+          </a:p>
+        </p:txBody>
+      </p:sp>
+      <p:pic>
+        <p:nvPicPr>
+          <p:cNvPr id="15" name="Picture 14">
+            <a:extLst>
+              <a:ext uri="{FF2B5EF4-FFF2-40B4-BE49-F238E27FC236}">
+                <a16:creationId xmlns:a16="http://schemas.microsoft.com/office/drawing/2014/main" id="{1FF13C59-3A61-3C81-FCBE-56494D7A74A7}"/>
+              </a:ext>
+            </a:extLst>
+          </p:cNvPr>
+          <p:cNvPicPr>
+            <a:picLocks noChangeAspect="1"/>
+          </p:cNvPicPr>
+          <p:nvPr/>
+        </p:nvPicPr>
+        <p:blipFill>
+          <a:blip r:embed="rId6"/>
+          <a:stretch>
+            <a:fillRect/>
+          </a:stretch>
+        </p:blipFill>
+        <p:spPr>
+          <a:xfrm>
+            <a:off x="2311306" y="832618"/>
+            <a:ext cx="1165895" cy="858146"/>
+          </a:xfrm>
+          <a:prstGeom prst="rect">
+            <a:avLst/>
+          </a:prstGeom>
+        </p:spPr>
+      </p:pic>
+      <p:pic>
+        <p:nvPicPr>
+          <p:cNvPr id="17" name="Picture 16">
+            <a:extLst>
+              <a:ext uri="{FF2B5EF4-FFF2-40B4-BE49-F238E27FC236}">
+                <a16:creationId xmlns:a16="http://schemas.microsoft.com/office/drawing/2014/main" id="{164F22D1-58E8-6F2E-F755-E18AE9217998}"/>
+              </a:ext>
+            </a:extLst>
+          </p:cNvPr>
+          <p:cNvPicPr>
+            <a:picLocks noChangeAspect="1"/>
+          </p:cNvPicPr>
+          <p:nvPr/>
+        </p:nvPicPr>
+        <p:blipFill>
+          <a:blip r:embed="rId7"/>
+          <a:stretch>
+            <a:fillRect/>
+          </a:stretch>
+        </p:blipFill>
+        <p:spPr>
+          <a:xfrm>
+            <a:off x="7970542" y="1690764"/>
+            <a:ext cx="1454842" cy="436453"/>
+          </a:xfrm>
+          <a:prstGeom prst="rect">
+            <a:avLst/>
+          </a:prstGeom>
+        </p:spPr>
+      </p:pic>
+    </p:spTree>
+    <p:extLst>
+      <p:ext uri="{BB962C8B-B14F-4D97-AF65-F5344CB8AC3E}">
+        <p14:creationId xmlns:p14="http://schemas.microsoft.com/office/powerpoint/2010/main" val="2892796767"/>
+      </p:ext>
+    </p:extLst>
+  </p:cSld>
+  <p:clrMapOvr>
+    <a:masterClrMapping/>
+  </p:clrMapOvr>
+</p:sld>
+</file>
+
+<file path=ppt/slides/slide4.xml><?xml version="1.0" encoding="utf-8"?>
+<p:sld xmlns:a="http://schemas.openxmlformats.org/drawingml/2006/main" xmlns:r="http://schemas.openxmlformats.org/officeDocument/2006/relationships" xmlns:p="http://schemas.openxmlformats.org/presentationml/2006/main">
+  <p:cSld>
+    <p:spTree>
+      <p:nvGrpSpPr>
+        <p:cNvPr id="1" name="">
+          <a:extLst>
+            <a:ext uri="{FF2B5EF4-FFF2-40B4-BE49-F238E27FC236}">
+              <a16:creationId xmlns:a16="http://schemas.microsoft.com/office/drawing/2014/main" id="{1CA8BE0E-3765-6478-FA22-53B06EB5CFCC}"/>
+            </a:ext>
+          </a:extLst>
+        </p:cNvPr>
+        <p:cNvGrpSpPr/>
+        <p:nvPr/>
+      </p:nvGrpSpPr>
+      <p:grpSpPr>
+        <a:xfrm>
+          <a:off x="0" y="0"/>
+          <a:ext cx="0" cy="0"/>
+          <a:chOff x="0" y="0"/>
+          <a:chExt cx="0" cy="0"/>
+        </a:xfrm>
+      </p:grpSpPr>
+      <p:sp>
+        <p:nvSpPr>
+          <p:cNvPr id="12" name="TextBox 11">
+            <a:extLst>
+              <a:ext uri="{FF2B5EF4-FFF2-40B4-BE49-F238E27FC236}">
+                <a16:creationId xmlns:a16="http://schemas.microsoft.com/office/drawing/2014/main" id="{A2532CE6-181A-F944-9110-E91F637E3F92}"/>
+              </a:ext>
+            </a:extLst>
+          </p:cNvPr>
+          <p:cNvSpPr txBox="1"/>
+          <p:nvPr/>
+        </p:nvSpPr>
+        <p:spPr>
+          <a:xfrm rot="16200000">
+            <a:off x="64326" y="3244334"/>
+            <a:ext cx="584391" cy="369332"/>
+          </a:xfrm>
+          <a:prstGeom prst="rect">
+            <a:avLst/>
+          </a:prstGeom>
+          <a:noFill/>
+        </p:spPr>
+        <p:txBody>
+          <a:bodyPr wrap="none" rtlCol="0">
+            <a:spAutoFit/>
+          </a:bodyPr>
+          <a:lstStyle/>
+          <a:p>
+            <a:r>
+              <a:rPr lang="en-GB" dirty="0"/>
+              <a:t>BAU</a:t>
+            </a:r>
+            <a:endParaRPr lang="en-DE" dirty="0"/>
+          </a:p>
+        </p:txBody>
+      </p:sp>
+      <p:pic>
+        <p:nvPicPr>
+          <p:cNvPr id="3" name="Picture 2">
+            <a:extLst>
+              <a:ext uri="{FF2B5EF4-FFF2-40B4-BE49-F238E27FC236}">
+                <a16:creationId xmlns:a16="http://schemas.microsoft.com/office/drawing/2014/main" id="{CE1C223E-F676-4D78-4539-E5C9BDAAF55D}"/>
+              </a:ext>
+            </a:extLst>
+          </p:cNvPr>
+          <p:cNvPicPr>
+            <a:picLocks noChangeAspect="1"/>
+          </p:cNvPicPr>
+          <p:nvPr/>
+        </p:nvPicPr>
+        <p:blipFill>
+          <a:blip r:embed="rId2">
+            <a:extLst>
+              <a:ext uri="{28A0092B-C50C-407E-A947-70E740481C1C}">
+                <a14:useLocalDpi xmlns:a14="http://schemas.microsoft.com/office/drawing/2010/main" val="0"/>
+              </a:ext>
+            </a:extLst>
+          </a:blip>
+          <a:srcRect/>
+          <a:stretch/>
+        </p:blipFill>
+        <p:spPr>
+          <a:xfrm>
+            <a:off x="2152693" y="0"/>
+            <a:ext cx="2719552" cy="6858000"/>
+          </a:xfrm>
+          <a:prstGeom prst="rect">
+            <a:avLst/>
+          </a:prstGeom>
+        </p:spPr>
+      </p:pic>
+      <p:pic>
+        <p:nvPicPr>
+          <p:cNvPr id="4" name="Picture 3">
+            <a:extLst>
+              <a:ext uri="{FF2B5EF4-FFF2-40B4-BE49-F238E27FC236}">
+                <a16:creationId xmlns:a16="http://schemas.microsoft.com/office/drawing/2014/main" id="{429B0FFA-2333-479E-C33E-3D3AD58586EC}"/>
+              </a:ext>
+            </a:extLst>
+          </p:cNvPr>
+          <p:cNvPicPr>
+            <a:picLocks noChangeAspect="1"/>
+          </p:cNvPicPr>
+          <p:nvPr/>
+        </p:nvPicPr>
+        <p:blipFill>
+          <a:blip r:embed="rId3"/>
+          <a:stretch>
+            <a:fillRect/>
+          </a:stretch>
+        </p:blipFill>
+        <p:spPr>
+          <a:xfrm>
+            <a:off x="5855676" y="0"/>
+            <a:ext cx="3559749" cy="6858000"/>
+          </a:xfrm>
+          <a:prstGeom prst="rect">
+            <a:avLst/>
+          </a:prstGeom>
+        </p:spPr>
+      </p:pic>
+      <p:pic>
+        <p:nvPicPr>
+          <p:cNvPr id="7" name="Picture 6">
+            <a:extLst>
+              <a:ext uri="{FF2B5EF4-FFF2-40B4-BE49-F238E27FC236}">
+                <a16:creationId xmlns:a16="http://schemas.microsoft.com/office/drawing/2014/main" id="{D51EC2D6-A64E-E5C0-17D6-F47BBC444DF7}"/>
+              </a:ext>
+            </a:extLst>
+          </p:cNvPr>
+          <p:cNvPicPr>
+            <a:picLocks noChangeAspect="1"/>
+          </p:cNvPicPr>
+          <p:nvPr/>
+        </p:nvPicPr>
+        <p:blipFill>
+          <a:blip r:embed="rId4"/>
+          <a:stretch>
+            <a:fillRect/>
+          </a:stretch>
+        </p:blipFill>
+        <p:spPr>
+          <a:xfrm>
+            <a:off x="9531428" y="1416525"/>
+            <a:ext cx="1190791" cy="1076475"/>
+          </a:xfrm>
+          <a:prstGeom prst="rect">
+            <a:avLst/>
+          </a:prstGeom>
+        </p:spPr>
+      </p:pic>
+    </p:spTree>
+    <p:extLst>
+      <p:ext uri="{BB962C8B-B14F-4D97-AF65-F5344CB8AC3E}">
+        <p14:creationId xmlns:p14="http://schemas.microsoft.com/office/powerpoint/2010/main" val="2289082910"/>
+      </p:ext>
+    </p:extLst>
+  </p:cSld>
+  <p:clrMapOvr>
+    <a:masterClrMapping/>
+  </p:clrMapOvr>
+</p:sld>
+</file>
+
+<file path=ppt/slides/slide5.xml><?xml version="1.0" encoding="utf-8"?>
+<p:sld xmlns:a="http://schemas.openxmlformats.org/drawingml/2006/main" xmlns:r="http://schemas.openxmlformats.org/officeDocument/2006/relationships" xmlns:p="http://schemas.openxmlformats.org/presentationml/2006/main">
+  <p:cSld>
+    <p:spTree>
+      <p:nvGrpSpPr>
+        <p:cNvPr id="1" name="">
+          <a:extLst>
+            <a:ext uri="{FF2B5EF4-FFF2-40B4-BE49-F238E27FC236}">
+              <a16:creationId xmlns:a16="http://schemas.microsoft.com/office/drawing/2014/main" id="{9EC4E6D9-0816-673F-D1A8-0EEDD74255A1}"/>
+            </a:ext>
+          </a:extLst>
+        </p:cNvPr>
+        <p:cNvGrpSpPr/>
+        <p:nvPr/>
+      </p:nvGrpSpPr>
+      <p:grpSpPr>
+        <a:xfrm>
+          <a:off x="0" y="0"/>
+          <a:ext cx="0" cy="0"/>
+          <a:chOff x="0" y="0"/>
+          <a:chExt cx="0" cy="0"/>
+        </a:xfrm>
+      </p:grpSpPr>
+      <p:sp>
+        <p:nvSpPr>
+          <p:cNvPr id="12" name="TextBox 11">
+            <a:extLst>
+              <a:ext uri="{FF2B5EF4-FFF2-40B4-BE49-F238E27FC236}">
+                <a16:creationId xmlns:a16="http://schemas.microsoft.com/office/drawing/2014/main" id="{6552B3BF-4C73-80AF-35E2-42A046BA2BC7}"/>
+              </a:ext>
+            </a:extLst>
+          </p:cNvPr>
+          <p:cNvSpPr txBox="1"/>
+          <p:nvPr/>
+        </p:nvSpPr>
+        <p:spPr>
+          <a:xfrm rot="16200000">
+            <a:off x="64326" y="3244334"/>
+            <a:ext cx="584391" cy="369332"/>
+          </a:xfrm>
+          <a:prstGeom prst="rect">
+            <a:avLst/>
+          </a:prstGeom>
+          <a:noFill/>
+        </p:spPr>
+        <p:txBody>
+          <a:bodyPr wrap="none" rtlCol="0">
+            <a:spAutoFit/>
+          </a:bodyPr>
+          <a:lstStyle/>
+          <a:p>
+            <a:r>
+              <a:rPr lang="en-GB" dirty="0"/>
+              <a:t>BAU</a:t>
+            </a:r>
+            <a:endParaRPr lang="en-DE" dirty="0"/>
+          </a:p>
+        </p:txBody>
+      </p:sp>
+      <p:pic>
+        <p:nvPicPr>
+          <p:cNvPr id="6" name="Picture 5">
+            <a:extLst>
+              <a:ext uri="{FF2B5EF4-FFF2-40B4-BE49-F238E27FC236}">
+                <a16:creationId xmlns:a16="http://schemas.microsoft.com/office/drawing/2014/main" id="{63854AC3-061E-6C06-E516-A1A91A31B225}"/>
+              </a:ext>
+            </a:extLst>
+          </p:cNvPr>
+          <p:cNvPicPr>
+            <a:picLocks noChangeAspect="1"/>
+          </p:cNvPicPr>
+          <p:nvPr/>
+        </p:nvPicPr>
+        <p:blipFill>
+          <a:blip r:embed="rId2">
+            <a:extLst>
+              <a:ext uri="{28A0092B-C50C-407E-A947-70E740481C1C}">
+                <a14:useLocalDpi xmlns:a14="http://schemas.microsoft.com/office/drawing/2010/main" val="0"/>
+              </a:ext>
+            </a:extLst>
+          </a:blip>
+          <a:srcRect/>
+          <a:stretch/>
+        </p:blipFill>
+        <p:spPr>
+          <a:xfrm>
+            <a:off x="862507" y="0"/>
+            <a:ext cx="7010396" cy="5098470"/>
+          </a:xfrm>
+          <a:prstGeom prst="rect">
+            <a:avLst/>
+          </a:prstGeom>
+        </p:spPr>
+      </p:pic>
+      <p:pic>
+        <p:nvPicPr>
+          <p:cNvPr id="10" name="Picture 9">
+            <a:extLst>
+              <a:ext uri="{FF2B5EF4-FFF2-40B4-BE49-F238E27FC236}">
+                <a16:creationId xmlns:a16="http://schemas.microsoft.com/office/drawing/2014/main" id="{93E5C378-75C1-4E1B-A091-1F804791252E}"/>
+              </a:ext>
+            </a:extLst>
+          </p:cNvPr>
+          <p:cNvPicPr>
+            <a:picLocks noChangeAspect="1"/>
+          </p:cNvPicPr>
+          <p:nvPr/>
+        </p:nvPicPr>
+        <p:blipFill>
+          <a:blip r:embed="rId3">
+            <a:extLst>
+              <a:ext uri="{28A0092B-C50C-407E-A947-70E740481C1C}">
+                <a14:useLocalDpi xmlns:a14="http://schemas.microsoft.com/office/drawing/2010/main" val="0"/>
+              </a:ext>
+            </a:extLst>
+          </a:blip>
+          <a:srcRect/>
+          <a:stretch/>
+        </p:blipFill>
+        <p:spPr>
+          <a:xfrm>
+            <a:off x="4870580" y="1785497"/>
+            <a:ext cx="7083473" cy="4968796"/>
+          </a:xfrm>
+          <a:prstGeom prst="rect">
+            <a:avLst/>
+          </a:prstGeom>
+        </p:spPr>
+      </p:pic>
+      <p:pic>
+        <p:nvPicPr>
+          <p:cNvPr id="14" name="Picture 13">
+            <a:extLst>
+              <a:ext uri="{FF2B5EF4-FFF2-40B4-BE49-F238E27FC236}">
+                <a16:creationId xmlns:a16="http://schemas.microsoft.com/office/drawing/2014/main" id="{C4B8302A-4CB7-F51A-E8C0-E23725AC919D}"/>
+              </a:ext>
+            </a:extLst>
+          </p:cNvPr>
+          <p:cNvPicPr>
+            <a:picLocks noChangeAspect="1"/>
+          </p:cNvPicPr>
+          <p:nvPr/>
+        </p:nvPicPr>
+        <p:blipFill>
+          <a:blip r:embed="rId4"/>
+          <a:stretch>
+            <a:fillRect/>
+          </a:stretch>
+        </p:blipFill>
+        <p:spPr>
+          <a:xfrm>
+            <a:off x="10062491" y="103708"/>
+            <a:ext cx="1267002" cy="2495898"/>
+          </a:xfrm>
+          <a:prstGeom prst="rect">
+            <a:avLst/>
+          </a:prstGeom>
+        </p:spPr>
+      </p:pic>
+    </p:spTree>
+    <p:extLst>
+      <p:ext uri="{BB962C8B-B14F-4D97-AF65-F5344CB8AC3E}">
+        <p14:creationId xmlns:p14="http://schemas.microsoft.com/office/powerpoint/2010/main" val="4190455970"/>
+      </p:ext>
+    </p:extLst>
+  </p:cSld>
+  <p:clrMapOvr>
+    <a:masterClrMapping/>
+  </p:clrMapOvr>
+  <p:timing>
+    <p:tnLst>
+      <p:par>
+        <p:cTn id="1" dur="indefinite" restart="never" nodeType="tmRoot">
+          <p:childTnLst>
+            <p:seq concurrent="1" nextAc="seek">
+              <p:cTn id="2" dur="indefinite" nodeType="mainSeq">
+                <p:childTnLst>
+                  <p:par>
+                    <p:cTn id="3" fill="hold">
+                      <p:stCondLst>
+                        <p:cond delay="indefinite"/>
+                      </p:stCondLst>
+                      <p:childTnLst>
+                        <p:par>
+                          <p:cTn id="4" fill="hold">
+                            <p:stCondLst>
+                              <p:cond delay="0"/>
+                            </p:stCondLst>
+                            <p:childTnLst>
+                              <p:par>
+                                <p:cTn id="5" presetID="1" presetClass="entr" presetSubtype="0" fill="hold" nodeType="clickEffect">
+                                  <p:stCondLst>
+                                    <p:cond delay="0"/>
+                                  </p:stCondLst>
+                                  <p:childTnLst>
+                                    <p:set>
+                                      <p:cBhvr>
+                                        <p:cTn id="6" dur="1" fill="hold">
+                                          <p:stCondLst>
+                                            <p:cond delay="0"/>
+                                          </p:stCondLst>
+                                        </p:cTn>
+                                        <p:tgtEl>
+                                          <p:spTgt spid="6"/>
+                                        </p:tgtEl>
+                                        <p:attrNameLst>
+                                          <p:attrName>style.visibility</p:attrName>
+                                        </p:attrNameLst>
+                                      </p:cBhvr>
+                                      <p:to>
+                                        <p:strVal val="visible"/>
+                                      </p:to>
+                                    </p:set>
+                                  </p:childTnLst>
+                                </p:cTn>
+                              </p:par>
+                            </p:childTnLst>
+                          </p:cTn>
+                        </p:par>
+                      </p:childTnLst>
+                    </p:cTn>
+                  </p:par>
+                  <p:par>
+                    <p:cTn id="7" fill="hold">
+                      <p:stCondLst>
+                        <p:cond delay="indefinite"/>
+                      </p:stCondLst>
+                      <p:childTnLst>
+                        <p:par>
+                          <p:cTn id="8" fill="hold">
+                            <p:stCondLst>
+                              <p:cond delay="0"/>
+                            </p:stCondLst>
+                            <p:childTnLst>
+                              <p:par>
+                                <p:cTn id="9" presetID="1" presetClass="entr" presetSubtype="0" fill="hold" nodeType="clickEffect">
+                                  <p:stCondLst>
+                                    <p:cond delay="0"/>
+                                  </p:stCondLst>
+                                  <p:childTnLst>
+                                    <p:set>
+                                      <p:cBhvr>
+                                        <p:cTn id="10" dur="1" fill="hold">
+                                          <p:stCondLst>
+                                            <p:cond delay="0"/>
+                                          </p:stCondLst>
+                                        </p:cTn>
+                                        <p:tgtEl>
+                                          <p:spTgt spid="10"/>
+                                        </p:tgtEl>
+                                        <p:attrNameLst>
+                                          <p:attrName>style.visibility</p:attrName>
+                                        </p:attrNameLst>
+                                      </p:cBhvr>
+                                      <p:to>
+                                        <p:strVal val="visible"/>
+                                      </p:to>
+                                    </p:set>
+                                  </p:childTnLst>
+                                </p:cTn>
+                              </p:par>
+                            </p:childTnLst>
+                          </p:cTn>
+                        </p:par>
+                      </p:childTnLst>
+                    </p:cTn>
+                  </p:par>
+                </p:childTnLst>
+              </p:cTn>
+              <p:prevCondLst>
+                <p:cond evt="onPrev" delay="0">
+                  <p:tgtEl>
+                    <p:sldTgt/>
+                  </p:tgtEl>
+                </p:cond>
+              </p:prevCondLst>
+              <p:nextCondLst>
+                <p:cond evt="onNext" delay="0">
+                  <p:tgtEl>
+                    <p:sldTgt/>
+                  </p:tgtEl>
+                </p:cond>
+              </p:nextCondLst>
+            </p:seq>
+          </p:childTnLst>
+        </p:cTn>
+      </p:par>
+    </p:tnLst>
+  </p:timing>
+</p:sld>
+</file>
+
+<file path=ppt/slides/slide6.xml><?xml version="1.0" encoding="utf-8"?>
+<p:sld xmlns:a="http://schemas.openxmlformats.org/drawingml/2006/main" xmlns:r="http://schemas.openxmlformats.org/officeDocument/2006/relationships" xmlns:p="http://schemas.openxmlformats.org/presentationml/2006/main">
+  <p:cSld>
+    <p:spTree>
+      <p:nvGrpSpPr>
+        <p:cNvPr id="1" name="">
+          <a:extLst>
+            <a:ext uri="{FF2B5EF4-FFF2-40B4-BE49-F238E27FC236}">
+              <a16:creationId xmlns:a16="http://schemas.microsoft.com/office/drawing/2014/main" id="{33F3CAC6-A6FF-07B7-3791-96A4A02DB0BA}"/>
+            </a:ext>
+          </a:extLst>
+        </p:cNvPr>
+        <p:cNvGrpSpPr/>
+        <p:nvPr/>
+      </p:nvGrpSpPr>
+      <p:grpSpPr>
+        <a:xfrm>
+          <a:off x="0" y="0"/>
+          <a:ext cx="0" cy="0"/>
+          <a:chOff x="0" y="0"/>
+          <a:chExt cx="0" cy="0"/>
+        </a:xfrm>
+      </p:grpSpPr>
+      <p:pic>
+        <p:nvPicPr>
+          <p:cNvPr id="5" name="Picture 4">
+            <a:extLst>
+              <a:ext uri="{FF2B5EF4-FFF2-40B4-BE49-F238E27FC236}">
+                <a16:creationId xmlns:a16="http://schemas.microsoft.com/office/drawing/2014/main" id="{2BE43F62-A365-B04C-AA7E-32FE078994DF}"/>
+              </a:ext>
+            </a:extLst>
+          </p:cNvPr>
+          <p:cNvPicPr>
+            <a:picLocks noChangeAspect="1"/>
+          </p:cNvPicPr>
+          <p:nvPr/>
+        </p:nvPicPr>
+        <p:blipFill>
+          <a:blip r:embed="rId2"/>
+          <a:stretch>
+            <a:fillRect/>
+          </a:stretch>
+        </p:blipFill>
+        <p:spPr>
+          <a:xfrm>
+            <a:off x="541188" y="0"/>
+            <a:ext cx="2997200" cy="6858000"/>
+          </a:xfrm>
+          <a:prstGeom prst="rect">
+            <a:avLst/>
+          </a:prstGeom>
+        </p:spPr>
+      </p:pic>
+      <p:pic>
+        <p:nvPicPr>
+          <p:cNvPr id="7" name="Picture 6">
+            <a:extLst>
+              <a:ext uri="{FF2B5EF4-FFF2-40B4-BE49-F238E27FC236}">
+                <a16:creationId xmlns:a16="http://schemas.microsoft.com/office/drawing/2014/main" id="{B0779FDC-B1E5-560F-3162-9807230DF2CB}"/>
+              </a:ext>
+            </a:extLst>
+          </p:cNvPr>
+          <p:cNvPicPr>
+            <a:picLocks noChangeAspect="1"/>
+          </p:cNvPicPr>
+          <p:nvPr/>
+        </p:nvPicPr>
+        <p:blipFill>
+          <a:blip r:embed="rId3"/>
+          <a:stretch>
+            <a:fillRect/>
+          </a:stretch>
+        </p:blipFill>
+        <p:spPr>
+          <a:xfrm>
+            <a:off x="3538388" y="0"/>
+            <a:ext cx="2889796" cy="6858000"/>
+          </a:xfrm>
+          <a:prstGeom prst="rect">
+            <a:avLst/>
+          </a:prstGeom>
+        </p:spPr>
+      </p:pic>
+      <p:pic>
+        <p:nvPicPr>
+          <p:cNvPr id="9" name="Picture 8">
+            <a:extLst>
+              <a:ext uri="{FF2B5EF4-FFF2-40B4-BE49-F238E27FC236}">
+                <a16:creationId xmlns:a16="http://schemas.microsoft.com/office/drawing/2014/main" id="{141DF485-A900-C461-6BB8-D031F206EF1E}"/>
+              </a:ext>
+            </a:extLst>
+          </p:cNvPr>
+          <p:cNvPicPr>
+            <a:picLocks noChangeAspect="1"/>
+          </p:cNvPicPr>
+          <p:nvPr/>
+        </p:nvPicPr>
+        <p:blipFill>
+          <a:blip r:embed="rId4"/>
+          <a:stretch>
+            <a:fillRect/>
+          </a:stretch>
+        </p:blipFill>
+        <p:spPr>
+          <a:xfrm>
+            <a:off x="6428184" y="0"/>
+            <a:ext cx="2876479" cy="6858000"/>
+          </a:xfrm>
+          <a:prstGeom prst="rect">
+            <a:avLst/>
+          </a:prstGeom>
+        </p:spPr>
+      </p:pic>
+      <p:pic>
+        <p:nvPicPr>
+          <p:cNvPr id="11" name="Picture 10">
+            <a:extLst>
+              <a:ext uri="{FF2B5EF4-FFF2-40B4-BE49-F238E27FC236}">
+                <a16:creationId xmlns:a16="http://schemas.microsoft.com/office/drawing/2014/main" id="{645B9FA1-B2FC-C39C-95BE-2A4262DFEBD3}"/>
+              </a:ext>
+            </a:extLst>
+          </p:cNvPr>
+          <p:cNvPicPr>
+            <a:picLocks noChangeAspect="1"/>
+          </p:cNvPicPr>
+          <p:nvPr/>
+        </p:nvPicPr>
+        <p:blipFill>
+          <a:blip r:embed="rId5"/>
+          <a:stretch>
+            <a:fillRect/>
+          </a:stretch>
+        </p:blipFill>
+        <p:spPr>
+          <a:xfrm>
+            <a:off x="9298859" y="0"/>
+            <a:ext cx="2895600" cy="6858000"/>
+          </a:xfrm>
+          <a:prstGeom prst="rect">
+            <a:avLst/>
+          </a:prstGeom>
+        </p:spPr>
+      </p:pic>
+      <p:sp>
+        <p:nvSpPr>
+          <p:cNvPr id="12" name="TextBox 11">
+            <a:extLst>
+              <a:ext uri="{FF2B5EF4-FFF2-40B4-BE49-F238E27FC236}">
+                <a16:creationId xmlns:a16="http://schemas.microsoft.com/office/drawing/2014/main" id="{DAC91C5F-22A5-6DD5-FCFE-6B64935B348D}"/>
+              </a:ext>
+            </a:extLst>
+          </p:cNvPr>
+          <p:cNvSpPr txBox="1"/>
+          <p:nvPr/>
+        </p:nvSpPr>
+        <p:spPr>
+          <a:xfrm rot="16200000">
+            <a:off x="-472872" y="3244334"/>
+            <a:ext cx="1658787" cy="369332"/>
+          </a:xfrm>
+          <a:prstGeom prst="rect">
+            <a:avLst/>
+          </a:prstGeom>
+          <a:noFill/>
+        </p:spPr>
+        <p:txBody>
+          <a:bodyPr wrap="none" rtlCol="0">
+            <a:spAutoFit/>
+          </a:bodyPr>
+          <a:lstStyle/>
+          <a:p>
+            <a:r>
+              <a:rPr lang="en-GB" dirty="0"/>
+              <a:t>Sector Coupling</a:t>
+            </a:r>
+            <a:endParaRPr lang="en-DE" dirty="0"/>
+          </a:p>
+        </p:txBody>
+      </p:sp>
+      <p:pic>
+        <p:nvPicPr>
+          <p:cNvPr id="15" name="Picture 14">
+            <a:extLst>
+              <a:ext uri="{FF2B5EF4-FFF2-40B4-BE49-F238E27FC236}">
+                <a16:creationId xmlns:a16="http://schemas.microsoft.com/office/drawing/2014/main" id="{6A5C6D69-7FE8-DC10-AF12-722A59E8C7FE}"/>
+              </a:ext>
+            </a:extLst>
+          </p:cNvPr>
+          <p:cNvPicPr>
+            <a:picLocks noChangeAspect="1"/>
+          </p:cNvPicPr>
+          <p:nvPr/>
+        </p:nvPicPr>
+        <p:blipFill>
+          <a:blip r:embed="rId6"/>
+          <a:stretch>
+            <a:fillRect/>
+          </a:stretch>
+        </p:blipFill>
+        <p:spPr>
+          <a:xfrm>
+            <a:off x="4390778" y="1478708"/>
+            <a:ext cx="1165895" cy="858146"/>
+          </a:xfrm>
+          <a:prstGeom prst="rect">
+            <a:avLst/>
+          </a:prstGeom>
+        </p:spPr>
+      </p:pic>
+      <p:pic>
+        <p:nvPicPr>
+          <p:cNvPr id="17" name="Picture 16">
+            <a:extLst>
+              <a:ext uri="{FF2B5EF4-FFF2-40B4-BE49-F238E27FC236}">
+                <a16:creationId xmlns:a16="http://schemas.microsoft.com/office/drawing/2014/main" id="{E219763D-CCBF-9AD6-4B28-E7F80C409BC2}"/>
+              </a:ext>
+            </a:extLst>
+          </p:cNvPr>
+          <p:cNvPicPr>
+            <a:picLocks noChangeAspect="1"/>
+          </p:cNvPicPr>
+          <p:nvPr/>
+        </p:nvPicPr>
+        <p:blipFill>
+          <a:blip r:embed="rId7"/>
+          <a:stretch>
+            <a:fillRect/>
+          </a:stretch>
+        </p:blipFill>
+        <p:spPr>
+          <a:xfrm>
+            <a:off x="7970542" y="1690764"/>
+            <a:ext cx="1454842" cy="436453"/>
+          </a:xfrm>
+          <a:prstGeom prst="rect">
+            <a:avLst/>
+          </a:prstGeom>
+        </p:spPr>
+      </p:pic>
+    </p:spTree>
+    <p:extLst>
+      <p:ext uri="{BB962C8B-B14F-4D97-AF65-F5344CB8AC3E}">
+        <p14:creationId xmlns:p14="http://schemas.microsoft.com/office/powerpoint/2010/main" val="1989596957"/>
+      </p:ext>
+    </p:extLst>
+  </p:cSld>
+  <p:clrMapOvr>
+    <a:masterClrMapping/>
+  </p:clrMapOvr>
+</p:sld>
+</file>
+
+<file path=ppt/slides/slide7.xml><?xml version="1.0" encoding="utf-8"?>
+<p:sld xmlns:a="http://schemas.openxmlformats.org/drawingml/2006/main" xmlns:r="http://schemas.openxmlformats.org/officeDocument/2006/relationships" xmlns:p="http://schemas.openxmlformats.org/presentationml/2006/main">
+  <p:cSld>
+    <p:spTree>
+      <p:nvGrpSpPr>
+        <p:cNvPr id="1" name="">
+          <a:extLst>
+            <a:ext uri="{FF2B5EF4-FFF2-40B4-BE49-F238E27FC236}">
+              <a16:creationId xmlns:a16="http://schemas.microsoft.com/office/drawing/2014/main" id="{0218C02D-8670-D367-B13C-FBAC359A465A}"/>
+            </a:ext>
+          </a:extLst>
+        </p:cNvPr>
+        <p:cNvGrpSpPr/>
+        <p:nvPr/>
+      </p:nvGrpSpPr>
+      <p:grpSpPr>
+        <a:xfrm>
+          <a:off x="0" y="0"/>
+          <a:ext cx="0" cy="0"/>
+          <a:chOff x="0" y="0"/>
+          <a:chExt cx="0" cy="0"/>
+        </a:xfrm>
+      </p:grpSpPr>
+      <p:sp>
+        <p:nvSpPr>
+          <p:cNvPr id="12" name="TextBox 11">
+            <a:extLst>
+              <a:ext uri="{FF2B5EF4-FFF2-40B4-BE49-F238E27FC236}">
+                <a16:creationId xmlns:a16="http://schemas.microsoft.com/office/drawing/2014/main" id="{EE75A5AB-464B-3364-4CDC-7EAE1FCA1A73}"/>
+              </a:ext>
+            </a:extLst>
+          </p:cNvPr>
+          <p:cNvSpPr txBox="1"/>
+          <p:nvPr/>
+        </p:nvSpPr>
+        <p:spPr>
+          <a:xfrm rot="16200000">
+            <a:off x="-472872" y="3244334"/>
+            <a:ext cx="1658787" cy="369332"/>
+          </a:xfrm>
+          <a:prstGeom prst="rect">
+            <a:avLst/>
+          </a:prstGeom>
+          <a:noFill/>
+        </p:spPr>
+        <p:txBody>
+          <a:bodyPr wrap="none" rtlCol="0">
+            <a:spAutoFit/>
+          </a:bodyPr>
+          <a:lstStyle/>
+          <a:p>
+            <a:r>
+              <a:rPr lang="en-GB" dirty="0"/>
+              <a:t>Sector Coupling</a:t>
+            </a:r>
+            <a:endParaRPr lang="en-DE" dirty="0"/>
+          </a:p>
+        </p:txBody>
+      </p:sp>
+      <p:pic>
+        <p:nvPicPr>
+          <p:cNvPr id="3" name="Picture 2">
+            <a:extLst>
+              <a:ext uri="{FF2B5EF4-FFF2-40B4-BE49-F238E27FC236}">
+                <a16:creationId xmlns:a16="http://schemas.microsoft.com/office/drawing/2014/main" id="{4F282022-3FF7-078C-9A51-97B66F77022A}"/>
+              </a:ext>
+            </a:extLst>
+          </p:cNvPr>
+          <p:cNvPicPr>
+            <a:picLocks noChangeAspect="1"/>
+          </p:cNvPicPr>
+          <p:nvPr/>
+        </p:nvPicPr>
+        <p:blipFill>
+          <a:blip r:embed="rId2"/>
+          <a:stretch>
+            <a:fillRect/>
+          </a:stretch>
+        </p:blipFill>
+        <p:spPr>
+          <a:xfrm>
+            <a:off x="2668567" y="0"/>
+            <a:ext cx="2844800" cy="6858000"/>
+          </a:xfrm>
+          <a:prstGeom prst="rect">
+            <a:avLst/>
+          </a:prstGeom>
+        </p:spPr>
+      </p:pic>
+      <p:pic>
+        <p:nvPicPr>
+          <p:cNvPr id="4" name="Picture 3">
+            <a:extLst>
+              <a:ext uri="{FF2B5EF4-FFF2-40B4-BE49-F238E27FC236}">
+                <a16:creationId xmlns:a16="http://schemas.microsoft.com/office/drawing/2014/main" id="{60B0AD99-3004-E785-3BDC-E196A2C8506B}"/>
+              </a:ext>
+            </a:extLst>
+          </p:cNvPr>
+          <p:cNvPicPr>
+            <a:picLocks noChangeAspect="1"/>
+          </p:cNvPicPr>
+          <p:nvPr/>
+        </p:nvPicPr>
+        <p:blipFill>
+          <a:blip r:embed="rId3"/>
+          <a:stretch>
+            <a:fillRect/>
+          </a:stretch>
+        </p:blipFill>
+        <p:spPr>
+          <a:xfrm>
+            <a:off x="6764348" y="0"/>
+            <a:ext cx="3589867" cy="6858000"/>
+          </a:xfrm>
+          <a:prstGeom prst="rect">
+            <a:avLst/>
+          </a:prstGeom>
+        </p:spPr>
+      </p:pic>
+      <p:pic>
+        <p:nvPicPr>
+          <p:cNvPr id="7" name="Picture 6">
+            <a:extLst>
+              <a:ext uri="{FF2B5EF4-FFF2-40B4-BE49-F238E27FC236}">
+                <a16:creationId xmlns:a16="http://schemas.microsoft.com/office/drawing/2014/main" id="{7409D990-F4B6-9086-99E3-C24DA5C69B52}"/>
+              </a:ext>
+            </a:extLst>
+          </p:cNvPr>
+          <p:cNvPicPr>
+            <a:picLocks noChangeAspect="1"/>
+          </p:cNvPicPr>
+          <p:nvPr/>
+        </p:nvPicPr>
+        <p:blipFill>
+          <a:blip r:embed="rId4"/>
+          <a:stretch>
+            <a:fillRect/>
+          </a:stretch>
+        </p:blipFill>
+        <p:spPr>
+          <a:xfrm>
+            <a:off x="10814682" y="105477"/>
+            <a:ext cx="1162212" cy="1086002"/>
+          </a:xfrm>
+          <a:prstGeom prst="rect">
+            <a:avLst/>
+          </a:prstGeom>
+        </p:spPr>
+      </p:pic>
+    </p:spTree>
+    <p:extLst>
+      <p:ext uri="{BB962C8B-B14F-4D97-AF65-F5344CB8AC3E}">
+        <p14:creationId xmlns:p14="http://schemas.microsoft.com/office/powerpoint/2010/main" val="2857281636"/>
+      </p:ext>
+    </p:extLst>
+  </p:cSld>
+  <p:clrMapOvr>
+    <a:masterClrMapping/>
+  </p:clrMapOvr>
+</p:sld>
+</file>
+
+<file path=ppt/slides/slide8.xml><?xml version="1.0" encoding="utf-8"?>
+<p:sld xmlns:a="http://schemas.openxmlformats.org/drawingml/2006/main" xmlns:r="http://schemas.openxmlformats.org/officeDocument/2006/relationships" xmlns:p="http://schemas.openxmlformats.org/presentationml/2006/main">
+  <p:cSld>
+    <p:spTree>
+      <p:nvGrpSpPr>
+        <p:cNvPr id="1" name="">
+          <a:extLst>
+            <a:ext uri="{FF2B5EF4-FFF2-40B4-BE49-F238E27FC236}">
+              <a16:creationId xmlns:a16="http://schemas.microsoft.com/office/drawing/2014/main" id="{80852AD5-F4FB-9F8D-E5AC-DBF454CB7C88}"/>
+            </a:ext>
+          </a:extLst>
+        </p:cNvPr>
+        <p:cNvGrpSpPr/>
+        <p:nvPr/>
+      </p:nvGrpSpPr>
+      <p:grpSpPr>
+        <a:xfrm>
+          <a:off x="0" y="0"/>
+          <a:ext cx="0" cy="0"/>
+          <a:chOff x="0" y="0"/>
+          <a:chExt cx="0" cy="0"/>
+        </a:xfrm>
+      </p:grpSpPr>
+      <p:sp>
+        <p:nvSpPr>
+          <p:cNvPr id="12" name="TextBox 11">
+            <a:extLst>
+              <a:ext uri="{FF2B5EF4-FFF2-40B4-BE49-F238E27FC236}">
+                <a16:creationId xmlns:a16="http://schemas.microsoft.com/office/drawing/2014/main" id="{C9520CBB-7A58-52FE-F6BA-A2123071B1E1}"/>
+              </a:ext>
+            </a:extLst>
+          </p:cNvPr>
+          <p:cNvSpPr txBox="1"/>
+          <p:nvPr/>
+        </p:nvSpPr>
+        <p:spPr>
+          <a:xfrm rot="16200000">
+            <a:off x="-472872" y="3244334"/>
+            <a:ext cx="1658787" cy="369332"/>
+          </a:xfrm>
+          <a:prstGeom prst="rect">
+            <a:avLst/>
+          </a:prstGeom>
+          <a:noFill/>
+        </p:spPr>
+        <p:txBody>
+          <a:bodyPr wrap="none" rtlCol="0">
+            <a:spAutoFit/>
+          </a:bodyPr>
+          <a:lstStyle/>
+          <a:p>
+            <a:r>
+              <a:rPr lang="en-GB" dirty="0"/>
+              <a:t>Sector Coupling</a:t>
+            </a:r>
+            <a:endParaRPr lang="en-DE" dirty="0"/>
+          </a:p>
+        </p:txBody>
+      </p:sp>
+      <p:pic>
+        <p:nvPicPr>
+          <p:cNvPr id="6" name="Picture 5">
+            <a:extLst>
+              <a:ext uri="{FF2B5EF4-FFF2-40B4-BE49-F238E27FC236}">
+                <a16:creationId xmlns:a16="http://schemas.microsoft.com/office/drawing/2014/main" id="{ABE19949-D12B-77DB-3E8C-F97EFF2F7595}"/>
+              </a:ext>
+            </a:extLst>
+          </p:cNvPr>
+          <p:cNvPicPr>
+            <a:picLocks noChangeAspect="1"/>
+          </p:cNvPicPr>
+          <p:nvPr/>
+        </p:nvPicPr>
+        <p:blipFill>
+          <a:blip r:embed="rId2"/>
+          <a:stretch>
+            <a:fillRect/>
+          </a:stretch>
+        </p:blipFill>
+        <p:spPr>
+          <a:xfrm>
+            <a:off x="862507" y="0"/>
+            <a:ext cx="7497653" cy="5413364"/>
+          </a:xfrm>
+          <a:prstGeom prst="rect">
+            <a:avLst/>
+          </a:prstGeom>
+        </p:spPr>
+      </p:pic>
+      <p:pic>
+        <p:nvPicPr>
+          <p:cNvPr id="10" name="Picture 9">
+            <a:extLst>
+              <a:ext uri="{FF2B5EF4-FFF2-40B4-BE49-F238E27FC236}">
+                <a16:creationId xmlns:a16="http://schemas.microsoft.com/office/drawing/2014/main" id="{EE043A04-04A6-E0D3-D15C-03A24D76BF5B}"/>
+              </a:ext>
+            </a:extLst>
+          </p:cNvPr>
+          <p:cNvPicPr>
+            <a:picLocks noChangeAspect="1"/>
+          </p:cNvPicPr>
+          <p:nvPr/>
+        </p:nvPicPr>
+        <p:blipFill>
+          <a:blip r:embed="rId3"/>
+          <a:stretch>
+            <a:fillRect/>
+          </a:stretch>
+        </p:blipFill>
+        <p:spPr>
+          <a:xfrm>
+            <a:off x="5122506" y="1789088"/>
+            <a:ext cx="6834143" cy="4998006"/>
+          </a:xfrm>
+          <a:prstGeom prst="rect">
+            <a:avLst/>
+          </a:prstGeom>
+        </p:spPr>
+      </p:pic>
+      <p:pic>
+        <p:nvPicPr>
+          <p:cNvPr id="14" name="Picture 13">
+            <a:extLst>
+              <a:ext uri="{FF2B5EF4-FFF2-40B4-BE49-F238E27FC236}">
+                <a16:creationId xmlns:a16="http://schemas.microsoft.com/office/drawing/2014/main" id="{F81AD291-4175-57F8-C2BF-32D18943CEBC}"/>
+              </a:ext>
+            </a:extLst>
+          </p:cNvPr>
+          <p:cNvPicPr>
+            <a:picLocks noChangeAspect="1"/>
+          </p:cNvPicPr>
+          <p:nvPr/>
+        </p:nvPicPr>
+        <p:blipFill>
+          <a:blip r:embed="rId4"/>
+          <a:stretch>
+            <a:fillRect/>
+          </a:stretch>
+        </p:blipFill>
+        <p:spPr>
+          <a:xfrm>
+            <a:off x="10981466" y="159691"/>
+            <a:ext cx="975183" cy="1921036"/>
+          </a:xfrm>
+          <a:prstGeom prst="rect">
+            <a:avLst/>
+          </a:prstGeom>
+        </p:spPr>
+      </p:pic>
+    </p:spTree>
+    <p:extLst>
+      <p:ext uri="{BB962C8B-B14F-4D97-AF65-F5344CB8AC3E}">
+        <p14:creationId xmlns:p14="http://schemas.microsoft.com/office/powerpoint/2010/main" val="2583273628"/>
+      </p:ext>
+    </p:extLst>
+  </p:cSld>
+  <p:clrMapOvr>
+    <a:masterClrMapping/>
+  </p:clrMapOvr>
+  <p:timing>
+    <p:tnLst>
+      <p:par>
+        <p:cTn id="1" dur="indefinite" restart="never" nodeType="tmRoot">
+          <p:childTnLst>
+            <p:seq concurrent="1" nextAc="seek">
+              <p:cTn id="2" dur="indefinite" nodeType="mainSeq">
+                <p:childTnLst>
+                  <p:par>
+                    <p:cTn id="3" fill="hold">
+                      <p:stCondLst>
+                        <p:cond delay="indefinite"/>
+                      </p:stCondLst>
+                      <p:childTnLst>
+                        <p:par>
+                          <p:cTn id="4" fill="hold">
+                            <p:stCondLst>
+                              <p:cond delay="0"/>
+                            </p:stCondLst>
+                            <p:childTnLst>
+                              <p:par>
+                                <p:cTn id="5" presetID="1" presetClass="entr" presetSubtype="0" fill="hold" nodeType="clickEffect">
+                                  <p:stCondLst>
+                                    <p:cond delay="0"/>
+                                  </p:stCondLst>
+                                  <p:childTnLst>
+                                    <p:set>
+                                      <p:cBhvr>
+                                        <p:cTn id="6" dur="1" fill="hold">
+                                          <p:stCondLst>
+                                            <p:cond delay="0"/>
+                                          </p:stCondLst>
+                                        </p:cTn>
+                                        <p:tgtEl>
+                                          <p:spTgt spid="6"/>
+                                        </p:tgtEl>
+                                        <p:attrNameLst>
+                                          <p:attrName>style.visibility</p:attrName>
+                                        </p:attrNameLst>
+                                      </p:cBhvr>
+                                      <p:to>
+                                        <p:strVal val="visible"/>
+                                      </p:to>
+                                    </p:set>
+                                  </p:childTnLst>
+                                </p:cTn>
+                              </p:par>
+                            </p:childTnLst>
+                          </p:cTn>
+                        </p:par>
+                      </p:childTnLst>
+                    </p:cTn>
+                  </p:par>
+                  <p:par>
+                    <p:cTn id="7" fill="hold">
+                      <p:stCondLst>
+                        <p:cond delay="indefinite"/>
+                      </p:stCondLst>
+                      <p:childTnLst>
+                        <p:par>
+                          <p:cTn id="8" fill="hold">
+                            <p:stCondLst>
+                              <p:cond delay="0"/>
+                            </p:stCondLst>
+                            <p:childTnLst>
+                              <p:par>
+                                <p:cTn id="9" presetID="1" presetClass="entr" presetSubtype="0" fill="hold" nodeType="clickEffect">
+                                  <p:stCondLst>
+                                    <p:cond delay="0"/>
+                                  </p:stCondLst>
+                                  <p:childTnLst>
+                                    <p:set>
+                                      <p:cBhvr>
+                                        <p:cTn id="10" dur="1" fill="hold">
+                                          <p:stCondLst>
+                                            <p:cond delay="0"/>
+                                          </p:stCondLst>
+                                        </p:cTn>
+                                        <p:tgtEl>
+                                          <p:spTgt spid="10"/>
+                                        </p:tgtEl>
+                                        <p:attrNameLst>
+                                          <p:attrName>style.visibility</p:attrName>
+                                        </p:attrNameLst>
+                                      </p:cBhvr>
+                                      <p:to>
+                                        <p:strVal val="visible"/>
+                                      </p:to>
+                                    </p:set>
+                                  </p:childTnLst>
+                                </p:cTn>
+                              </p:par>
+                            </p:childTnLst>
+                          </p:cTn>
+                        </p:par>
+                      </p:childTnLst>
+                    </p:cTn>
+                  </p:par>
+                </p:childTnLst>
+              </p:cTn>
+              <p:prevCondLst>
+                <p:cond evt="onPrev" delay="0">
+                  <p:tgtEl>
+                    <p:sldTgt/>
+                  </p:tgtEl>
+                </p:cond>
+              </p:prevCondLst>
+              <p:nextCondLst>
+                <p:cond evt="onNext" delay="0">
+                  <p:tgtEl>
+                    <p:sldTgt/>
+                  </p:tgtEl>
+                </p:cond>
+              </p:nextCondLst>
+            </p:seq>
+          </p:childTnLst>
+        </p:cTn>
+      </p:par>
+    </p:tnLst>
+  </p:timing>
+</p:sld>
+</file>
+
+<file path=ppt/slides/slide9.xml><?xml version="1.0" encoding="utf-8"?>
+<p:sld xmlns:a="http://schemas.openxmlformats.org/drawingml/2006/main" xmlns:r="http://schemas.openxmlformats.org/officeDocument/2006/relationships" xmlns:p="http://schemas.openxmlformats.org/presentationml/2006/main">
+  <p:cSld>
+    <p:spTree>
+      <p:nvGrpSpPr>
+        <p:cNvPr id="1" name="">
+          <a:extLst>
+            <a:ext uri="{FF2B5EF4-FFF2-40B4-BE49-F238E27FC236}">
+              <a16:creationId xmlns:a16="http://schemas.microsoft.com/office/drawing/2014/main" id="{7250B2E5-B08E-EDAE-E6C6-96AFDF1C4D8C}"/>
+            </a:ext>
+          </a:extLst>
+        </p:cNvPr>
+        <p:cNvGrpSpPr/>
+        <p:nvPr/>
+      </p:nvGrpSpPr>
+      <p:grpSpPr>
+        <a:xfrm>
+          <a:off x="0" y="0"/>
+          <a:ext cx="0" cy="0"/>
+          <a:chOff x="0" y="0"/>
+          <a:chExt cx="0" cy="0"/>
+        </a:xfrm>
+      </p:grpSpPr>
+      <p:pic>
+        <p:nvPicPr>
+          <p:cNvPr id="5" name="Picture 4">
+            <a:extLst>
+              <a:ext uri="{FF2B5EF4-FFF2-40B4-BE49-F238E27FC236}">
+                <a16:creationId xmlns:a16="http://schemas.microsoft.com/office/drawing/2014/main" id="{31B9BB26-0E4D-1745-05B6-EF66FADA8181}"/>
+              </a:ext>
+            </a:extLst>
+          </p:cNvPr>
+          <p:cNvPicPr>
+            <a:picLocks noChangeAspect="1"/>
+          </p:cNvPicPr>
+          <p:nvPr/>
+        </p:nvPicPr>
+        <p:blipFill>
+          <a:blip r:embed="rId2"/>
+          <a:stretch>
+            <a:fillRect/>
+          </a:stretch>
+        </p:blipFill>
+        <p:spPr>
+          <a:xfrm>
+            <a:off x="541188" y="0"/>
+            <a:ext cx="2997200" cy="6858000"/>
+          </a:xfrm>
+          <a:prstGeom prst="rect">
+            <a:avLst/>
+          </a:prstGeom>
+        </p:spPr>
+      </p:pic>
+      <p:pic>
+        <p:nvPicPr>
+          <p:cNvPr id="7" name="Picture 6">
+            <a:extLst>
+              <a:ext uri="{FF2B5EF4-FFF2-40B4-BE49-F238E27FC236}">
+                <a16:creationId xmlns:a16="http://schemas.microsoft.com/office/drawing/2014/main" id="{73B61E7D-150B-BA6C-D1D2-863EF9A324AC}"/>
+              </a:ext>
+            </a:extLst>
+          </p:cNvPr>
+          <p:cNvPicPr>
+            <a:picLocks noChangeAspect="1"/>
+          </p:cNvPicPr>
+          <p:nvPr/>
+        </p:nvPicPr>
+        <p:blipFill>
+          <a:blip r:embed="rId3"/>
+          <a:stretch>
+            <a:fillRect/>
+          </a:stretch>
+        </p:blipFill>
+        <p:spPr>
+          <a:xfrm>
+            <a:off x="3538388" y="0"/>
+            <a:ext cx="2889796" cy="6858000"/>
+          </a:xfrm>
+          <a:prstGeom prst="rect">
+            <a:avLst/>
+          </a:prstGeom>
+        </p:spPr>
+      </p:pic>
+      <p:pic>
+        <p:nvPicPr>
+          <p:cNvPr id="9" name="Picture 8">
+            <a:extLst>
+              <a:ext uri="{FF2B5EF4-FFF2-40B4-BE49-F238E27FC236}">
+                <a16:creationId xmlns:a16="http://schemas.microsoft.com/office/drawing/2014/main" id="{63CABA4E-ED18-2F0D-5166-C7C57E9C9FD4}"/>
+              </a:ext>
+            </a:extLst>
+          </p:cNvPr>
+          <p:cNvPicPr>
+            <a:picLocks noChangeAspect="1"/>
+          </p:cNvPicPr>
+          <p:nvPr/>
+        </p:nvPicPr>
+        <p:blipFill>
+          <a:blip r:embed="rId4"/>
+          <a:stretch>
+            <a:fillRect/>
+          </a:stretch>
+        </p:blipFill>
+        <p:spPr>
+          <a:xfrm>
+            <a:off x="6428184" y="0"/>
+            <a:ext cx="2876479" cy="6858000"/>
+          </a:xfrm>
+          <a:prstGeom prst="rect">
+            <a:avLst/>
+          </a:prstGeom>
+        </p:spPr>
+      </p:pic>
+      <p:pic>
+        <p:nvPicPr>
+          <p:cNvPr id="11" name="Picture 10">
+            <a:extLst>
+              <a:ext uri="{FF2B5EF4-FFF2-40B4-BE49-F238E27FC236}">
+                <a16:creationId xmlns:a16="http://schemas.microsoft.com/office/drawing/2014/main" id="{B6A3B1AB-6989-2B8A-93BB-D4443AF3E57C}"/>
+              </a:ext>
+            </a:extLst>
+          </p:cNvPr>
+          <p:cNvPicPr>
+            <a:picLocks noChangeAspect="1"/>
+          </p:cNvPicPr>
+          <p:nvPr/>
+        </p:nvPicPr>
+        <p:blipFill>
+          <a:blip r:embed="rId5"/>
+          <a:stretch>
+            <a:fillRect/>
+          </a:stretch>
+        </p:blipFill>
+        <p:spPr>
+          <a:xfrm>
+            <a:off x="9298859" y="0"/>
+            <a:ext cx="2895600" cy="6858000"/>
+          </a:xfrm>
+          <a:prstGeom prst="rect">
+            <a:avLst/>
+          </a:prstGeom>
+        </p:spPr>
+      </p:pic>
+      <p:sp>
+        <p:nvSpPr>
+          <p:cNvPr id="12" name="TextBox 11">
+            <a:extLst>
+              <a:ext uri="{FF2B5EF4-FFF2-40B4-BE49-F238E27FC236}">
+                <a16:creationId xmlns:a16="http://schemas.microsoft.com/office/drawing/2014/main" id="{87A249A2-A355-0E16-74A8-3C8F569DAC53}"/>
+              </a:ext>
+            </a:extLst>
+          </p:cNvPr>
+          <p:cNvSpPr txBox="1"/>
+          <p:nvPr/>
+        </p:nvSpPr>
+        <p:spPr>
+          <a:xfrm rot="16200000">
+            <a:off x="-1523731" y="3244334"/>
+            <a:ext cx="3760517" cy="369332"/>
+          </a:xfrm>
+          <a:prstGeom prst="rect">
+            <a:avLst/>
+          </a:prstGeom>
+          <a:noFill/>
+        </p:spPr>
+        <p:txBody>
+          <a:bodyPr wrap="none" rtlCol="0">
+            <a:spAutoFit/>
+          </a:bodyPr>
+          <a:lstStyle/>
+          <a:p>
+            <a:r>
+              <a:rPr lang="en-GB" dirty="0"/>
+              <a:t>Sector Coupling with Energy Efficiency</a:t>
+            </a:r>
+            <a:endParaRPr lang="en-DE" dirty="0"/>
+          </a:p>
+        </p:txBody>
+      </p:sp>
+      <p:pic>
+        <p:nvPicPr>
+          <p:cNvPr id="15" name="Picture 14">
+            <a:extLst>
+              <a:ext uri="{FF2B5EF4-FFF2-40B4-BE49-F238E27FC236}">
+                <a16:creationId xmlns:a16="http://schemas.microsoft.com/office/drawing/2014/main" id="{A823EAE6-A701-C6A9-E0FC-898B21CE12FA}"/>
+              </a:ext>
+            </a:extLst>
+          </p:cNvPr>
+          <p:cNvPicPr>
+            <a:picLocks noChangeAspect="1"/>
+          </p:cNvPicPr>
+          <p:nvPr/>
+        </p:nvPicPr>
+        <p:blipFill>
+          <a:blip r:embed="rId6"/>
+          <a:stretch>
+            <a:fillRect/>
+          </a:stretch>
+        </p:blipFill>
+        <p:spPr>
+          <a:xfrm>
+            <a:off x="4390778" y="1478708"/>
+            <a:ext cx="1165895" cy="858146"/>
+          </a:xfrm>
+          <a:prstGeom prst="rect">
+            <a:avLst/>
+          </a:prstGeom>
+        </p:spPr>
+      </p:pic>
+      <p:pic>
+        <p:nvPicPr>
+          <p:cNvPr id="17" name="Picture 16">
+            <a:extLst>
+              <a:ext uri="{FF2B5EF4-FFF2-40B4-BE49-F238E27FC236}">
+                <a16:creationId xmlns:a16="http://schemas.microsoft.com/office/drawing/2014/main" id="{B6CDBB9C-8900-BE28-A7EC-4597AB0C0967}"/>
+              </a:ext>
+            </a:extLst>
+          </p:cNvPr>
+          <p:cNvPicPr>
+            <a:picLocks noChangeAspect="1"/>
+          </p:cNvPicPr>
+          <p:nvPr/>
+        </p:nvPicPr>
+        <p:blipFill>
+          <a:blip r:embed="rId7"/>
+          <a:stretch>
+            <a:fillRect/>
+          </a:stretch>
+        </p:blipFill>
+        <p:spPr>
+          <a:xfrm>
+            <a:off x="7970542" y="1690764"/>
+            <a:ext cx="1454842" cy="436453"/>
+          </a:xfrm>
+          <a:prstGeom prst="rect">
+            <a:avLst/>
+          </a:prstGeom>
+        </p:spPr>
+      </p:pic>
+    </p:spTree>
+    <p:extLst>
+      <p:ext uri="{BB962C8B-B14F-4D97-AF65-F5344CB8AC3E}">
+        <p14:creationId xmlns:p14="http://schemas.microsoft.com/office/powerpoint/2010/main" val="2911808027"/>
+      </p:ext>
+    </p:extLst>
+  </p:cSld>
+  <p:clrMapOvr>
+    <a:masterClrMapping/>
+  </p:clrMapOvr>
 </p:sld>
 </file>
 

</xml_diff>

<commit_message>
Created no tidal scenario
94 min run time
</commit_message>
<xml_diff>
--- a/5. Results/Results.pptx
+++ b/5. Results/Results.pptx
@@ -15,6 +15,9 @@
     <p:sldId id="266" r:id="rId9"/>
     <p:sldId id="263" r:id="rId10"/>
     <p:sldId id="264" r:id="rId11"/>
+    <p:sldId id="268" r:id="rId12"/>
+    <p:sldId id="269" r:id="rId13"/>
+    <p:sldId id="270" r:id="rId14"/>
   </p:sldIdLst>
   <p:sldSz cx="12192000" cy="6858000"/>
   <p:notesSz cx="6858000" cy="9144000"/>
@@ -3453,8 +3456,8 @@
         </p:blipFill>
         <p:spPr>
           <a:xfrm>
-            <a:off x="8366760" y="0"/>
-            <a:ext cx="3529584" cy="6824266"/>
+            <a:off x="8366760" y="13430"/>
+            <a:ext cx="3529584" cy="6797405"/>
           </a:xfrm>
           <a:prstGeom prst="rect">
             <a:avLst/>
@@ -3642,15 +3645,20 @@
           <p:nvPr/>
         </p:nvPicPr>
         <p:blipFill>
-          <a:blip r:embed="rId2"/>
-          <a:stretch>
-            <a:fillRect/>
-          </a:stretch>
+          <a:blip r:embed="rId2">
+            <a:extLst>
+              <a:ext uri="{28A0092B-C50C-407E-A947-70E740481C1C}">
+                <a14:useLocalDpi xmlns:a14="http://schemas.microsoft.com/office/drawing/2010/main" val="0"/>
+              </a:ext>
+            </a:extLst>
+          </a:blip>
+          <a:srcRect/>
+          <a:stretch/>
         </p:blipFill>
         <p:spPr>
           <a:xfrm>
-            <a:off x="541188" y="0"/>
-            <a:ext cx="2844800" cy="6858000"/>
+            <a:off x="2384426" y="0"/>
+            <a:ext cx="2815924" cy="6858000"/>
           </a:xfrm>
           <a:prstGeom prst="rect">
             <a:avLst/>
@@ -3659,10 +3667,10 @@
       </p:pic>
       <p:pic>
         <p:nvPicPr>
-          <p:cNvPr id="6" name="Picture 5">
-            <a:extLst>
-              <a:ext uri="{FF2B5EF4-FFF2-40B4-BE49-F238E27FC236}">
-                <a16:creationId xmlns:a16="http://schemas.microsoft.com/office/drawing/2014/main" id="{88CD6AD4-4B8A-2386-85E0-C355018038E3}"/>
+          <p:cNvPr id="2" name="Picture 1">
+            <a:extLst>
+              <a:ext uri="{FF2B5EF4-FFF2-40B4-BE49-F238E27FC236}">
+                <a16:creationId xmlns:a16="http://schemas.microsoft.com/office/drawing/2014/main" id="{795B3564-E64D-0BEF-88BF-3528D24188B4}"/>
               </a:ext>
             </a:extLst>
           </p:cNvPr>
@@ -3679,8 +3687,115 @@
         </p:blipFill>
         <p:spPr>
           <a:xfrm>
-            <a:off x="3385988" y="0"/>
-            <a:ext cx="5725861" cy="4134116"/>
+            <a:off x="6717284" y="0"/>
+            <a:ext cx="3530600" cy="6858000"/>
+          </a:xfrm>
+          <a:prstGeom prst="rect">
+            <a:avLst/>
+          </a:prstGeom>
+        </p:spPr>
+      </p:pic>
+    </p:spTree>
+    <p:extLst>
+      <p:ext uri="{BB962C8B-B14F-4D97-AF65-F5344CB8AC3E}">
+        <p14:creationId xmlns:p14="http://schemas.microsoft.com/office/powerpoint/2010/main" val="1393889523"/>
+      </p:ext>
+    </p:extLst>
+  </p:cSld>
+  <p:clrMapOvr>
+    <a:masterClrMapping/>
+  </p:clrMapOvr>
+</p:sld>
+</file>
+
+<file path=ppt/slides/slide11.xml><?xml version="1.0" encoding="utf-8"?>
+<p:sld xmlns:a="http://schemas.openxmlformats.org/drawingml/2006/main" xmlns:r="http://schemas.openxmlformats.org/officeDocument/2006/relationships" xmlns:p="http://schemas.openxmlformats.org/presentationml/2006/main">
+  <p:cSld>
+    <p:spTree>
+      <p:nvGrpSpPr>
+        <p:cNvPr id="1" name="">
+          <a:extLst>
+            <a:ext uri="{FF2B5EF4-FFF2-40B4-BE49-F238E27FC236}">
+              <a16:creationId xmlns:a16="http://schemas.microsoft.com/office/drawing/2014/main" id="{DA2CD637-9B3B-D9B6-272B-BE9EAA9C8FA1}"/>
+            </a:ext>
+          </a:extLst>
+        </p:cNvPr>
+        <p:cNvGrpSpPr/>
+        <p:nvPr/>
+      </p:nvGrpSpPr>
+      <p:grpSpPr>
+        <a:xfrm>
+          <a:off x="0" y="0"/>
+          <a:ext cx="0" cy="0"/>
+          <a:chOff x="0" y="0"/>
+          <a:chExt cx="0" cy="0"/>
+        </a:xfrm>
+      </p:grpSpPr>
+      <p:sp>
+        <p:nvSpPr>
+          <p:cNvPr id="12" name="TextBox 11">
+            <a:extLst>
+              <a:ext uri="{FF2B5EF4-FFF2-40B4-BE49-F238E27FC236}">
+                <a16:creationId xmlns:a16="http://schemas.microsoft.com/office/drawing/2014/main" id="{617C74EB-FDDC-CF46-98BF-ED84CEC80B30}"/>
+              </a:ext>
+            </a:extLst>
+          </p:cNvPr>
+          <p:cNvSpPr txBox="1"/>
+          <p:nvPr/>
+        </p:nvSpPr>
+        <p:spPr>
+          <a:xfrm rot="16200000">
+            <a:off x="-1523731" y="3244334"/>
+            <a:ext cx="3760517" cy="369332"/>
+          </a:xfrm>
+          <a:prstGeom prst="rect">
+            <a:avLst/>
+          </a:prstGeom>
+          <a:noFill/>
+        </p:spPr>
+        <p:txBody>
+          <a:bodyPr wrap="none" rtlCol="0">
+            <a:spAutoFit/>
+          </a:bodyPr>
+          <a:lstStyle/>
+          <a:p>
+            <a:r>
+              <a:rPr lang="en-GB" dirty="0"/>
+              <a:t>Sector Coupling with Energy Efficiency</a:t>
+            </a:r>
+            <a:endParaRPr lang="en-DE" dirty="0"/>
+          </a:p>
+        </p:txBody>
+      </p:sp>
+      <p:pic>
+        <p:nvPicPr>
+          <p:cNvPr id="6" name="Picture 5">
+            <a:extLst>
+              <a:ext uri="{FF2B5EF4-FFF2-40B4-BE49-F238E27FC236}">
+                <a16:creationId xmlns:a16="http://schemas.microsoft.com/office/drawing/2014/main" id="{F7F7D66D-1AC8-69C2-6191-20A1C4CA0BB1}"/>
+              </a:ext>
+            </a:extLst>
+          </p:cNvPr>
+          <p:cNvPicPr>
+            <a:picLocks noChangeAspect="1"/>
+          </p:cNvPicPr>
+          <p:nvPr/>
+        </p:nvPicPr>
+        <p:blipFill>
+          <a:blip r:embed="rId2">
+            <a:extLst>
+              <a:ext uri="{28A0092B-C50C-407E-A947-70E740481C1C}">
+                <a14:useLocalDpi xmlns:a14="http://schemas.microsoft.com/office/drawing/2010/main" val="0"/>
+              </a:ext>
+            </a:extLst>
+          </a:blip>
+          <a:srcRect/>
+          <a:stretch/>
+        </p:blipFill>
+        <p:spPr>
+          <a:xfrm>
+            <a:off x="789463" y="0"/>
+            <a:ext cx="5688543" cy="4134116"/>
           </a:xfrm>
           <a:prstGeom prst="rect">
             <a:avLst/>
@@ -3692,7 +3807,42 @@
           <p:cNvPr id="10" name="Picture 9">
             <a:extLst>
               <a:ext uri="{FF2B5EF4-FFF2-40B4-BE49-F238E27FC236}">
-                <a16:creationId xmlns:a16="http://schemas.microsoft.com/office/drawing/2014/main" id="{B0A7FD44-B198-B676-C106-DA4FB61463A7}"/>
+                <a16:creationId xmlns:a16="http://schemas.microsoft.com/office/drawing/2014/main" id="{A20AC2D2-208D-C93C-0C61-CAA5AF15DAE0}"/>
+              </a:ext>
+            </a:extLst>
+          </p:cNvPr>
+          <p:cNvPicPr>
+            <a:picLocks noChangeAspect="1"/>
+          </p:cNvPicPr>
+          <p:nvPr/>
+        </p:nvPicPr>
+        <p:blipFill>
+          <a:blip r:embed="rId3">
+            <a:extLst>
+              <a:ext uri="{28A0092B-C50C-407E-A947-70E740481C1C}">
+                <a14:useLocalDpi xmlns:a14="http://schemas.microsoft.com/office/drawing/2010/main" val="0"/>
+              </a:ext>
+            </a:extLst>
+          </a:blip>
+          <a:srcRect/>
+          <a:stretch/>
+        </p:blipFill>
+        <p:spPr>
+          <a:xfrm>
+            <a:off x="4153828" y="2398438"/>
+            <a:ext cx="5709199" cy="4187487"/>
+          </a:xfrm>
+          <a:prstGeom prst="rect">
+            <a:avLst/>
+          </a:prstGeom>
+        </p:spPr>
+      </p:pic>
+      <p:pic>
+        <p:nvPicPr>
+          <p:cNvPr id="14" name="Picture 13">
+            <a:extLst>
+              <a:ext uri="{FF2B5EF4-FFF2-40B4-BE49-F238E27FC236}">
+                <a16:creationId xmlns:a16="http://schemas.microsoft.com/office/drawing/2014/main" id="{BF22C5C4-E5BE-11E9-C4CC-5C19BF29DE02}"/>
               </a:ext>
             </a:extLst>
           </p:cNvPr>
@@ -3709,36 +3859,6 @@
         </p:blipFill>
         <p:spPr>
           <a:xfrm>
-            <a:off x="6230788" y="2599606"/>
-            <a:ext cx="5725861" cy="4187487"/>
-          </a:xfrm>
-          <a:prstGeom prst="rect">
-            <a:avLst/>
-          </a:prstGeom>
-        </p:spPr>
-      </p:pic>
-      <p:pic>
-        <p:nvPicPr>
-          <p:cNvPr id="14" name="Picture 13">
-            <a:extLst>
-              <a:ext uri="{FF2B5EF4-FFF2-40B4-BE49-F238E27FC236}">
-                <a16:creationId xmlns:a16="http://schemas.microsoft.com/office/drawing/2014/main" id="{1D996439-A740-FC7F-9880-DD9C7BDBD634}"/>
-              </a:ext>
-            </a:extLst>
-          </p:cNvPr>
-          <p:cNvPicPr>
-            <a:picLocks noChangeAspect="1"/>
-          </p:cNvPicPr>
-          <p:nvPr/>
-        </p:nvPicPr>
-        <p:blipFill>
-          <a:blip r:embed="rId5"/>
-          <a:stretch>
-            <a:fillRect/>
-          </a:stretch>
-        </p:blipFill>
-        <p:spPr>
-          <a:xfrm>
             <a:off x="10062491" y="103708"/>
             <a:ext cx="1267002" cy="2495898"/>
           </a:xfrm>
@@ -3750,7 +3870,7 @@
     </p:spTree>
     <p:extLst>
       <p:ext uri="{BB962C8B-B14F-4D97-AF65-F5344CB8AC3E}">
-        <p14:creationId xmlns:p14="http://schemas.microsoft.com/office/powerpoint/2010/main" val="1393889523"/>
+        <p14:creationId xmlns:p14="http://schemas.microsoft.com/office/powerpoint/2010/main" val="447807949"/>
       </p:ext>
     </p:extLst>
   </p:cSld>
@@ -3877,6 +3997,1728 @@
       </p:par>
     </p:tnLst>
   </p:timing>
+</p:sld>
+</file>
+
+<file path=ppt/slides/slide12.xml><?xml version="1.0" encoding="utf-8"?>
+<p:sld xmlns:a="http://schemas.openxmlformats.org/drawingml/2006/main" xmlns:r="http://schemas.openxmlformats.org/officeDocument/2006/relationships" xmlns:p="http://schemas.openxmlformats.org/presentationml/2006/main">
+  <p:cSld>
+    <p:spTree>
+      <p:nvGrpSpPr>
+        <p:cNvPr id="1" name=""/>
+        <p:cNvGrpSpPr/>
+        <p:nvPr/>
+      </p:nvGrpSpPr>
+      <p:grpSpPr>
+        <a:xfrm>
+          <a:off x="0" y="0"/>
+          <a:ext cx="0" cy="0"/>
+          <a:chOff x="0" y="0"/>
+          <a:chExt cx="0" cy="0"/>
+        </a:xfrm>
+      </p:grpSpPr>
+      <p:pic>
+        <p:nvPicPr>
+          <p:cNvPr id="5" name="Picture 4">
+            <a:extLst>
+              <a:ext uri="{FF2B5EF4-FFF2-40B4-BE49-F238E27FC236}">
+                <a16:creationId xmlns:a16="http://schemas.microsoft.com/office/drawing/2014/main" id="{A135A028-A28F-B741-5FD8-0050C12E8D53}"/>
+              </a:ext>
+            </a:extLst>
+          </p:cNvPr>
+          <p:cNvPicPr>
+            <a:picLocks noChangeAspect="1"/>
+          </p:cNvPicPr>
+          <p:nvPr/>
+        </p:nvPicPr>
+        <p:blipFill>
+          <a:blip r:embed="rId2"/>
+          <a:stretch>
+            <a:fillRect/>
+          </a:stretch>
+        </p:blipFill>
+        <p:spPr>
+          <a:xfrm>
+            <a:off x="0" y="718458"/>
+            <a:ext cx="6078178" cy="5131837"/>
+          </a:xfrm>
+          <a:prstGeom prst="rect">
+            <a:avLst/>
+          </a:prstGeom>
+        </p:spPr>
+      </p:pic>
+      <p:pic>
+        <p:nvPicPr>
+          <p:cNvPr id="7" name="Picture 6">
+            <a:extLst>
+              <a:ext uri="{FF2B5EF4-FFF2-40B4-BE49-F238E27FC236}">
+                <a16:creationId xmlns:a16="http://schemas.microsoft.com/office/drawing/2014/main" id="{A71B505F-5768-C046-7F1E-0B8004FC38E8}"/>
+              </a:ext>
+            </a:extLst>
+          </p:cNvPr>
+          <p:cNvPicPr>
+            <a:picLocks noChangeAspect="1"/>
+          </p:cNvPicPr>
+          <p:nvPr/>
+        </p:nvPicPr>
+        <p:blipFill>
+          <a:blip r:embed="rId3"/>
+          <a:stretch>
+            <a:fillRect/>
+          </a:stretch>
+        </p:blipFill>
+        <p:spPr>
+          <a:xfrm>
+            <a:off x="5991998" y="718458"/>
+            <a:ext cx="6200001" cy="5131837"/>
+          </a:xfrm>
+          <a:prstGeom prst="rect">
+            <a:avLst/>
+          </a:prstGeom>
+        </p:spPr>
+      </p:pic>
+      <p:pic>
+        <p:nvPicPr>
+          <p:cNvPr id="9" name="Picture 8">
+            <a:extLst>
+              <a:ext uri="{FF2B5EF4-FFF2-40B4-BE49-F238E27FC236}">
+                <a16:creationId xmlns:a16="http://schemas.microsoft.com/office/drawing/2014/main" id="{B2876AE8-92D2-C5D1-970D-44407EF9E5DB}"/>
+              </a:ext>
+            </a:extLst>
+          </p:cNvPr>
+          <p:cNvPicPr>
+            <a:picLocks noChangeAspect="1"/>
+          </p:cNvPicPr>
+          <p:nvPr/>
+        </p:nvPicPr>
+        <p:blipFill rotWithShape="1">
+          <a:blip r:embed="rId4"/>
+          <a:srcRect l="890" b="1755"/>
+          <a:stretch/>
+        </p:blipFill>
+        <p:spPr>
+          <a:xfrm>
+            <a:off x="7412831" y="1633674"/>
+            <a:ext cx="2501995" cy="814251"/>
+          </a:xfrm>
+          <a:prstGeom prst="rect">
+            <a:avLst/>
+          </a:prstGeom>
+        </p:spPr>
+      </p:pic>
+    </p:spTree>
+    <p:extLst>
+      <p:ext uri="{BB962C8B-B14F-4D97-AF65-F5344CB8AC3E}">
+        <p14:creationId xmlns:p14="http://schemas.microsoft.com/office/powerpoint/2010/main" val="1047092182"/>
+      </p:ext>
+    </p:extLst>
+  </p:cSld>
+  <p:clrMapOvr>
+    <a:masterClrMapping/>
+  </p:clrMapOvr>
+</p:sld>
+</file>
+
+<file path=ppt/slides/slide13.xml><?xml version="1.0" encoding="utf-8"?>
+<p:sld xmlns:a="http://schemas.openxmlformats.org/drawingml/2006/main" xmlns:r="http://schemas.openxmlformats.org/officeDocument/2006/relationships" xmlns:p="http://schemas.openxmlformats.org/presentationml/2006/main">
+  <p:cSld>
+    <p:spTree>
+      <p:nvGrpSpPr>
+        <p:cNvPr id="1" name=""/>
+        <p:cNvGrpSpPr/>
+        <p:nvPr/>
+      </p:nvGrpSpPr>
+      <p:grpSpPr>
+        <a:xfrm>
+          <a:off x="0" y="0"/>
+          <a:ext cx="0" cy="0"/>
+          <a:chOff x="0" y="0"/>
+          <a:chExt cx="0" cy="0"/>
+        </a:xfrm>
+      </p:grpSpPr>
+      <p:pic>
+        <p:nvPicPr>
+          <p:cNvPr id="5" name="Picture 4">
+            <a:extLst>
+              <a:ext uri="{FF2B5EF4-FFF2-40B4-BE49-F238E27FC236}">
+                <a16:creationId xmlns:a16="http://schemas.microsoft.com/office/drawing/2014/main" id="{E8752EAE-6BF9-6FD1-05FB-7830FC86164D}"/>
+              </a:ext>
+            </a:extLst>
+          </p:cNvPr>
+          <p:cNvPicPr>
+            <a:picLocks noChangeAspect="1"/>
+          </p:cNvPicPr>
+          <p:nvPr/>
+        </p:nvPicPr>
+        <p:blipFill>
+          <a:blip r:embed="rId2">
+            <a:extLst>
+              <a:ext uri="{28A0092B-C50C-407E-A947-70E740481C1C}">
+                <a14:useLocalDpi xmlns:a14="http://schemas.microsoft.com/office/drawing/2010/main" val="0"/>
+              </a:ext>
+            </a:extLst>
+          </a:blip>
+          <a:srcRect/>
+          <a:stretch/>
+        </p:blipFill>
+        <p:spPr>
+          <a:xfrm>
+            <a:off x="7378700" y="0"/>
+            <a:ext cx="2545317" cy="6843701"/>
+          </a:xfrm>
+          <a:prstGeom prst="rect">
+            <a:avLst/>
+          </a:prstGeom>
+        </p:spPr>
+      </p:pic>
+      <p:graphicFrame>
+        <p:nvGraphicFramePr>
+          <p:cNvPr id="6" name="Table 5">
+            <a:extLst>
+              <a:ext uri="{FF2B5EF4-FFF2-40B4-BE49-F238E27FC236}">
+                <a16:creationId xmlns:a16="http://schemas.microsoft.com/office/drawing/2014/main" id="{C80B9D5F-FA7F-9515-4465-71E414A55D90}"/>
+              </a:ext>
+            </a:extLst>
+          </p:cNvPr>
+          <p:cNvGraphicFramePr>
+            <a:graphicFrameLocks noGrp="1"/>
+          </p:cNvGraphicFramePr>
+          <p:nvPr>
+            <p:extLst>
+              <p:ext uri="{D42A27DB-BD31-4B8C-83A1-F6EECF244321}">
+                <p14:modId xmlns:p14="http://schemas.microsoft.com/office/powerpoint/2010/main" val="1296858900"/>
+              </p:ext>
+            </p:extLst>
+          </p:nvPr>
+        </p:nvGraphicFramePr>
+        <p:xfrm>
+          <a:off x="608266" y="2991246"/>
+          <a:ext cx="6230685" cy="875508"/>
+        </p:xfrm>
+        <a:graphic>
+          <a:graphicData uri="http://schemas.openxmlformats.org/drawingml/2006/table">
+            <a:tbl>
+              <a:tblPr/>
+              <a:tblGrid>
+                <a:gridCol w="2728660">
+                  <a:extLst>
+                    <a:ext uri="{9D8B030D-6E8A-4147-A177-3AD203B41FA5}">
+                      <a16:colId xmlns:a16="http://schemas.microsoft.com/office/drawing/2014/main" val="1751152322"/>
+                    </a:ext>
+                  </a:extLst>
+                </a:gridCol>
+                <a:gridCol w="700405">
+                  <a:extLst>
+                    <a:ext uri="{9D8B030D-6E8A-4147-A177-3AD203B41FA5}">
+                      <a16:colId xmlns:a16="http://schemas.microsoft.com/office/drawing/2014/main" val="1579387797"/>
+                    </a:ext>
+                  </a:extLst>
+                </a:gridCol>
+                <a:gridCol w="700405">
+                  <a:extLst>
+                    <a:ext uri="{9D8B030D-6E8A-4147-A177-3AD203B41FA5}">
+                      <a16:colId xmlns:a16="http://schemas.microsoft.com/office/drawing/2014/main" val="135533754"/>
+                    </a:ext>
+                  </a:extLst>
+                </a:gridCol>
+                <a:gridCol w="700405">
+                  <a:extLst>
+                    <a:ext uri="{9D8B030D-6E8A-4147-A177-3AD203B41FA5}">
+                      <a16:colId xmlns:a16="http://schemas.microsoft.com/office/drawing/2014/main" val="2033477583"/>
+                    </a:ext>
+                  </a:extLst>
+                </a:gridCol>
+                <a:gridCol w="700405">
+                  <a:extLst>
+                    <a:ext uri="{9D8B030D-6E8A-4147-A177-3AD203B41FA5}">
+                      <a16:colId xmlns:a16="http://schemas.microsoft.com/office/drawing/2014/main" val="2993394997"/>
+                    </a:ext>
+                  </a:extLst>
+                </a:gridCol>
+                <a:gridCol w="700405">
+                  <a:extLst>
+                    <a:ext uri="{9D8B030D-6E8A-4147-A177-3AD203B41FA5}">
+                      <a16:colId xmlns:a16="http://schemas.microsoft.com/office/drawing/2014/main" val="3967267168"/>
+                    </a:ext>
+                  </a:extLst>
+                </a:gridCol>
+              </a:tblGrid>
+              <a:tr h="218877">
+                <a:tc>
+                  <a:txBody>
+                    <a:bodyPr/>
+                    <a:lstStyle/>
+                    <a:p>
+                      <a:pPr algn="ctr" fontAlgn="ctr"/>
+                      <a:r>
+                        <a:rPr lang="en-GB" sz="1100" b="1" i="0" u="none" strike="noStrike" dirty="0">
+                          <a:solidFill>
+                            <a:srgbClr val="000000"/>
+                          </a:solidFill>
+                          <a:effectLst/>
+                          <a:latin typeface="Calibri" panose="020F0502020204030204" pitchFamily="34" charset="0"/>
+                        </a:rPr>
+                        <a:t>Scenario</a:t>
+                      </a:r>
+                    </a:p>
+                  </a:txBody>
+                  <a:tcPr marL="9525" marR="9525" marT="9525" marB="0" anchor="ctr">
+                    <a:lnL w="6350" cap="flat" cmpd="sng" algn="ctr">
+                      <a:solidFill>
+                        <a:srgbClr val="000000"/>
+                      </a:solidFill>
+                      <a:prstDash val="solid"/>
+                      <a:round/>
+                      <a:headEnd type="none" w="med" len="med"/>
+                      <a:tailEnd type="none" w="med" len="med"/>
+                    </a:lnL>
+                    <a:lnR w="6350" cap="flat" cmpd="sng" algn="ctr">
+                      <a:solidFill>
+                        <a:srgbClr val="000000"/>
+                      </a:solidFill>
+                      <a:prstDash val="solid"/>
+                      <a:round/>
+                      <a:headEnd type="none" w="med" len="med"/>
+                      <a:tailEnd type="none" w="med" len="med"/>
+                    </a:lnR>
+                    <a:lnT w="6350" cap="flat" cmpd="sng" algn="ctr">
+                      <a:solidFill>
+                        <a:srgbClr val="000000"/>
+                      </a:solidFill>
+                      <a:prstDash val="solid"/>
+                      <a:round/>
+                      <a:headEnd type="none" w="med" len="med"/>
+                      <a:tailEnd type="none" w="med" len="med"/>
+                    </a:lnT>
+                    <a:lnB w="6350" cap="flat" cmpd="sng" algn="ctr">
+                      <a:solidFill>
+                        <a:srgbClr val="000000"/>
+                      </a:solidFill>
+                      <a:prstDash val="solid"/>
+                      <a:round/>
+                      <a:headEnd type="none" w="med" len="med"/>
+                      <a:tailEnd type="none" w="med" len="med"/>
+                    </a:lnB>
+                    <a:solidFill>
+                      <a:srgbClr val="5B9BD5"/>
+                    </a:solidFill>
+                  </a:tcPr>
+                </a:tc>
+                <a:tc>
+                  <a:txBody>
+                    <a:bodyPr/>
+                    <a:lstStyle/>
+                    <a:p>
+                      <a:pPr algn="ctr" fontAlgn="ctr"/>
+                      <a:r>
+                        <a:rPr lang="en-GB" sz="1100" b="1" i="0" u="none" strike="noStrike">
+                          <a:solidFill>
+                            <a:srgbClr val="000000"/>
+                          </a:solidFill>
+                          <a:effectLst/>
+                          <a:latin typeface="Calibri" panose="020F0502020204030204" pitchFamily="34" charset="0"/>
+                        </a:rPr>
+                        <a:t>Power</a:t>
+                      </a:r>
+                    </a:p>
+                  </a:txBody>
+                  <a:tcPr marL="9525" marR="9525" marT="9525" marB="0" anchor="ctr">
+                    <a:lnL w="6350" cap="flat" cmpd="sng" algn="ctr">
+                      <a:solidFill>
+                        <a:srgbClr val="000000"/>
+                      </a:solidFill>
+                      <a:prstDash val="solid"/>
+                      <a:round/>
+                      <a:headEnd type="none" w="med" len="med"/>
+                      <a:tailEnd type="none" w="med" len="med"/>
+                    </a:lnL>
+                    <a:lnR w="6350" cap="flat" cmpd="sng" algn="ctr">
+                      <a:solidFill>
+                        <a:srgbClr val="000000"/>
+                      </a:solidFill>
+                      <a:prstDash val="solid"/>
+                      <a:round/>
+                      <a:headEnd type="none" w="med" len="med"/>
+                      <a:tailEnd type="none" w="med" len="med"/>
+                    </a:lnR>
+                    <a:lnT w="6350" cap="flat" cmpd="sng" algn="ctr">
+                      <a:solidFill>
+                        <a:srgbClr val="000000"/>
+                      </a:solidFill>
+                      <a:prstDash val="solid"/>
+                      <a:round/>
+                      <a:headEnd type="none" w="med" len="med"/>
+                      <a:tailEnd type="none" w="med" len="med"/>
+                    </a:lnT>
+                    <a:lnB w="6350" cap="flat" cmpd="sng" algn="ctr">
+                      <a:solidFill>
+                        <a:srgbClr val="000000"/>
+                      </a:solidFill>
+                      <a:prstDash val="solid"/>
+                      <a:round/>
+                      <a:headEnd type="none" w="med" len="med"/>
+                      <a:tailEnd type="none" w="med" len="med"/>
+                    </a:lnB>
+                    <a:solidFill>
+                      <a:srgbClr val="5B9BD5"/>
+                    </a:solidFill>
+                  </a:tcPr>
+                </a:tc>
+                <a:tc>
+                  <a:txBody>
+                    <a:bodyPr/>
+                    <a:lstStyle/>
+                    <a:p>
+                      <a:pPr algn="ctr" fontAlgn="ctr"/>
+                      <a:r>
+                        <a:rPr lang="en-GB" sz="1100" b="1" i="0" u="none" strike="noStrike">
+                          <a:solidFill>
+                            <a:srgbClr val="000000"/>
+                          </a:solidFill>
+                          <a:effectLst/>
+                          <a:latin typeface="Calibri" panose="020F0502020204030204" pitchFamily="34" charset="0"/>
+                        </a:rPr>
+                        <a:t>Mobility</a:t>
+                      </a:r>
+                    </a:p>
+                  </a:txBody>
+                  <a:tcPr marL="9525" marR="9525" marT="9525" marB="0" anchor="ctr">
+                    <a:lnL w="6350" cap="flat" cmpd="sng" algn="ctr">
+                      <a:solidFill>
+                        <a:srgbClr val="000000"/>
+                      </a:solidFill>
+                      <a:prstDash val="solid"/>
+                      <a:round/>
+                      <a:headEnd type="none" w="med" len="med"/>
+                      <a:tailEnd type="none" w="med" len="med"/>
+                    </a:lnL>
+                    <a:lnR w="6350" cap="flat" cmpd="sng" algn="ctr">
+                      <a:solidFill>
+                        <a:srgbClr val="000000"/>
+                      </a:solidFill>
+                      <a:prstDash val="solid"/>
+                      <a:round/>
+                      <a:headEnd type="none" w="med" len="med"/>
+                      <a:tailEnd type="none" w="med" len="med"/>
+                    </a:lnR>
+                    <a:lnT w="6350" cap="flat" cmpd="sng" algn="ctr">
+                      <a:solidFill>
+                        <a:srgbClr val="000000"/>
+                      </a:solidFill>
+                      <a:prstDash val="solid"/>
+                      <a:round/>
+                      <a:headEnd type="none" w="med" len="med"/>
+                      <a:tailEnd type="none" w="med" len="med"/>
+                    </a:lnT>
+                    <a:lnB w="6350" cap="flat" cmpd="sng" algn="ctr">
+                      <a:solidFill>
+                        <a:srgbClr val="000000"/>
+                      </a:solidFill>
+                      <a:prstDash val="solid"/>
+                      <a:round/>
+                      <a:headEnd type="none" w="med" len="med"/>
+                      <a:tailEnd type="none" w="med" len="med"/>
+                    </a:lnB>
+                    <a:solidFill>
+                      <a:srgbClr val="5B9BD5"/>
+                    </a:solidFill>
+                  </a:tcPr>
+                </a:tc>
+                <a:tc>
+                  <a:txBody>
+                    <a:bodyPr/>
+                    <a:lstStyle/>
+                    <a:p>
+                      <a:pPr algn="ctr" fontAlgn="ctr"/>
+                      <a:r>
+                        <a:rPr lang="en-GB" sz="1100" b="1" i="0" u="none" strike="noStrike">
+                          <a:solidFill>
+                            <a:srgbClr val="000000"/>
+                          </a:solidFill>
+                          <a:effectLst/>
+                          <a:latin typeface="Calibri" panose="020F0502020204030204" pitchFamily="34" charset="0"/>
+                        </a:rPr>
+                        <a:t>Cooking</a:t>
+                      </a:r>
+                    </a:p>
+                  </a:txBody>
+                  <a:tcPr marL="9525" marR="9525" marT="9525" marB="0" anchor="ctr">
+                    <a:lnL w="6350" cap="flat" cmpd="sng" algn="ctr">
+                      <a:solidFill>
+                        <a:srgbClr val="000000"/>
+                      </a:solidFill>
+                      <a:prstDash val="solid"/>
+                      <a:round/>
+                      <a:headEnd type="none" w="med" len="med"/>
+                      <a:tailEnd type="none" w="med" len="med"/>
+                    </a:lnL>
+                    <a:lnR w="6350" cap="flat" cmpd="sng" algn="ctr">
+                      <a:solidFill>
+                        <a:srgbClr val="000000"/>
+                      </a:solidFill>
+                      <a:prstDash val="solid"/>
+                      <a:round/>
+                      <a:headEnd type="none" w="med" len="med"/>
+                      <a:tailEnd type="none" w="med" len="med"/>
+                    </a:lnR>
+                    <a:lnT w="6350" cap="flat" cmpd="sng" algn="ctr">
+                      <a:solidFill>
+                        <a:srgbClr val="000000"/>
+                      </a:solidFill>
+                      <a:prstDash val="solid"/>
+                      <a:round/>
+                      <a:headEnd type="none" w="med" len="med"/>
+                      <a:tailEnd type="none" w="med" len="med"/>
+                    </a:lnT>
+                    <a:lnB w="6350" cap="flat" cmpd="sng" algn="ctr">
+                      <a:solidFill>
+                        <a:srgbClr val="000000"/>
+                      </a:solidFill>
+                      <a:prstDash val="solid"/>
+                      <a:round/>
+                      <a:headEnd type="none" w="med" len="med"/>
+                      <a:tailEnd type="none" w="med" len="med"/>
+                    </a:lnB>
+                    <a:solidFill>
+                      <a:srgbClr val="5B9BD5"/>
+                    </a:solidFill>
+                  </a:tcPr>
+                </a:tc>
+                <a:tc>
+                  <a:txBody>
+                    <a:bodyPr/>
+                    <a:lstStyle/>
+                    <a:p>
+                      <a:pPr algn="ctr" fontAlgn="ctr"/>
+                      <a:r>
+                        <a:rPr lang="en-GB" sz="1100" b="1" i="0" u="none" strike="noStrike">
+                          <a:solidFill>
+                            <a:srgbClr val="000000"/>
+                          </a:solidFill>
+                          <a:effectLst/>
+                          <a:latin typeface="Calibri" panose="020F0502020204030204" pitchFamily="34" charset="0"/>
+                        </a:rPr>
+                        <a:t>Heating</a:t>
+                      </a:r>
+                    </a:p>
+                  </a:txBody>
+                  <a:tcPr marL="9525" marR="9525" marT="9525" marB="0" anchor="ctr">
+                    <a:lnL w="6350" cap="flat" cmpd="sng" algn="ctr">
+                      <a:solidFill>
+                        <a:srgbClr val="000000"/>
+                      </a:solidFill>
+                      <a:prstDash val="solid"/>
+                      <a:round/>
+                      <a:headEnd type="none" w="med" len="med"/>
+                      <a:tailEnd type="none" w="med" len="med"/>
+                    </a:lnL>
+                    <a:lnR w="6350" cap="flat" cmpd="sng" algn="ctr">
+                      <a:solidFill>
+                        <a:srgbClr val="000000"/>
+                      </a:solidFill>
+                      <a:prstDash val="solid"/>
+                      <a:round/>
+                      <a:headEnd type="none" w="med" len="med"/>
+                      <a:tailEnd type="none" w="med" len="med"/>
+                    </a:lnR>
+                    <a:lnT w="6350" cap="flat" cmpd="sng" algn="ctr">
+                      <a:solidFill>
+                        <a:srgbClr val="000000"/>
+                      </a:solidFill>
+                      <a:prstDash val="solid"/>
+                      <a:round/>
+                      <a:headEnd type="none" w="med" len="med"/>
+                      <a:tailEnd type="none" w="med" len="med"/>
+                    </a:lnT>
+                    <a:lnB w="6350" cap="flat" cmpd="sng" algn="ctr">
+                      <a:solidFill>
+                        <a:srgbClr val="000000"/>
+                      </a:solidFill>
+                      <a:prstDash val="solid"/>
+                      <a:round/>
+                      <a:headEnd type="none" w="med" len="med"/>
+                      <a:tailEnd type="none" w="med" len="med"/>
+                    </a:lnB>
+                    <a:solidFill>
+                      <a:srgbClr val="5B9BD5"/>
+                    </a:solidFill>
+                  </a:tcPr>
+                </a:tc>
+                <a:tc>
+                  <a:txBody>
+                    <a:bodyPr/>
+                    <a:lstStyle/>
+                    <a:p>
+                      <a:pPr algn="ctr" fontAlgn="ctr"/>
+                      <a:r>
+                        <a:rPr lang="en-GB" sz="1100" b="1" i="0" u="none" strike="noStrike">
+                          <a:solidFill>
+                            <a:srgbClr val="000000"/>
+                          </a:solidFill>
+                          <a:effectLst/>
+                          <a:latin typeface="Calibri" panose="020F0502020204030204" pitchFamily="34" charset="0"/>
+                        </a:rPr>
+                        <a:t>Average</a:t>
+                      </a:r>
+                    </a:p>
+                  </a:txBody>
+                  <a:tcPr marL="9525" marR="9525" marT="9525" marB="0" anchor="ctr">
+                    <a:lnL w="6350" cap="flat" cmpd="sng" algn="ctr">
+                      <a:solidFill>
+                        <a:srgbClr val="000000"/>
+                      </a:solidFill>
+                      <a:prstDash val="solid"/>
+                      <a:round/>
+                      <a:headEnd type="none" w="med" len="med"/>
+                      <a:tailEnd type="none" w="med" len="med"/>
+                    </a:lnL>
+                    <a:lnR w="6350" cap="flat" cmpd="sng" algn="ctr">
+                      <a:solidFill>
+                        <a:srgbClr val="000000"/>
+                      </a:solidFill>
+                      <a:prstDash val="solid"/>
+                      <a:round/>
+                      <a:headEnd type="none" w="med" len="med"/>
+                      <a:tailEnd type="none" w="med" len="med"/>
+                    </a:lnR>
+                    <a:lnT w="6350" cap="flat" cmpd="sng" algn="ctr">
+                      <a:solidFill>
+                        <a:srgbClr val="000000"/>
+                      </a:solidFill>
+                      <a:prstDash val="solid"/>
+                      <a:round/>
+                      <a:headEnd type="none" w="med" len="med"/>
+                      <a:tailEnd type="none" w="med" len="med"/>
+                    </a:lnT>
+                    <a:lnB w="6350" cap="flat" cmpd="sng" algn="ctr">
+                      <a:solidFill>
+                        <a:srgbClr val="000000"/>
+                      </a:solidFill>
+                      <a:prstDash val="solid"/>
+                      <a:round/>
+                      <a:headEnd type="none" w="med" len="med"/>
+                      <a:tailEnd type="none" w="med" len="med"/>
+                    </a:lnB>
+                    <a:solidFill>
+                      <a:srgbClr val="5B9BD5"/>
+                    </a:solidFill>
+                  </a:tcPr>
+                </a:tc>
+                <a:extLst>
+                  <a:ext uri="{0D108BD9-81ED-4DB2-BD59-A6C34878D82A}">
+                    <a16:rowId xmlns:a16="http://schemas.microsoft.com/office/drawing/2014/main" val="2540707186"/>
+                  </a:ext>
+                </a:extLst>
+              </a:tr>
+              <a:tr h="218877">
+                <a:tc>
+                  <a:txBody>
+                    <a:bodyPr/>
+                    <a:lstStyle/>
+                    <a:p>
+                      <a:pPr algn="l" fontAlgn="b"/>
+                      <a:r>
+                        <a:rPr lang="en-GB" sz="1100" b="0" i="0" u="none" strike="noStrike">
+                          <a:solidFill>
+                            <a:srgbClr val="000000"/>
+                          </a:solidFill>
+                          <a:effectLst/>
+                          <a:latin typeface="Calibri" panose="020F0502020204030204" pitchFamily="34" charset="0"/>
+                        </a:rPr>
+                        <a:t>BAU</a:t>
+                      </a:r>
+                    </a:p>
+                  </a:txBody>
+                  <a:tcPr marL="9525" marR="9525" marT="9525" marB="0" anchor="b">
+                    <a:lnL w="6350" cap="flat" cmpd="sng" algn="ctr">
+                      <a:solidFill>
+                        <a:srgbClr val="000000"/>
+                      </a:solidFill>
+                      <a:prstDash val="solid"/>
+                      <a:round/>
+                      <a:headEnd type="none" w="med" len="med"/>
+                      <a:tailEnd type="none" w="med" len="med"/>
+                    </a:lnL>
+                    <a:lnR w="6350" cap="flat" cmpd="sng" algn="ctr">
+                      <a:solidFill>
+                        <a:srgbClr val="000000"/>
+                      </a:solidFill>
+                      <a:prstDash val="solid"/>
+                      <a:round/>
+                      <a:headEnd type="none" w="med" len="med"/>
+                      <a:tailEnd type="none" w="med" len="med"/>
+                    </a:lnR>
+                    <a:lnT w="6350" cap="flat" cmpd="sng" algn="ctr">
+                      <a:solidFill>
+                        <a:srgbClr val="000000"/>
+                      </a:solidFill>
+                      <a:prstDash val="solid"/>
+                      <a:round/>
+                      <a:headEnd type="none" w="med" len="med"/>
+                      <a:tailEnd type="none" w="med" len="med"/>
+                    </a:lnT>
+                    <a:lnB w="6350" cap="flat" cmpd="sng" algn="ctr">
+                      <a:solidFill>
+                        <a:srgbClr val="000000"/>
+                      </a:solidFill>
+                      <a:prstDash val="solid"/>
+                      <a:round/>
+                      <a:headEnd type="none" w="med" len="med"/>
+                      <a:tailEnd type="none" w="med" len="med"/>
+                    </a:lnB>
+                    <a:noFill/>
+                  </a:tcPr>
+                </a:tc>
+                <a:tc>
+                  <a:txBody>
+                    <a:bodyPr/>
+                    <a:lstStyle/>
+                    <a:p>
+                      <a:pPr algn="ctr" fontAlgn="b"/>
+                      <a:r>
+                        <a:rPr lang="en-DE" sz="1100" b="0" i="0" u="none" strike="noStrike">
+                          <a:solidFill>
+                            <a:srgbClr val="000000"/>
+                          </a:solidFill>
+                          <a:effectLst/>
+                          <a:latin typeface="Calibri" panose="020F0502020204030204" pitchFamily="34" charset="0"/>
+                        </a:rPr>
+                        <a:t>100%</a:t>
+                      </a:r>
+                    </a:p>
+                  </a:txBody>
+                  <a:tcPr marL="9525" marR="9525" marT="9525" marB="0" anchor="b">
+                    <a:lnL w="6350" cap="flat" cmpd="sng" algn="ctr">
+                      <a:solidFill>
+                        <a:srgbClr val="000000"/>
+                      </a:solidFill>
+                      <a:prstDash val="solid"/>
+                      <a:round/>
+                      <a:headEnd type="none" w="med" len="med"/>
+                      <a:tailEnd type="none" w="med" len="med"/>
+                    </a:lnL>
+                    <a:lnR w="6350" cap="flat" cmpd="sng" algn="ctr">
+                      <a:solidFill>
+                        <a:srgbClr val="000000"/>
+                      </a:solidFill>
+                      <a:prstDash val="solid"/>
+                      <a:round/>
+                      <a:headEnd type="none" w="med" len="med"/>
+                      <a:tailEnd type="none" w="med" len="med"/>
+                    </a:lnR>
+                    <a:lnT w="6350" cap="flat" cmpd="sng" algn="ctr">
+                      <a:solidFill>
+                        <a:srgbClr val="000000"/>
+                      </a:solidFill>
+                      <a:prstDash val="solid"/>
+                      <a:round/>
+                      <a:headEnd type="none" w="med" len="med"/>
+                      <a:tailEnd type="none" w="med" len="med"/>
+                    </a:lnT>
+                    <a:lnB w="6350" cap="flat" cmpd="sng" algn="ctr">
+                      <a:solidFill>
+                        <a:srgbClr val="000000"/>
+                      </a:solidFill>
+                      <a:prstDash val="solid"/>
+                      <a:round/>
+                      <a:headEnd type="none" w="med" len="med"/>
+                      <a:tailEnd type="none" w="med" len="med"/>
+                    </a:lnB>
+                    <a:solidFill>
+                      <a:srgbClr val="63BE7B"/>
+                    </a:solidFill>
+                  </a:tcPr>
+                </a:tc>
+                <a:tc>
+                  <a:txBody>
+                    <a:bodyPr/>
+                    <a:lstStyle/>
+                    <a:p>
+                      <a:pPr algn="ctr" fontAlgn="b"/>
+                      <a:r>
+                        <a:rPr lang="en-DE" sz="1100" b="0" i="0" u="none" strike="noStrike">
+                          <a:solidFill>
+                            <a:srgbClr val="000000"/>
+                          </a:solidFill>
+                          <a:effectLst/>
+                          <a:latin typeface="Calibri" panose="020F0502020204030204" pitchFamily="34" charset="0"/>
+                        </a:rPr>
+                        <a:t>0%</a:t>
+                      </a:r>
+                    </a:p>
+                  </a:txBody>
+                  <a:tcPr marL="9525" marR="9525" marT="9525" marB="0" anchor="b">
+                    <a:lnL w="6350" cap="flat" cmpd="sng" algn="ctr">
+                      <a:solidFill>
+                        <a:srgbClr val="000000"/>
+                      </a:solidFill>
+                      <a:prstDash val="solid"/>
+                      <a:round/>
+                      <a:headEnd type="none" w="med" len="med"/>
+                      <a:tailEnd type="none" w="med" len="med"/>
+                    </a:lnL>
+                    <a:lnR w="6350" cap="flat" cmpd="sng" algn="ctr">
+                      <a:solidFill>
+                        <a:srgbClr val="000000"/>
+                      </a:solidFill>
+                      <a:prstDash val="solid"/>
+                      <a:round/>
+                      <a:headEnd type="none" w="med" len="med"/>
+                      <a:tailEnd type="none" w="med" len="med"/>
+                    </a:lnR>
+                    <a:lnT w="6350" cap="flat" cmpd="sng" algn="ctr">
+                      <a:solidFill>
+                        <a:srgbClr val="000000"/>
+                      </a:solidFill>
+                      <a:prstDash val="solid"/>
+                      <a:round/>
+                      <a:headEnd type="none" w="med" len="med"/>
+                      <a:tailEnd type="none" w="med" len="med"/>
+                    </a:lnT>
+                    <a:lnB w="6350" cap="flat" cmpd="sng" algn="ctr">
+                      <a:solidFill>
+                        <a:srgbClr val="000000"/>
+                      </a:solidFill>
+                      <a:prstDash val="solid"/>
+                      <a:round/>
+                      <a:headEnd type="none" w="med" len="med"/>
+                      <a:tailEnd type="none" w="med" len="med"/>
+                    </a:lnB>
+                    <a:solidFill>
+                      <a:srgbClr val="F8696B"/>
+                    </a:solidFill>
+                  </a:tcPr>
+                </a:tc>
+                <a:tc>
+                  <a:txBody>
+                    <a:bodyPr/>
+                    <a:lstStyle/>
+                    <a:p>
+                      <a:pPr algn="ctr" fontAlgn="b"/>
+                      <a:r>
+                        <a:rPr lang="en-DE" sz="1100" b="0" i="0" u="none" strike="noStrike">
+                          <a:solidFill>
+                            <a:srgbClr val="000000"/>
+                          </a:solidFill>
+                          <a:effectLst/>
+                          <a:latin typeface="Calibri" panose="020F0502020204030204" pitchFamily="34" charset="0"/>
+                        </a:rPr>
+                        <a:t>0%</a:t>
+                      </a:r>
+                    </a:p>
+                  </a:txBody>
+                  <a:tcPr marL="9525" marR="9525" marT="9525" marB="0" anchor="b">
+                    <a:lnL w="6350" cap="flat" cmpd="sng" algn="ctr">
+                      <a:solidFill>
+                        <a:srgbClr val="000000"/>
+                      </a:solidFill>
+                      <a:prstDash val="solid"/>
+                      <a:round/>
+                      <a:headEnd type="none" w="med" len="med"/>
+                      <a:tailEnd type="none" w="med" len="med"/>
+                    </a:lnL>
+                    <a:lnR w="6350" cap="flat" cmpd="sng" algn="ctr">
+                      <a:solidFill>
+                        <a:srgbClr val="000000"/>
+                      </a:solidFill>
+                      <a:prstDash val="solid"/>
+                      <a:round/>
+                      <a:headEnd type="none" w="med" len="med"/>
+                      <a:tailEnd type="none" w="med" len="med"/>
+                    </a:lnR>
+                    <a:lnT w="6350" cap="flat" cmpd="sng" algn="ctr">
+                      <a:solidFill>
+                        <a:srgbClr val="000000"/>
+                      </a:solidFill>
+                      <a:prstDash val="solid"/>
+                      <a:round/>
+                      <a:headEnd type="none" w="med" len="med"/>
+                      <a:tailEnd type="none" w="med" len="med"/>
+                    </a:lnT>
+                    <a:lnB w="6350" cap="flat" cmpd="sng" algn="ctr">
+                      <a:solidFill>
+                        <a:srgbClr val="000000"/>
+                      </a:solidFill>
+                      <a:prstDash val="solid"/>
+                      <a:round/>
+                      <a:headEnd type="none" w="med" len="med"/>
+                      <a:tailEnd type="none" w="med" len="med"/>
+                    </a:lnB>
+                    <a:solidFill>
+                      <a:srgbClr val="F8696B"/>
+                    </a:solidFill>
+                  </a:tcPr>
+                </a:tc>
+                <a:tc>
+                  <a:txBody>
+                    <a:bodyPr/>
+                    <a:lstStyle/>
+                    <a:p>
+                      <a:pPr algn="ctr" fontAlgn="b"/>
+                      <a:r>
+                        <a:rPr lang="en-DE" sz="1100" b="0" i="0" u="none" strike="noStrike">
+                          <a:solidFill>
+                            <a:srgbClr val="000000"/>
+                          </a:solidFill>
+                          <a:effectLst/>
+                          <a:latin typeface="Calibri" panose="020F0502020204030204" pitchFamily="34" charset="0"/>
+                        </a:rPr>
+                        <a:t>0%</a:t>
+                      </a:r>
+                    </a:p>
+                  </a:txBody>
+                  <a:tcPr marL="9525" marR="9525" marT="9525" marB="0" anchor="b">
+                    <a:lnL w="6350" cap="flat" cmpd="sng" algn="ctr">
+                      <a:solidFill>
+                        <a:srgbClr val="000000"/>
+                      </a:solidFill>
+                      <a:prstDash val="solid"/>
+                      <a:round/>
+                      <a:headEnd type="none" w="med" len="med"/>
+                      <a:tailEnd type="none" w="med" len="med"/>
+                    </a:lnL>
+                    <a:lnR w="6350" cap="flat" cmpd="sng" algn="ctr">
+                      <a:solidFill>
+                        <a:srgbClr val="000000"/>
+                      </a:solidFill>
+                      <a:prstDash val="solid"/>
+                      <a:round/>
+                      <a:headEnd type="none" w="med" len="med"/>
+                      <a:tailEnd type="none" w="med" len="med"/>
+                    </a:lnR>
+                    <a:lnT w="6350" cap="flat" cmpd="sng" algn="ctr">
+                      <a:solidFill>
+                        <a:srgbClr val="000000"/>
+                      </a:solidFill>
+                      <a:prstDash val="solid"/>
+                      <a:round/>
+                      <a:headEnd type="none" w="med" len="med"/>
+                      <a:tailEnd type="none" w="med" len="med"/>
+                    </a:lnT>
+                    <a:lnB w="6350" cap="flat" cmpd="sng" algn="ctr">
+                      <a:solidFill>
+                        <a:srgbClr val="000000"/>
+                      </a:solidFill>
+                      <a:prstDash val="solid"/>
+                      <a:round/>
+                      <a:headEnd type="none" w="med" len="med"/>
+                      <a:tailEnd type="none" w="med" len="med"/>
+                    </a:lnB>
+                    <a:solidFill>
+                      <a:srgbClr val="F8696B"/>
+                    </a:solidFill>
+                  </a:tcPr>
+                </a:tc>
+                <a:tc>
+                  <a:txBody>
+                    <a:bodyPr/>
+                    <a:lstStyle/>
+                    <a:p>
+                      <a:pPr algn="ctr" fontAlgn="b"/>
+                      <a:r>
+                        <a:rPr lang="en-DE" sz="1100" b="0" i="0" u="none" strike="noStrike">
+                          <a:solidFill>
+                            <a:srgbClr val="000000"/>
+                          </a:solidFill>
+                          <a:effectLst/>
+                          <a:latin typeface="Calibri" panose="020F0502020204030204" pitchFamily="34" charset="0"/>
+                        </a:rPr>
+                        <a:t>25%</a:t>
+                      </a:r>
+                    </a:p>
+                  </a:txBody>
+                  <a:tcPr marL="9525" marR="9525" marT="9525" marB="0" anchor="b">
+                    <a:lnL w="6350" cap="flat" cmpd="sng" algn="ctr">
+                      <a:solidFill>
+                        <a:srgbClr val="000000"/>
+                      </a:solidFill>
+                      <a:prstDash val="solid"/>
+                      <a:round/>
+                      <a:headEnd type="none" w="med" len="med"/>
+                      <a:tailEnd type="none" w="med" len="med"/>
+                    </a:lnL>
+                    <a:lnR w="6350" cap="flat" cmpd="sng" algn="ctr">
+                      <a:solidFill>
+                        <a:srgbClr val="000000"/>
+                      </a:solidFill>
+                      <a:prstDash val="solid"/>
+                      <a:round/>
+                      <a:headEnd type="none" w="med" len="med"/>
+                      <a:tailEnd type="none" w="med" len="med"/>
+                    </a:lnR>
+                    <a:lnT w="6350" cap="flat" cmpd="sng" algn="ctr">
+                      <a:solidFill>
+                        <a:srgbClr val="000000"/>
+                      </a:solidFill>
+                      <a:prstDash val="solid"/>
+                      <a:round/>
+                      <a:headEnd type="none" w="med" len="med"/>
+                      <a:tailEnd type="none" w="med" len="med"/>
+                    </a:lnT>
+                    <a:lnB w="6350" cap="flat" cmpd="sng" algn="ctr">
+                      <a:solidFill>
+                        <a:srgbClr val="000000"/>
+                      </a:solidFill>
+                      <a:prstDash val="solid"/>
+                      <a:round/>
+                      <a:headEnd type="none" w="med" len="med"/>
+                      <a:tailEnd type="none" w="med" len="med"/>
+                    </a:lnB>
+                    <a:solidFill>
+                      <a:srgbClr val="F8696B"/>
+                    </a:solidFill>
+                  </a:tcPr>
+                </a:tc>
+                <a:extLst>
+                  <a:ext uri="{0D108BD9-81ED-4DB2-BD59-A6C34878D82A}">
+                    <a16:rowId xmlns:a16="http://schemas.microsoft.com/office/drawing/2014/main" val="3153701165"/>
+                  </a:ext>
+                </a:extLst>
+              </a:tr>
+              <a:tr h="218877">
+                <a:tc>
+                  <a:txBody>
+                    <a:bodyPr/>
+                    <a:lstStyle/>
+                    <a:p>
+                      <a:pPr algn="l" fontAlgn="b"/>
+                      <a:r>
+                        <a:rPr lang="en-GB" sz="1100" b="0" i="0" u="none" strike="noStrike">
+                          <a:solidFill>
+                            <a:srgbClr val="000000"/>
+                          </a:solidFill>
+                          <a:effectLst/>
+                          <a:latin typeface="Calibri" panose="020F0502020204030204" pitchFamily="34" charset="0"/>
+                        </a:rPr>
+                        <a:t>Sector Coupling</a:t>
+                      </a:r>
+                    </a:p>
+                  </a:txBody>
+                  <a:tcPr marL="9525" marR="9525" marT="9525" marB="0" anchor="b">
+                    <a:lnL w="6350" cap="flat" cmpd="sng" algn="ctr">
+                      <a:solidFill>
+                        <a:srgbClr val="000000"/>
+                      </a:solidFill>
+                      <a:prstDash val="solid"/>
+                      <a:round/>
+                      <a:headEnd type="none" w="med" len="med"/>
+                      <a:tailEnd type="none" w="med" len="med"/>
+                    </a:lnL>
+                    <a:lnR w="6350" cap="flat" cmpd="sng" algn="ctr">
+                      <a:solidFill>
+                        <a:srgbClr val="000000"/>
+                      </a:solidFill>
+                      <a:prstDash val="solid"/>
+                      <a:round/>
+                      <a:headEnd type="none" w="med" len="med"/>
+                      <a:tailEnd type="none" w="med" len="med"/>
+                    </a:lnR>
+                    <a:lnT w="6350" cap="flat" cmpd="sng" algn="ctr">
+                      <a:solidFill>
+                        <a:srgbClr val="000000"/>
+                      </a:solidFill>
+                      <a:prstDash val="solid"/>
+                      <a:round/>
+                      <a:headEnd type="none" w="med" len="med"/>
+                      <a:tailEnd type="none" w="med" len="med"/>
+                    </a:lnT>
+                    <a:lnB w="6350" cap="flat" cmpd="sng" algn="ctr">
+                      <a:solidFill>
+                        <a:srgbClr val="000000"/>
+                      </a:solidFill>
+                      <a:prstDash val="solid"/>
+                      <a:round/>
+                      <a:headEnd type="none" w="med" len="med"/>
+                      <a:tailEnd type="none" w="med" len="med"/>
+                    </a:lnB>
+                    <a:noFill/>
+                  </a:tcPr>
+                </a:tc>
+                <a:tc>
+                  <a:txBody>
+                    <a:bodyPr/>
+                    <a:lstStyle/>
+                    <a:p>
+                      <a:pPr algn="ctr" fontAlgn="b"/>
+                      <a:r>
+                        <a:rPr lang="en-DE" sz="1100" b="0" i="0" u="none" strike="noStrike">
+                          <a:solidFill>
+                            <a:srgbClr val="000000"/>
+                          </a:solidFill>
+                          <a:effectLst/>
+                          <a:latin typeface="Calibri" panose="020F0502020204030204" pitchFamily="34" charset="0"/>
+                        </a:rPr>
+                        <a:t>100%</a:t>
+                      </a:r>
+                    </a:p>
+                  </a:txBody>
+                  <a:tcPr marL="9525" marR="9525" marT="9525" marB="0" anchor="b">
+                    <a:lnL w="6350" cap="flat" cmpd="sng" algn="ctr">
+                      <a:solidFill>
+                        <a:srgbClr val="000000"/>
+                      </a:solidFill>
+                      <a:prstDash val="solid"/>
+                      <a:round/>
+                      <a:headEnd type="none" w="med" len="med"/>
+                      <a:tailEnd type="none" w="med" len="med"/>
+                    </a:lnL>
+                    <a:lnR w="6350" cap="flat" cmpd="sng" algn="ctr">
+                      <a:solidFill>
+                        <a:srgbClr val="000000"/>
+                      </a:solidFill>
+                      <a:prstDash val="solid"/>
+                      <a:round/>
+                      <a:headEnd type="none" w="med" len="med"/>
+                      <a:tailEnd type="none" w="med" len="med"/>
+                    </a:lnR>
+                    <a:lnT w="6350" cap="flat" cmpd="sng" algn="ctr">
+                      <a:solidFill>
+                        <a:srgbClr val="000000"/>
+                      </a:solidFill>
+                      <a:prstDash val="solid"/>
+                      <a:round/>
+                      <a:headEnd type="none" w="med" len="med"/>
+                      <a:tailEnd type="none" w="med" len="med"/>
+                    </a:lnT>
+                    <a:lnB w="6350" cap="flat" cmpd="sng" algn="ctr">
+                      <a:solidFill>
+                        <a:srgbClr val="000000"/>
+                      </a:solidFill>
+                      <a:prstDash val="solid"/>
+                      <a:round/>
+                      <a:headEnd type="none" w="med" len="med"/>
+                      <a:tailEnd type="none" w="med" len="med"/>
+                    </a:lnB>
+                    <a:solidFill>
+                      <a:srgbClr val="63BE7B"/>
+                    </a:solidFill>
+                  </a:tcPr>
+                </a:tc>
+                <a:tc>
+                  <a:txBody>
+                    <a:bodyPr/>
+                    <a:lstStyle/>
+                    <a:p>
+                      <a:pPr algn="ctr" fontAlgn="b"/>
+                      <a:r>
+                        <a:rPr lang="en-DE" sz="1100" b="0" i="0" u="none" strike="noStrike">
+                          <a:solidFill>
+                            <a:srgbClr val="000000"/>
+                          </a:solidFill>
+                          <a:effectLst/>
+                          <a:latin typeface="Calibri" panose="020F0502020204030204" pitchFamily="34" charset="0"/>
+                        </a:rPr>
+                        <a:t>100%</a:t>
+                      </a:r>
+                    </a:p>
+                  </a:txBody>
+                  <a:tcPr marL="9525" marR="9525" marT="9525" marB="0" anchor="b">
+                    <a:lnL w="6350" cap="flat" cmpd="sng" algn="ctr">
+                      <a:solidFill>
+                        <a:srgbClr val="000000"/>
+                      </a:solidFill>
+                      <a:prstDash val="solid"/>
+                      <a:round/>
+                      <a:headEnd type="none" w="med" len="med"/>
+                      <a:tailEnd type="none" w="med" len="med"/>
+                    </a:lnL>
+                    <a:lnR w="6350" cap="flat" cmpd="sng" algn="ctr">
+                      <a:solidFill>
+                        <a:srgbClr val="000000"/>
+                      </a:solidFill>
+                      <a:prstDash val="solid"/>
+                      <a:round/>
+                      <a:headEnd type="none" w="med" len="med"/>
+                      <a:tailEnd type="none" w="med" len="med"/>
+                    </a:lnR>
+                    <a:lnT w="6350" cap="flat" cmpd="sng" algn="ctr">
+                      <a:solidFill>
+                        <a:srgbClr val="000000"/>
+                      </a:solidFill>
+                      <a:prstDash val="solid"/>
+                      <a:round/>
+                      <a:headEnd type="none" w="med" len="med"/>
+                      <a:tailEnd type="none" w="med" len="med"/>
+                    </a:lnT>
+                    <a:lnB w="6350" cap="flat" cmpd="sng" algn="ctr">
+                      <a:solidFill>
+                        <a:srgbClr val="000000"/>
+                      </a:solidFill>
+                      <a:prstDash val="solid"/>
+                      <a:round/>
+                      <a:headEnd type="none" w="med" len="med"/>
+                      <a:tailEnd type="none" w="med" len="med"/>
+                    </a:lnB>
+                    <a:solidFill>
+                      <a:srgbClr val="63BE7B"/>
+                    </a:solidFill>
+                  </a:tcPr>
+                </a:tc>
+                <a:tc>
+                  <a:txBody>
+                    <a:bodyPr/>
+                    <a:lstStyle/>
+                    <a:p>
+                      <a:pPr algn="ctr" fontAlgn="b"/>
+                      <a:r>
+                        <a:rPr lang="en-DE" sz="1100" b="0" i="0" u="none" strike="noStrike">
+                          <a:solidFill>
+                            <a:srgbClr val="000000"/>
+                          </a:solidFill>
+                          <a:effectLst/>
+                          <a:latin typeface="Calibri" panose="020F0502020204030204" pitchFamily="34" charset="0"/>
+                        </a:rPr>
+                        <a:t>100%</a:t>
+                      </a:r>
+                    </a:p>
+                  </a:txBody>
+                  <a:tcPr marL="9525" marR="9525" marT="9525" marB="0" anchor="b">
+                    <a:lnL w="6350" cap="flat" cmpd="sng" algn="ctr">
+                      <a:solidFill>
+                        <a:srgbClr val="000000"/>
+                      </a:solidFill>
+                      <a:prstDash val="solid"/>
+                      <a:round/>
+                      <a:headEnd type="none" w="med" len="med"/>
+                      <a:tailEnd type="none" w="med" len="med"/>
+                    </a:lnL>
+                    <a:lnR w="6350" cap="flat" cmpd="sng" algn="ctr">
+                      <a:solidFill>
+                        <a:srgbClr val="000000"/>
+                      </a:solidFill>
+                      <a:prstDash val="solid"/>
+                      <a:round/>
+                      <a:headEnd type="none" w="med" len="med"/>
+                      <a:tailEnd type="none" w="med" len="med"/>
+                    </a:lnR>
+                    <a:lnT w="6350" cap="flat" cmpd="sng" algn="ctr">
+                      <a:solidFill>
+                        <a:srgbClr val="000000"/>
+                      </a:solidFill>
+                      <a:prstDash val="solid"/>
+                      <a:round/>
+                      <a:headEnd type="none" w="med" len="med"/>
+                      <a:tailEnd type="none" w="med" len="med"/>
+                    </a:lnT>
+                    <a:lnB w="6350" cap="flat" cmpd="sng" algn="ctr">
+                      <a:solidFill>
+                        <a:srgbClr val="000000"/>
+                      </a:solidFill>
+                      <a:prstDash val="solid"/>
+                      <a:round/>
+                      <a:headEnd type="none" w="med" len="med"/>
+                      <a:tailEnd type="none" w="med" len="med"/>
+                    </a:lnB>
+                    <a:solidFill>
+                      <a:srgbClr val="63BE7B"/>
+                    </a:solidFill>
+                  </a:tcPr>
+                </a:tc>
+                <a:tc>
+                  <a:txBody>
+                    <a:bodyPr/>
+                    <a:lstStyle/>
+                    <a:p>
+                      <a:pPr algn="ctr" fontAlgn="b"/>
+                      <a:r>
+                        <a:rPr lang="en-DE" sz="1100" b="0" i="0" u="none" strike="noStrike">
+                          <a:solidFill>
+                            <a:srgbClr val="000000"/>
+                          </a:solidFill>
+                          <a:effectLst/>
+                          <a:latin typeface="Calibri" panose="020F0502020204030204" pitchFamily="34" charset="0"/>
+                        </a:rPr>
+                        <a:t>48%</a:t>
+                      </a:r>
+                    </a:p>
+                  </a:txBody>
+                  <a:tcPr marL="9525" marR="9525" marT="9525" marB="0" anchor="b">
+                    <a:lnL w="6350" cap="flat" cmpd="sng" algn="ctr">
+                      <a:solidFill>
+                        <a:srgbClr val="000000"/>
+                      </a:solidFill>
+                      <a:prstDash val="solid"/>
+                      <a:round/>
+                      <a:headEnd type="none" w="med" len="med"/>
+                      <a:tailEnd type="none" w="med" len="med"/>
+                    </a:lnL>
+                    <a:lnR w="6350" cap="flat" cmpd="sng" algn="ctr">
+                      <a:solidFill>
+                        <a:srgbClr val="000000"/>
+                      </a:solidFill>
+                      <a:prstDash val="solid"/>
+                      <a:round/>
+                      <a:headEnd type="none" w="med" len="med"/>
+                      <a:tailEnd type="none" w="med" len="med"/>
+                    </a:lnR>
+                    <a:lnT w="6350" cap="flat" cmpd="sng" algn="ctr">
+                      <a:solidFill>
+                        <a:srgbClr val="000000"/>
+                      </a:solidFill>
+                      <a:prstDash val="solid"/>
+                      <a:round/>
+                      <a:headEnd type="none" w="med" len="med"/>
+                      <a:tailEnd type="none" w="med" len="med"/>
+                    </a:lnT>
+                    <a:lnB w="6350" cap="flat" cmpd="sng" algn="ctr">
+                      <a:solidFill>
+                        <a:srgbClr val="000000"/>
+                      </a:solidFill>
+                      <a:prstDash val="solid"/>
+                      <a:round/>
+                      <a:headEnd type="none" w="med" len="med"/>
+                      <a:tailEnd type="none" w="med" len="med"/>
+                    </a:lnB>
+                    <a:solidFill>
+                      <a:srgbClr val="FFEB84"/>
+                    </a:solidFill>
+                  </a:tcPr>
+                </a:tc>
+                <a:tc>
+                  <a:txBody>
+                    <a:bodyPr/>
+                    <a:lstStyle/>
+                    <a:p>
+                      <a:pPr algn="ctr" fontAlgn="b"/>
+                      <a:r>
+                        <a:rPr lang="en-DE" sz="1100" b="0" i="0" u="none" strike="noStrike">
+                          <a:solidFill>
+                            <a:srgbClr val="000000"/>
+                          </a:solidFill>
+                          <a:effectLst/>
+                          <a:latin typeface="Calibri" panose="020F0502020204030204" pitchFamily="34" charset="0"/>
+                        </a:rPr>
+                        <a:t>87%</a:t>
+                      </a:r>
+                    </a:p>
+                  </a:txBody>
+                  <a:tcPr marL="9525" marR="9525" marT="9525" marB="0" anchor="b">
+                    <a:lnL w="6350" cap="flat" cmpd="sng" algn="ctr">
+                      <a:solidFill>
+                        <a:srgbClr val="000000"/>
+                      </a:solidFill>
+                      <a:prstDash val="solid"/>
+                      <a:round/>
+                      <a:headEnd type="none" w="med" len="med"/>
+                      <a:tailEnd type="none" w="med" len="med"/>
+                    </a:lnL>
+                    <a:lnR w="6350" cap="flat" cmpd="sng" algn="ctr">
+                      <a:solidFill>
+                        <a:srgbClr val="000000"/>
+                      </a:solidFill>
+                      <a:prstDash val="solid"/>
+                      <a:round/>
+                      <a:headEnd type="none" w="med" len="med"/>
+                      <a:tailEnd type="none" w="med" len="med"/>
+                    </a:lnR>
+                    <a:lnT w="6350" cap="flat" cmpd="sng" algn="ctr">
+                      <a:solidFill>
+                        <a:srgbClr val="000000"/>
+                      </a:solidFill>
+                      <a:prstDash val="solid"/>
+                      <a:round/>
+                      <a:headEnd type="none" w="med" len="med"/>
+                      <a:tailEnd type="none" w="med" len="med"/>
+                    </a:lnT>
+                    <a:lnB w="6350" cap="flat" cmpd="sng" algn="ctr">
+                      <a:solidFill>
+                        <a:srgbClr val="000000"/>
+                      </a:solidFill>
+                      <a:prstDash val="solid"/>
+                      <a:round/>
+                      <a:headEnd type="none" w="med" len="med"/>
+                      <a:tailEnd type="none" w="med" len="med"/>
+                    </a:lnB>
+                    <a:solidFill>
+                      <a:srgbClr val="FFEB84"/>
+                    </a:solidFill>
+                  </a:tcPr>
+                </a:tc>
+                <a:extLst>
+                  <a:ext uri="{0D108BD9-81ED-4DB2-BD59-A6C34878D82A}">
+                    <a16:rowId xmlns:a16="http://schemas.microsoft.com/office/drawing/2014/main" val="380867437"/>
+                  </a:ext>
+                </a:extLst>
+              </a:tr>
+              <a:tr h="218877">
+                <a:tc>
+                  <a:txBody>
+                    <a:bodyPr/>
+                    <a:lstStyle/>
+                    <a:p>
+                      <a:pPr algn="l" fontAlgn="b"/>
+                      <a:r>
+                        <a:rPr lang="en-GB" sz="1100" b="0" i="0" u="none" strike="noStrike">
+                          <a:solidFill>
+                            <a:srgbClr val="000000"/>
+                          </a:solidFill>
+                          <a:effectLst/>
+                          <a:latin typeface="Calibri" panose="020F0502020204030204" pitchFamily="34" charset="0"/>
+                        </a:rPr>
+                        <a:t>Sector Coupling with Energy Efficiency</a:t>
+                      </a:r>
+                    </a:p>
+                  </a:txBody>
+                  <a:tcPr marL="9525" marR="9525" marT="9525" marB="0" anchor="b">
+                    <a:lnL w="6350" cap="flat" cmpd="sng" algn="ctr">
+                      <a:solidFill>
+                        <a:srgbClr val="000000"/>
+                      </a:solidFill>
+                      <a:prstDash val="solid"/>
+                      <a:round/>
+                      <a:headEnd type="none" w="med" len="med"/>
+                      <a:tailEnd type="none" w="med" len="med"/>
+                    </a:lnL>
+                    <a:lnR w="6350" cap="flat" cmpd="sng" algn="ctr">
+                      <a:solidFill>
+                        <a:srgbClr val="000000"/>
+                      </a:solidFill>
+                      <a:prstDash val="solid"/>
+                      <a:round/>
+                      <a:headEnd type="none" w="med" len="med"/>
+                      <a:tailEnd type="none" w="med" len="med"/>
+                    </a:lnR>
+                    <a:lnT w="6350" cap="flat" cmpd="sng" algn="ctr">
+                      <a:solidFill>
+                        <a:srgbClr val="000000"/>
+                      </a:solidFill>
+                      <a:prstDash val="solid"/>
+                      <a:round/>
+                      <a:headEnd type="none" w="med" len="med"/>
+                      <a:tailEnd type="none" w="med" len="med"/>
+                    </a:lnT>
+                    <a:lnB w="6350" cap="flat" cmpd="sng" algn="ctr">
+                      <a:solidFill>
+                        <a:srgbClr val="000000"/>
+                      </a:solidFill>
+                      <a:prstDash val="solid"/>
+                      <a:round/>
+                      <a:headEnd type="none" w="med" len="med"/>
+                      <a:tailEnd type="none" w="med" len="med"/>
+                    </a:lnB>
+                    <a:noFill/>
+                  </a:tcPr>
+                </a:tc>
+                <a:tc>
+                  <a:txBody>
+                    <a:bodyPr/>
+                    <a:lstStyle/>
+                    <a:p>
+                      <a:pPr algn="ctr" fontAlgn="b"/>
+                      <a:r>
+                        <a:rPr lang="en-DE" sz="1100" b="0" i="0" u="none" strike="noStrike">
+                          <a:solidFill>
+                            <a:srgbClr val="000000"/>
+                          </a:solidFill>
+                          <a:effectLst/>
+                          <a:latin typeface="Calibri" panose="020F0502020204030204" pitchFamily="34" charset="0"/>
+                        </a:rPr>
+                        <a:t>100%</a:t>
+                      </a:r>
+                    </a:p>
+                  </a:txBody>
+                  <a:tcPr marL="9525" marR="9525" marT="9525" marB="0" anchor="b">
+                    <a:lnL w="6350" cap="flat" cmpd="sng" algn="ctr">
+                      <a:solidFill>
+                        <a:srgbClr val="000000"/>
+                      </a:solidFill>
+                      <a:prstDash val="solid"/>
+                      <a:round/>
+                      <a:headEnd type="none" w="med" len="med"/>
+                      <a:tailEnd type="none" w="med" len="med"/>
+                    </a:lnL>
+                    <a:lnR w="6350" cap="flat" cmpd="sng" algn="ctr">
+                      <a:solidFill>
+                        <a:srgbClr val="000000"/>
+                      </a:solidFill>
+                      <a:prstDash val="solid"/>
+                      <a:round/>
+                      <a:headEnd type="none" w="med" len="med"/>
+                      <a:tailEnd type="none" w="med" len="med"/>
+                    </a:lnR>
+                    <a:lnT w="6350" cap="flat" cmpd="sng" algn="ctr">
+                      <a:solidFill>
+                        <a:srgbClr val="000000"/>
+                      </a:solidFill>
+                      <a:prstDash val="solid"/>
+                      <a:round/>
+                      <a:headEnd type="none" w="med" len="med"/>
+                      <a:tailEnd type="none" w="med" len="med"/>
+                    </a:lnT>
+                    <a:lnB w="6350" cap="flat" cmpd="sng" algn="ctr">
+                      <a:solidFill>
+                        <a:srgbClr val="000000"/>
+                      </a:solidFill>
+                      <a:prstDash val="solid"/>
+                      <a:round/>
+                      <a:headEnd type="none" w="med" len="med"/>
+                      <a:tailEnd type="none" w="med" len="med"/>
+                    </a:lnB>
+                    <a:solidFill>
+                      <a:srgbClr val="63BE7B"/>
+                    </a:solidFill>
+                  </a:tcPr>
+                </a:tc>
+                <a:tc>
+                  <a:txBody>
+                    <a:bodyPr/>
+                    <a:lstStyle/>
+                    <a:p>
+                      <a:pPr algn="ctr" fontAlgn="b"/>
+                      <a:r>
+                        <a:rPr lang="en-DE" sz="1100" b="0" i="0" u="none" strike="noStrike">
+                          <a:solidFill>
+                            <a:srgbClr val="000000"/>
+                          </a:solidFill>
+                          <a:effectLst/>
+                          <a:latin typeface="Calibri" panose="020F0502020204030204" pitchFamily="34" charset="0"/>
+                        </a:rPr>
+                        <a:t>100%</a:t>
+                      </a:r>
+                    </a:p>
+                  </a:txBody>
+                  <a:tcPr marL="9525" marR="9525" marT="9525" marB="0" anchor="b">
+                    <a:lnL w="6350" cap="flat" cmpd="sng" algn="ctr">
+                      <a:solidFill>
+                        <a:srgbClr val="000000"/>
+                      </a:solidFill>
+                      <a:prstDash val="solid"/>
+                      <a:round/>
+                      <a:headEnd type="none" w="med" len="med"/>
+                      <a:tailEnd type="none" w="med" len="med"/>
+                    </a:lnL>
+                    <a:lnR w="6350" cap="flat" cmpd="sng" algn="ctr">
+                      <a:solidFill>
+                        <a:srgbClr val="000000"/>
+                      </a:solidFill>
+                      <a:prstDash val="solid"/>
+                      <a:round/>
+                      <a:headEnd type="none" w="med" len="med"/>
+                      <a:tailEnd type="none" w="med" len="med"/>
+                    </a:lnR>
+                    <a:lnT w="6350" cap="flat" cmpd="sng" algn="ctr">
+                      <a:solidFill>
+                        <a:srgbClr val="000000"/>
+                      </a:solidFill>
+                      <a:prstDash val="solid"/>
+                      <a:round/>
+                      <a:headEnd type="none" w="med" len="med"/>
+                      <a:tailEnd type="none" w="med" len="med"/>
+                    </a:lnT>
+                    <a:lnB w="6350" cap="flat" cmpd="sng" algn="ctr">
+                      <a:solidFill>
+                        <a:srgbClr val="000000"/>
+                      </a:solidFill>
+                      <a:prstDash val="solid"/>
+                      <a:round/>
+                      <a:headEnd type="none" w="med" len="med"/>
+                      <a:tailEnd type="none" w="med" len="med"/>
+                    </a:lnB>
+                    <a:solidFill>
+                      <a:srgbClr val="63BE7B"/>
+                    </a:solidFill>
+                  </a:tcPr>
+                </a:tc>
+                <a:tc>
+                  <a:txBody>
+                    <a:bodyPr/>
+                    <a:lstStyle/>
+                    <a:p>
+                      <a:pPr algn="ctr" fontAlgn="b"/>
+                      <a:r>
+                        <a:rPr lang="en-DE" sz="1100" b="0" i="0" u="none" strike="noStrike" dirty="0">
+                          <a:solidFill>
+                            <a:srgbClr val="000000"/>
+                          </a:solidFill>
+                          <a:effectLst/>
+                          <a:latin typeface="Calibri" panose="020F0502020204030204" pitchFamily="34" charset="0"/>
+                        </a:rPr>
+                        <a:t>100%</a:t>
+                      </a:r>
+                    </a:p>
+                  </a:txBody>
+                  <a:tcPr marL="9525" marR="9525" marT="9525" marB="0" anchor="b">
+                    <a:lnL w="6350" cap="flat" cmpd="sng" algn="ctr">
+                      <a:solidFill>
+                        <a:srgbClr val="000000"/>
+                      </a:solidFill>
+                      <a:prstDash val="solid"/>
+                      <a:round/>
+                      <a:headEnd type="none" w="med" len="med"/>
+                      <a:tailEnd type="none" w="med" len="med"/>
+                    </a:lnL>
+                    <a:lnR w="6350" cap="flat" cmpd="sng" algn="ctr">
+                      <a:solidFill>
+                        <a:srgbClr val="000000"/>
+                      </a:solidFill>
+                      <a:prstDash val="solid"/>
+                      <a:round/>
+                      <a:headEnd type="none" w="med" len="med"/>
+                      <a:tailEnd type="none" w="med" len="med"/>
+                    </a:lnR>
+                    <a:lnT w="6350" cap="flat" cmpd="sng" algn="ctr">
+                      <a:solidFill>
+                        <a:srgbClr val="000000"/>
+                      </a:solidFill>
+                      <a:prstDash val="solid"/>
+                      <a:round/>
+                      <a:headEnd type="none" w="med" len="med"/>
+                      <a:tailEnd type="none" w="med" len="med"/>
+                    </a:lnT>
+                    <a:lnB w="6350" cap="flat" cmpd="sng" algn="ctr">
+                      <a:solidFill>
+                        <a:srgbClr val="000000"/>
+                      </a:solidFill>
+                      <a:prstDash val="solid"/>
+                      <a:round/>
+                      <a:headEnd type="none" w="med" len="med"/>
+                      <a:tailEnd type="none" w="med" len="med"/>
+                    </a:lnB>
+                    <a:solidFill>
+                      <a:srgbClr val="63BE7B"/>
+                    </a:solidFill>
+                  </a:tcPr>
+                </a:tc>
+                <a:tc>
+                  <a:txBody>
+                    <a:bodyPr/>
+                    <a:lstStyle/>
+                    <a:p>
+                      <a:pPr algn="ctr" fontAlgn="b"/>
+                      <a:r>
+                        <a:rPr lang="en-DE" sz="1100" b="0" i="0" u="none" strike="noStrike">
+                          <a:solidFill>
+                            <a:srgbClr val="000000"/>
+                          </a:solidFill>
+                          <a:effectLst/>
+                          <a:latin typeface="Calibri" panose="020F0502020204030204" pitchFamily="34" charset="0"/>
+                        </a:rPr>
+                        <a:t>59%</a:t>
+                      </a:r>
+                    </a:p>
+                  </a:txBody>
+                  <a:tcPr marL="9525" marR="9525" marT="9525" marB="0" anchor="b">
+                    <a:lnL w="6350" cap="flat" cmpd="sng" algn="ctr">
+                      <a:solidFill>
+                        <a:srgbClr val="000000"/>
+                      </a:solidFill>
+                      <a:prstDash val="solid"/>
+                      <a:round/>
+                      <a:headEnd type="none" w="med" len="med"/>
+                      <a:tailEnd type="none" w="med" len="med"/>
+                    </a:lnL>
+                    <a:lnR w="6350" cap="flat" cmpd="sng" algn="ctr">
+                      <a:solidFill>
+                        <a:srgbClr val="000000"/>
+                      </a:solidFill>
+                      <a:prstDash val="solid"/>
+                      <a:round/>
+                      <a:headEnd type="none" w="med" len="med"/>
+                      <a:tailEnd type="none" w="med" len="med"/>
+                    </a:lnR>
+                    <a:lnT w="6350" cap="flat" cmpd="sng" algn="ctr">
+                      <a:solidFill>
+                        <a:srgbClr val="000000"/>
+                      </a:solidFill>
+                      <a:prstDash val="solid"/>
+                      <a:round/>
+                      <a:headEnd type="none" w="med" len="med"/>
+                      <a:tailEnd type="none" w="med" len="med"/>
+                    </a:lnT>
+                    <a:lnB w="6350" cap="flat" cmpd="sng" algn="ctr">
+                      <a:solidFill>
+                        <a:srgbClr val="000000"/>
+                      </a:solidFill>
+                      <a:prstDash val="solid"/>
+                      <a:round/>
+                      <a:headEnd type="none" w="med" len="med"/>
+                      <a:tailEnd type="none" w="med" len="med"/>
+                    </a:lnB>
+                    <a:solidFill>
+                      <a:srgbClr val="63BE7B"/>
+                    </a:solidFill>
+                  </a:tcPr>
+                </a:tc>
+                <a:tc>
+                  <a:txBody>
+                    <a:bodyPr/>
+                    <a:lstStyle/>
+                    <a:p>
+                      <a:pPr algn="ctr" fontAlgn="b"/>
+                      <a:r>
+                        <a:rPr lang="en-DE" sz="1100" b="0" i="0" u="none" strike="noStrike" dirty="0">
+                          <a:solidFill>
+                            <a:srgbClr val="000000"/>
+                          </a:solidFill>
+                          <a:effectLst/>
+                          <a:latin typeface="Calibri" panose="020F0502020204030204" pitchFamily="34" charset="0"/>
+                        </a:rPr>
+                        <a:t>90%</a:t>
+                      </a:r>
+                    </a:p>
+                  </a:txBody>
+                  <a:tcPr marL="9525" marR="9525" marT="9525" marB="0" anchor="b">
+                    <a:lnL w="6350" cap="flat" cmpd="sng" algn="ctr">
+                      <a:solidFill>
+                        <a:srgbClr val="000000"/>
+                      </a:solidFill>
+                      <a:prstDash val="solid"/>
+                      <a:round/>
+                      <a:headEnd type="none" w="med" len="med"/>
+                      <a:tailEnd type="none" w="med" len="med"/>
+                    </a:lnL>
+                    <a:lnR w="6350" cap="flat" cmpd="sng" algn="ctr">
+                      <a:solidFill>
+                        <a:srgbClr val="000000"/>
+                      </a:solidFill>
+                      <a:prstDash val="solid"/>
+                      <a:round/>
+                      <a:headEnd type="none" w="med" len="med"/>
+                      <a:tailEnd type="none" w="med" len="med"/>
+                    </a:lnR>
+                    <a:lnT w="6350" cap="flat" cmpd="sng" algn="ctr">
+                      <a:solidFill>
+                        <a:srgbClr val="000000"/>
+                      </a:solidFill>
+                      <a:prstDash val="solid"/>
+                      <a:round/>
+                      <a:headEnd type="none" w="med" len="med"/>
+                      <a:tailEnd type="none" w="med" len="med"/>
+                    </a:lnT>
+                    <a:lnB w="6350" cap="flat" cmpd="sng" algn="ctr">
+                      <a:solidFill>
+                        <a:srgbClr val="000000"/>
+                      </a:solidFill>
+                      <a:prstDash val="solid"/>
+                      <a:round/>
+                      <a:headEnd type="none" w="med" len="med"/>
+                      <a:tailEnd type="none" w="med" len="med"/>
+                    </a:lnB>
+                    <a:solidFill>
+                      <a:srgbClr val="63BE7B"/>
+                    </a:solidFill>
+                  </a:tcPr>
+                </a:tc>
+                <a:extLst>
+                  <a:ext uri="{0D108BD9-81ED-4DB2-BD59-A6C34878D82A}">
+                    <a16:rowId xmlns:a16="http://schemas.microsoft.com/office/drawing/2014/main" val="1249230045"/>
+                  </a:ext>
+                </a:extLst>
+              </a:tr>
+            </a:tbl>
+          </a:graphicData>
+        </a:graphic>
+      </p:graphicFrame>
+    </p:spTree>
+    <p:extLst>
+      <p:ext uri="{BB962C8B-B14F-4D97-AF65-F5344CB8AC3E}">
+        <p14:creationId xmlns:p14="http://schemas.microsoft.com/office/powerpoint/2010/main" val="382753742"/>
+      </p:ext>
+    </p:extLst>
+  </p:cSld>
+  <p:clrMapOvr>
+    <a:masterClrMapping/>
+  </p:clrMapOvr>
 </p:sld>
 </file>
 
@@ -4553,15 +6395,20 @@
           <p:nvPr/>
         </p:nvPicPr>
         <p:blipFill>
-          <a:blip r:embed="rId3"/>
-          <a:stretch>
-            <a:fillRect/>
-          </a:stretch>
+          <a:blip r:embed="rId3">
+            <a:extLst>
+              <a:ext uri="{28A0092B-C50C-407E-A947-70E740481C1C}">
+                <a14:useLocalDpi xmlns:a14="http://schemas.microsoft.com/office/drawing/2010/main" val="0"/>
+              </a:ext>
+            </a:extLst>
+          </a:blip>
+          <a:srcRect/>
+          <a:stretch/>
         </p:blipFill>
         <p:spPr>
           <a:xfrm>
-            <a:off x="5855676" y="0"/>
-            <a:ext cx="3559749" cy="6858000"/>
+            <a:off x="5868329" y="0"/>
+            <a:ext cx="3534442" cy="6858000"/>
           </a:xfrm>
           <a:prstGeom prst="rect">
             <a:avLst/>
@@ -5259,15 +7106,20 @@
           <p:nvPr/>
         </p:nvPicPr>
         <p:blipFill>
-          <a:blip r:embed="rId3"/>
-          <a:stretch>
-            <a:fillRect/>
-          </a:stretch>
+          <a:blip r:embed="rId3">
+            <a:extLst>
+              <a:ext uri="{28A0092B-C50C-407E-A947-70E740481C1C}">
+                <a14:useLocalDpi xmlns:a14="http://schemas.microsoft.com/office/drawing/2010/main" val="0"/>
+              </a:ext>
+            </a:extLst>
+          </a:blip>
+          <a:srcRect/>
+          <a:stretch/>
         </p:blipFill>
         <p:spPr>
           <a:xfrm>
-            <a:off x="6764348" y="0"/>
-            <a:ext cx="3589867" cy="6858000"/>
+            <a:off x="6800604" y="0"/>
+            <a:ext cx="3517354" cy="6858000"/>
           </a:xfrm>
           <a:prstGeom prst="rect">
             <a:avLst/>
@@ -5637,15 +7489,20 @@
           <p:nvPr/>
         </p:nvPicPr>
         <p:blipFill>
-          <a:blip r:embed="rId2"/>
-          <a:stretch>
-            <a:fillRect/>
-          </a:stretch>
+          <a:blip r:embed="rId2">
+            <a:extLst>
+              <a:ext uri="{28A0092B-C50C-407E-A947-70E740481C1C}">
+                <a14:useLocalDpi xmlns:a14="http://schemas.microsoft.com/office/drawing/2010/main" val="0"/>
+              </a:ext>
+            </a:extLst>
+          </a:blip>
+          <a:srcRect/>
+          <a:stretch/>
         </p:blipFill>
         <p:spPr>
           <a:xfrm>
-            <a:off x="541188" y="0"/>
-            <a:ext cx="2997200" cy="6858000"/>
+            <a:off x="552051" y="0"/>
+            <a:ext cx="2975473" cy="6858000"/>
           </a:xfrm>
           <a:prstGeom prst="rect">
             <a:avLst/>
@@ -5667,15 +7524,20 @@
           <p:nvPr/>
         </p:nvPicPr>
         <p:blipFill>
-          <a:blip r:embed="rId3"/>
-          <a:stretch>
-            <a:fillRect/>
-          </a:stretch>
+          <a:blip r:embed="rId3">
+            <a:extLst>
+              <a:ext uri="{28A0092B-C50C-407E-A947-70E740481C1C}">
+                <a14:useLocalDpi xmlns:a14="http://schemas.microsoft.com/office/drawing/2010/main" val="0"/>
+              </a:ext>
+            </a:extLst>
+          </a:blip>
+          <a:srcRect/>
+          <a:stretch/>
         </p:blipFill>
         <p:spPr>
           <a:xfrm>
-            <a:off x="3538388" y="0"/>
-            <a:ext cx="2889796" cy="6858000"/>
+            <a:off x="3551721" y="0"/>
+            <a:ext cx="2863130" cy="6858000"/>
           </a:xfrm>
           <a:prstGeom prst="rect">
             <a:avLst/>
@@ -5697,15 +7559,20 @@
           <p:nvPr/>
         </p:nvPicPr>
         <p:blipFill>
-          <a:blip r:embed="rId4"/>
-          <a:stretch>
-            <a:fillRect/>
-          </a:stretch>
+          <a:blip r:embed="rId4">
+            <a:extLst>
+              <a:ext uri="{28A0092B-C50C-407E-A947-70E740481C1C}">
+                <a14:useLocalDpi xmlns:a14="http://schemas.microsoft.com/office/drawing/2010/main" val="0"/>
+              </a:ext>
+            </a:extLst>
+          </a:blip>
+          <a:srcRect/>
+          <a:stretch/>
         </p:blipFill>
         <p:spPr>
           <a:xfrm>
-            <a:off x="6428184" y="0"/>
-            <a:ext cx="2876479" cy="6858000"/>
+            <a:off x="6433093" y="0"/>
+            <a:ext cx="2866660" cy="6858000"/>
           </a:xfrm>
           <a:prstGeom prst="rect">
             <a:avLst/>
@@ -5727,15 +7594,20 @@
           <p:nvPr/>
         </p:nvPicPr>
         <p:blipFill>
-          <a:blip r:embed="rId5"/>
-          <a:stretch>
-            <a:fillRect/>
-          </a:stretch>
+          <a:blip r:embed="rId5">
+            <a:extLst>
+              <a:ext uri="{28A0092B-C50C-407E-A947-70E740481C1C}">
+                <a14:useLocalDpi xmlns:a14="http://schemas.microsoft.com/office/drawing/2010/main" val="0"/>
+              </a:ext>
+            </a:extLst>
+          </a:blip>
+          <a:srcRect/>
+          <a:stretch/>
         </p:blipFill>
         <p:spPr>
           <a:xfrm>
-            <a:off x="9298859" y="0"/>
-            <a:ext cx="2895600" cy="6858000"/>
+            <a:off x="9301308" y="0"/>
+            <a:ext cx="2890702" cy="6858000"/>
           </a:xfrm>
           <a:prstGeom prst="rect">
             <a:avLst/>

</xml_diff>

<commit_message>
No tidal scenario and sensitivity
</commit_message>
<xml_diff>
--- a/5. Results/Results.pptx
+++ b/5. Results/Results.pptx
@@ -273,7 +273,7 @@
           <a:p>
             <a:fld id="{4EC8EC5A-93AC-4699-A82B-9532D1A02928}" type="datetimeFigureOut">
               <a:rPr lang="en-DE" smtClean="0"/>
-              <a:t>17/02/2024</a:t>
+              <a:t>18/02/2024</a:t>
             </a:fld>
             <a:endParaRPr lang="en-DE"/>
           </a:p>
@@ -473,7 +473,7 @@
           <a:p>
             <a:fld id="{4EC8EC5A-93AC-4699-A82B-9532D1A02928}" type="datetimeFigureOut">
               <a:rPr lang="en-DE" smtClean="0"/>
-              <a:t>17/02/2024</a:t>
+              <a:t>18/02/2024</a:t>
             </a:fld>
             <a:endParaRPr lang="en-DE"/>
           </a:p>
@@ -683,7 +683,7 @@
           <a:p>
             <a:fld id="{4EC8EC5A-93AC-4699-A82B-9532D1A02928}" type="datetimeFigureOut">
               <a:rPr lang="en-DE" smtClean="0"/>
-              <a:t>17/02/2024</a:t>
+              <a:t>18/02/2024</a:t>
             </a:fld>
             <a:endParaRPr lang="en-DE"/>
           </a:p>
@@ -883,7 +883,7 @@
           <a:p>
             <a:fld id="{4EC8EC5A-93AC-4699-A82B-9532D1A02928}" type="datetimeFigureOut">
               <a:rPr lang="en-DE" smtClean="0"/>
-              <a:t>17/02/2024</a:t>
+              <a:t>18/02/2024</a:t>
             </a:fld>
             <a:endParaRPr lang="en-DE"/>
           </a:p>
@@ -1159,7 +1159,7 @@
           <a:p>
             <a:fld id="{4EC8EC5A-93AC-4699-A82B-9532D1A02928}" type="datetimeFigureOut">
               <a:rPr lang="en-DE" smtClean="0"/>
-              <a:t>17/02/2024</a:t>
+              <a:t>18/02/2024</a:t>
             </a:fld>
             <a:endParaRPr lang="en-DE"/>
           </a:p>
@@ -1427,7 +1427,7 @@
           <a:p>
             <a:fld id="{4EC8EC5A-93AC-4699-A82B-9532D1A02928}" type="datetimeFigureOut">
               <a:rPr lang="en-DE" smtClean="0"/>
-              <a:t>17/02/2024</a:t>
+              <a:t>18/02/2024</a:t>
             </a:fld>
             <a:endParaRPr lang="en-DE"/>
           </a:p>
@@ -1842,7 +1842,7 @@
           <a:p>
             <a:fld id="{4EC8EC5A-93AC-4699-A82B-9532D1A02928}" type="datetimeFigureOut">
               <a:rPr lang="en-DE" smtClean="0"/>
-              <a:t>17/02/2024</a:t>
+              <a:t>18/02/2024</a:t>
             </a:fld>
             <a:endParaRPr lang="en-DE"/>
           </a:p>
@@ -1984,7 +1984,7 @@
           <a:p>
             <a:fld id="{4EC8EC5A-93AC-4699-A82B-9532D1A02928}" type="datetimeFigureOut">
               <a:rPr lang="en-DE" smtClean="0"/>
-              <a:t>17/02/2024</a:t>
+              <a:t>18/02/2024</a:t>
             </a:fld>
             <a:endParaRPr lang="en-DE"/>
           </a:p>
@@ -2097,7 +2097,7 @@
           <a:p>
             <a:fld id="{4EC8EC5A-93AC-4699-A82B-9532D1A02928}" type="datetimeFigureOut">
               <a:rPr lang="en-DE" smtClean="0"/>
-              <a:t>17/02/2024</a:t>
+              <a:t>18/02/2024</a:t>
             </a:fld>
             <a:endParaRPr lang="en-DE"/>
           </a:p>
@@ -2410,7 +2410,7 @@
           <a:p>
             <a:fld id="{4EC8EC5A-93AC-4699-A82B-9532D1A02928}" type="datetimeFigureOut">
               <a:rPr lang="en-DE" smtClean="0"/>
-              <a:t>17/02/2024</a:t>
+              <a:t>18/02/2024</a:t>
             </a:fld>
             <a:endParaRPr lang="en-DE"/>
           </a:p>
@@ -2699,7 +2699,7 @@
           <a:p>
             <a:fld id="{4EC8EC5A-93AC-4699-A82B-9532D1A02928}" type="datetimeFigureOut">
               <a:rPr lang="en-DE" smtClean="0"/>
-              <a:t>17/02/2024</a:t>
+              <a:t>18/02/2024</a:t>
             </a:fld>
             <a:endParaRPr lang="en-DE"/>
           </a:p>
@@ -2942,7 +2942,7 @@
           <a:p>
             <a:fld id="{4EC8EC5A-93AC-4699-A82B-9532D1A02928}" type="datetimeFigureOut">
               <a:rPr lang="en-DE" smtClean="0"/>
-              <a:t>17/02/2024</a:t>
+              <a:t>18/02/2024</a:t>
             </a:fld>
             <a:endParaRPr lang="en-DE"/>
           </a:p>
@@ -3361,10 +3361,10 @@
       </p:grpSpPr>
       <p:pic>
         <p:nvPicPr>
-          <p:cNvPr id="7" name="Picture 6">
-            <a:extLst>
-              <a:ext uri="{FF2B5EF4-FFF2-40B4-BE49-F238E27FC236}">
-                <a16:creationId xmlns:a16="http://schemas.microsoft.com/office/drawing/2014/main" id="{665E7336-ECCD-241B-F36B-FFD471A34438}"/>
+          <p:cNvPr id="11" name="Picture 10">
+            <a:extLst>
+              <a:ext uri="{FF2B5EF4-FFF2-40B4-BE49-F238E27FC236}">
+                <a16:creationId xmlns:a16="http://schemas.microsoft.com/office/drawing/2014/main" id="{20765FAA-1CB6-8114-1A48-B4B559DE4BCD}"/>
               </a:ext>
             </a:extLst>
           </p:cNvPr>
@@ -3375,76 +3375,6 @@
         </p:nvPicPr>
         <p:blipFill>
           <a:blip r:embed="rId2">
-            <a:extLst>
-              <a:ext uri="{28A0092B-C50C-407E-A947-70E740481C1C}">
-                <a14:useLocalDpi xmlns:a14="http://schemas.microsoft.com/office/drawing/2010/main" val="0"/>
-              </a:ext>
-            </a:extLst>
-          </a:blip>
-          <a:srcRect/>
-          <a:stretch/>
-        </p:blipFill>
-        <p:spPr>
-          <a:xfrm>
-            <a:off x="1529950" y="0"/>
-            <a:ext cx="2889796" cy="6771611"/>
-          </a:xfrm>
-          <a:prstGeom prst="rect">
-            <a:avLst/>
-          </a:prstGeom>
-        </p:spPr>
-      </p:pic>
-      <p:pic>
-        <p:nvPicPr>
-          <p:cNvPr id="9" name="Picture 8">
-            <a:extLst>
-              <a:ext uri="{FF2B5EF4-FFF2-40B4-BE49-F238E27FC236}">
-                <a16:creationId xmlns:a16="http://schemas.microsoft.com/office/drawing/2014/main" id="{A9020683-ECB2-C371-54C4-0AF0068E272D}"/>
-              </a:ext>
-            </a:extLst>
-          </p:cNvPr>
-          <p:cNvPicPr>
-            <a:picLocks noChangeAspect="1"/>
-          </p:cNvPicPr>
-          <p:nvPr/>
-        </p:nvPicPr>
-        <p:blipFill>
-          <a:blip r:embed="rId3">
-            <a:extLst>
-              <a:ext uri="{28A0092B-C50C-407E-A947-70E740481C1C}">
-                <a14:useLocalDpi xmlns:a14="http://schemas.microsoft.com/office/drawing/2010/main" val="0"/>
-              </a:ext>
-            </a:extLst>
-          </a:blip>
-          <a:srcRect/>
-          <a:stretch/>
-        </p:blipFill>
-        <p:spPr>
-          <a:xfrm>
-            <a:off x="5055885" y="0"/>
-            <a:ext cx="2548694" cy="6858000"/>
-          </a:xfrm>
-          <a:prstGeom prst="rect">
-            <a:avLst/>
-          </a:prstGeom>
-        </p:spPr>
-      </p:pic>
-      <p:pic>
-        <p:nvPicPr>
-          <p:cNvPr id="11" name="Picture 10">
-            <a:extLst>
-              <a:ext uri="{FF2B5EF4-FFF2-40B4-BE49-F238E27FC236}">
-                <a16:creationId xmlns:a16="http://schemas.microsoft.com/office/drawing/2014/main" id="{20765FAA-1CB6-8114-1A48-B4B559DE4BCD}"/>
-              </a:ext>
-            </a:extLst>
-          </p:cNvPr>
-          <p:cNvPicPr>
-            <a:picLocks noChangeAspect="1"/>
-          </p:cNvPicPr>
-          <p:nvPr/>
-        </p:nvPicPr>
-        <p:blipFill>
-          <a:blip r:embed="rId4">
             <a:extLst>
               <a:ext uri="{28A0092B-C50C-407E-A947-70E740481C1C}">
                 <a14:useLocalDpi xmlns:a14="http://schemas.microsoft.com/office/drawing/2010/main" val="0"/>
@@ -3500,64 +3430,155 @@
           </a:p>
         </p:txBody>
       </p:sp>
-      <p:pic>
-        <p:nvPicPr>
-          <p:cNvPr id="15" name="Picture 14">
-            <a:extLst>
-              <a:ext uri="{FF2B5EF4-FFF2-40B4-BE49-F238E27FC236}">
-                <a16:creationId xmlns:a16="http://schemas.microsoft.com/office/drawing/2014/main" id="{7B19EC38-1BF3-A718-0585-A574FB2C3710}"/>
-              </a:ext>
-            </a:extLst>
-          </p:cNvPr>
-          <p:cNvPicPr>
-            <a:picLocks noChangeAspect="1"/>
-          </p:cNvPicPr>
+      <p:grpSp>
+        <p:nvGrpSpPr>
+          <p:cNvPr id="3" name="Group 2">
+            <a:extLst>
+              <a:ext uri="{FF2B5EF4-FFF2-40B4-BE49-F238E27FC236}">
+                <a16:creationId xmlns:a16="http://schemas.microsoft.com/office/drawing/2014/main" id="{37214860-404B-19A8-2856-460C47BABD8A}"/>
+              </a:ext>
+            </a:extLst>
+          </p:cNvPr>
+          <p:cNvGrpSpPr/>
           <p:nvPr/>
-        </p:nvPicPr>
-        <p:blipFill rotWithShape="1">
-          <a:blip r:embed="rId5"/>
-          <a:srcRect t="21251"/>
-          <a:stretch/>
-        </p:blipFill>
-        <p:spPr>
+        </p:nvGrpSpPr>
+        <p:grpSpPr>
           <a:xfrm>
-            <a:off x="2974848" y="1201976"/>
-            <a:ext cx="1165895" cy="675780"/>
+            <a:off x="2166089" y="0"/>
+            <a:ext cx="5669410" cy="6868568"/>
+            <a:chOff x="2166089" y="0"/>
+            <a:chExt cx="5669410" cy="6868568"/>
           </a:xfrm>
-          <a:prstGeom prst="rect">
-            <a:avLst/>
-          </a:prstGeom>
-        </p:spPr>
-      </p:pic>
-      <p:pic>
-        <p:nvPicPr>
-          <p:cNvPr id="17" name="Picture 16">
-            <a:extLst>
-              <a:ext uri="{FF2B5EF4-FFF2-40B4-BE49-F238E27FC236}">
-                <a16:creationId xmlns:a16="http://schemas.microsoft.com/office/drawing/2014/main" id="{B8B3546C-DCE6-5B2E-9F3C-00080D8CDB82}"/>
-              </a:ext>
-            </a:extLst>
-          </p:cNvPr>
-          <p:cNvPicPr>
-            <a:picLocks noChangeAspect="1"/>
-          </p:cNvPicPr>
-          <p:nvPr/>
-        </p:nvPicPr>
-        <p:blipFill rotWithShape="1">
-          <a:blip r:embed="rId6"/>
-          <a:srcRect b="50000"/>
-          <a:stretch/>
-        </p:blipFill>
-        <p:spPr>
-          <a:xfrm>
-            <a:off x="6790966" y="1522758"/>
-            <a:ext cx="1246610" cy="186991"/>
-          </a:xfrm>
-          <a:prstGeom prst="rect">
-            <a:avLst/>
-          </a:prstGeom>
-        </p:spPr>
-      </p:pic>
+        </p:grpSpPr>
+        <p:pic>
+          <p:nvPicPr>
+            <p:cNvPr id="7" name="Picture 6">
+              <a:extLst>
+                <a:ext uri="{FF2B5EF4-FFF2-40B4-BE49-F238E27FC236}">
+                  <a16:creationId xmlns:a16="http://schemas.microsoft.com/office/drawing/2014/main" id="{665E7336-ECCD-241B-F36B-FFD471A34438}"/>
+                </a:ext>
+              </a:extLst>
+            </p:cNvPr>
+            <p:cNvPicPr>
+              <a:picLocks noChangeAspect="1"/>
+            </p:cNvPicPr>
+            <p:nvPr/>
+          </p:nvPicPr>
+          <p:blipFill>
+            <a:blip r:embed="rId3">
+              <a:extLst>
+                <a:ext uri="{28A0092B-C50C-407E-A947-70E740481C1C}">
+                  <a14:useLocalDpi xmlns:a14="http://schemas.microsoft.com/office/drawing/2010/main" val="0"/>
+                </a:ext>
+              </a:extLst>
+            </a:blip>
+            <a:srcRect/>
+            <a:stretch/>
+          </p:blipFill>
+          <p:spPr>
+            <a:xfrm>
+              <a:off x="2166089" y="0"/>
+              <a:ext cx="2889796" cy="6771611"/>
+            </a:xfrm>
+            <a:prstGeom prst="rect">
+              <a:avLst/>
+            </a:prstGeom>
+          </p:spPr>
+        </p:pic>
+        <p:pic>
+          <p:nvPicPr>
+            <p:cNvPr id="9" name="Picture 8">
+              <a:extLst>
+                <a:ext uri="{FF2B5EF4-FFF2-40B4-BE49-F238E27FC236}">
+                  <a16:creationId xmlns:a16="http://schemas.microsoft.com/office/drawing/2014/main" id="{A9020683-ECB2-C371-54C4-0AF0068E272D}"/>
+                </a:ext>
+              </a:extLst>
+            </p:cNvPr>
+            <p:cNvPicPr>
+              <a:picLocks noChangeAspect="1"/>
+            </p:cNvPicPr>
+            <p:nvPr/>
+          </p:nvPicPr>
+          <p:blipFill>
+            <a:blip r:embed="rId4">
+              <a:extLst>
+                <a:ext uri="{28A0092B-C50C-407E-A947-70E740481C1C}">
+                  <a14:useLocalDpi xmlns:a14="http://schemas.microsoft.com/office/drawing/2010/main" val="0"/>
+                </a:ext>
+              </a:extLst>
+            </a:blip>
+            <a:srcRect/>
+            <a:stretch/>
+          </p:blipFill>
+          <p:spPr>
+            <a:xfrm>
+              <a:off x="5055885" y="10568"/>
+              <a:ext cx="2548694" cy="6858000"/>
+            </a:xfrm>
+            <a:prstGeom prst="rect">
+              <a:avLst/>
+            </a:prstGeom>
+          </p:spPr>
+        </p:pic>
+        <p:pic>
+          <p:nvPicPr>
+            <p:cNvPr id="15" name="Picture 14">
+              <a:extLst>
+                <a:ext uri="{FF2B5EF4-FFF2-40B4-BE49-F238E27FC236}">
+                  <a16:creationId xmlns:a16="http://schemas.microsoft.com/office/drawing/2014/main" id="{7B19EC38-1BF3-A718-0585-A574FB2C3710}"/>
+                </a:ext>
+              </a:extLst>
+            </p:cNvPr>
+            <p:cNvPicPr>
+              <a:picLocks noChangeAspect="1"/>
+            </p:cNvPicPr>
+            <p:nvPr/>
+          </p:nvPicPr>
+          <p:blipFill rotWithShape="1">
+            <a:blip r:embed="rId5"/>
+            <a:srcRect t="21251"/>
+            <a:stretch/>
+          </p:blipFill>
+          <p:spPr>
+            <a:xfrm>
+              <a:off x="3889990" y="1184868"/>
+              <a:ext cx="1165895" cy="675780"/>
+            </a:xfrm>
+            <a:prstGeom prst="rect">
+              <a:avLst/>
+            </a:prstGeom>
+          </p:spPr>
+        </p:pic>
+        <p:pic>
+          <p:nvPicPr>
+            <p:cNvPr id="17" name="Picture 16">
+              <a:extLst>
+                <a:ext uri="{FF2B5EF4-FFF2-40B4-BE49-F238E27FC236}">
+                  <a16:creationId xmlns:a16="http://schemas.microsoft.com/office/drawing/2014/main" id="{B8B3546C-DCE6-5B2E-9F3C-00080D8CDB82}"/>
+                </a:ext>
+              </a:extLst>
+            </p:cNvPr>
+            <p:cNvPicPr>
+              <a:picLocks noChangeAspect="1"/>
+            </p:cNvPicPr>
+            <p:nvPr/>
+          </p:nvPicPr>
+          <p:blipFill rotWithShape="1">
+            <a:blip r:embed="rId6"/>
+            <a:srcRect b="50000"/>
+            <a:stretch/>
+          </p:blipFill>
+          <p:spPr>
+            <a:xfrm>
+              <a:off x="6588889" y="1184868"/>
+              <a:ext cx="1246610" cy="186991"/>
+            </a:xfrm>
+            <a:prstGeom prst="rect">
+              <a:avLst/>
+            </a:prstGeom>
+          </p:spPr>
+        </p:pic>
+      </p:grpSp>
     </p:spTree>
     <p:extLst>
       <p:ext uri="{BB962C8B-B14F-4D97-AF65-F5344CB8AC3E}">
@@ -3767,106 +3788,178 @@
           </a:p>
         </p:txBody>
       </p:sp>
-      <p:pic>
-        <p:nvPicPr>
-          <p:cNvPr id="6" name="Picture 5">
-            <a:extLst>
-              <a:ext uri="{FF2B5EF4-FFF2-40B4-BE49-F238E27FC236}">
-                <a16:creationId xmlns:a16="http://schemas.microsoft.com/office/drawing/2014/main" id="{F7F7D66D-1AC8-69C2-6191-20A1C4CA0BB1}"/>
-              </a:ext>
-            </a:extLst>
-          </p:cNvPr>
-          <p:cNvPicPr>
-            <a:picLocks noChangeAspect="1"/>
-          </p:cNvPicPr>
+      <p:grpSp>
+        <p:nvGrpSpPr>
+          <p:cNvPr id="3" name="Group 2">
+            <a:extLst>
+              <a:ext uri="{FF2B5EF4-FFF2-40B4-BE49-F238E27FC236}">
+                <a16:creationId xmlns:a16="http://schemas.microsoft.com/office/drawing/2014/main" id="{B23767D1-1E89-510B-ABC5-810A087E5A12}"/>
+              </a:ext>
+            </a:extLst>
+          </p:cNvPr>
+          <p:cNvGrpSpPr/>
           <p:nvPr/>
-        </p:nvPicPr>
-        <p:blipFill>
-          <a:blip r:embed="rId2">
-            <a:extLst>
-              <a:ext uri="{28A0092B-C50C-407E-A947-70E740481C1C}">
-                <a14:useLocalDpi xmlns:a14="http://schemas.microsoft.com/office/drawing/2010/main" val="0"/>
-              </a:ext>
-            </a:extLst>
-          </a:blip>
-          <a:srcRect/>
-          <a:stretch/>
-        </p:blipFill>
-        <p:spPr>
+        </p:nvGrpSpPr>
+        <p:grpSpPr>
           <a:xfrm>
-            <a:off x="789463" y="0"/>
+            <a:off x="356527" y="48430"/>
             <a:ext cx="5688543" cy="4134116"/>
+            <a:chOff x="356527" y="48430"/>
+            <a:chExt cx="5688543" cy="4134116"/>
           </a:xfrm>
-          <a:prstGeom prst="rect">
-            <a:avLst/>
-          </a:prstGeom>
-        </p:spPr>
-      </p:pic>
-      <p:pic>
-        <p:nvPicPr>
-          <p:cNvPr id="10" name="Picture 9">
-            <a:extLst>
-              <a:ext uri="{FF2B5EF4-FFF2-40B4-BE49-F238E27FC236}">
-                <a16:creationId xmlns:a16="http://schemas.microsoft.com/office/drawing/2014/main" id="{A20AC2D2-208D-C93C-0C61-CAA5AF15DAE0}"/>
-              </a:ext>
-            </a:extLst>
-          </p:cNvPr>
-          <p:cNvPicPr>
-            <a:picLocks noChangeAspect="1"/>
-          </p:cNvPicPr>
+        </p:grpSpPr>
+        <p:pic>
+          <p:nvPicPr>
+            <p:cNvPr id="6" name="Picture 5">
+              <a:extLst>
+                <a:ext uri="{FF2B5EF4-FFF2-40B4-BE49-F238E27FC236}">
+                  <a16:creationId xmlns:a16="http://schemas.microsoft.com/office/drawing/2014/main" id="{F7F7D66D-1AC8-69C2-6191-20A1C4CA0BB1}"/>
+                </a:ext>
+              </a:extLst>
+            </p:cNvPr>
+            <p:cNvPicPr>
+              <a:picLocks noChangeAspect="1"/>
+            </p:cNvPicPr>
+            <p:nvPr/>
+          </p:nvPicPr>
+          <p:blipFill>
+            <a:blip r:embed="rId2">
+              <a:extLst>
+                <a:ext uri="{28A0092B-C50C-407E-A947-70E740481C1C}">
+                  <a14:useLocalDpi xmlns:a14="http://schemas.microsoft.com/office/drawing/2010/main" val="0"/>
+                </a:ext>
+              </a:extLst>
+            </a:blip>
+            <a:srcRect/>
+            <a:stretch/>
+          </p:blipFill>
+          <p:spPr>
+            <a:xfrm>
+              <a:off x="356527" y="48430"/>
+              <a:ext cx="5688543" cy="4134116"/>
+            </a:xfrm>
+            <a:prstGeom prst="rect">
+              <a:avLst/>
+            </a:prstGeom>
+          </p:spPr>
+        </p:pic>
+        <p:pic>
+          <p:nvPicPr>
+            <p:cNvPr id="14" name="Picture 13">
+              <a:extLst>
+                <a:ext uri="{FF2B5EF4-FFF2-40B4-BE49-F238E27FC236}">
+                  <a16:creationId xmlns:a16="http://schemas.microsoft.com/office/drawing/2014/main" id="{BF22C5C4-E5BE-11E9-C4CC-5C19BF29DE02}"/>
+                </a:ext>
+              </a:extLst>
+            </p:cNvPr>
+            <p:cNvPicPr>
+              <a:picLocks noChangeAspect="1"/>
+            </p:cNvPicPr>
+            <p:nvPr/>
+          </p:nvPicPr>
+          <p:blipFill>
+            <a:blip r:embed="rId3"/>
+            <a:stretch>
+              <a:fillRect/>
+            </a:stretch>
+          </p:blipFill>
+          <p:spPr>
+            <a:xfrm>
+              <a:off x="5511649" y="1414010"/>
+              <a:ext cx="513654" cy="1011860"/>
+            </a:xfrm>
+            <a:prstGeom prst="rect">
+              <a:avLst/>
+            </a:prstGeom>
+          </p:spPr>
+        </p:pic>
+      </p:grpSp>
+      <p:grpSp>
+        <p:nvGrpSpPr>
+          <p:cNvPr id="4" name="Group 3">
+            <a:extLst>
+              <a:ext uri="{FF2B5EF4-FFF2-40B4-BE49-F238E27FC236}">
+                <a16:creationId xmlns:a16="http://schemas.microsoft.com/office/drawing/2014/main" id="{90338ACB-A224-CCD4-267D-ECADAC42E236}"/>
+              </a:ext>
+            </a:extLst>
+          </p:cNvPr>
+          <p:cNvGrpSpPr/>
           <p:nvPr/>
-        </p:nvPicPr>
-        <p:blipFill>
-          <a:blip r:embed="rId3">
-            <a:extLst>
-              <a:ext uri="{28A0092B-C50C-407E-A947-70E740481C1C}">
-                <a14:useLocalDpi xmlns:a14="http://schemas.microsoft.com/office/drawing/2010/main" val="0"/>
-              </a:ext>
-            </a:extLst>
-          </a:blip>
-          <a:srcRect/>
-          <a:stretch/>
-        </p:blipFill>
-        <p:spPr>
+        </p:nvGrpSpPr>
+        <p:grpSpPr>
           <a:xfrm>
-            <a:off x="4153828" y="2398438"/>
+            <a:off x="4776562" y="2622083"/>
             <a:ext cx="5709199" cy="4187487"/>
+            <a:chOff x="4776562" y="2622083"/>
+            <a:chExt cx="5709199" cy="4187487"/>
           </a:xfrm>
-          <a:prstGeom prst="rect">
-            <a:avLst/>
-          </a:prstGeom>
-        </p:spPr>
-      </p:pic>
-      <p:pic>
-        <p:nvPicPr>
-          <p:cNvPr id="14" name="Picture 13">
-            <a:extLst>
-              <a:ext uri="{FF2B5EF4-FFF2-40B4-BE49-F238E27FC236}">
-                <a16:creationId xmlns:a16="http://schemas.microsoft.com/office/drawing/2014/main" id="{BF22C5C4-E5BE-11E9-C4CC-5C19BF29DE02}"/>
-              </a:ext>
-            </a:extLst>
-          </p:cNvPr>
-          <p:cNvPicPr>
-            <a:picLocks noChangeAspect="1"/>
-          </p:cNvPicPr>
-          <p:nvPr/>
-        </p:nvPicPr>
-        <p:blipFill>
-          <a:blip r:embed="rId4"/>
-          <a:stretch>
-            <a:fillRect/>
-          </a:stretch>
-        </p:blipFill>
-        <p:spPr>
-          <a:xfrm>
-            <a:off x="10062491" y="103708"/>
-            <a:ext cx="1267002" cy="2495898"/>
-          </a:xfrm>
-          <a:prstGeom prst="rect">
-            <a:avLst/>
-          </a:prstGeom>
-        </p:spPr>
-      </p:pic>
+        </p:grpSpPr>
+        <p:pic>
+          <p:nvPicPr>
+            <p:cNvPr id="10" name="Picture 9">
+              <a:extLst>
+                <a:ext uri="{FF2B5EF4-FFF2-40B4-BE49-F238E27FC236}">
+                  <a16:creationId xmlns:a16="http://schemas.microsoft.com/office/drawing/2014/main" id="{A20AC2D2-208D-C93C-0C61-CAA5AF15DAE0}"/>
+                </a:ext>
+              </a:extLst>
+            </p:cNvPr>
+            <p:cNvPicPr>
+              <a:picLocks noChangeAspect="1"/>
+            </p:cNvPicPr>
+            <p:nvPr/>
+          </p:nvPicPr>
+          <p:blipFill>
+            <a:blip r:embed="rId4">
+              <a:extLst>
+                <a:ext uri="{28A0092B-C50C-407E-A947-70E740481C1C}">
+                  <a14:useLocalDpi xmlns:a14="http://schemas.microsoft.com/office/drawing/2010/main" val="0"/>
+                </a:ext>
+              </a:extLst>
+            </a:blip>
+            <a:srcRect/>
+            <a:stretch/>
+          </p:blipFill>
+          <p:spPr>
+            <a:xfrm>
+              <a:off x="4776562" y="2622083"/>
+              <a:ext cx="5709199" cy="4187487"/>
+            </a:xfrm>
+            <a:prstGeom prst="rect">
+              <a:avLst/>
+            </a:prstGeom>
+          </p:spPr>
+        </p:pic>
+        <p:pic>
+          <p:nvPicPr>
+            <p:cNvPr id="2" name="Picture 1">
+              <a:extLst>
+                <a:ext uri="{FF2B5EF4-FFF2-40B4-BE49-F238E27FC236}">
+                  <a16:creationId xmlns:a16="http://schemas.microsoft.com/office/drawing/2014/main" id="{31555C20-B756-05DA-DF12-C8B2ABE504CE}"/>
+                </a:ext>
+              </a:extLst>
+            </p:cNvPr>
+            <p:cNvPicPr>
+              <a:picLocks noChangeAspect="1"/>
+            </p:cNvPicPr>
+            <p:nvPr/>
+          </p:nvPicPr>
+          <p:blipFill>
+            <a:blip r:embed="rId3"/>
+            <a:stretch>
+              <a:fillRect/>
+            </a:stretch>
+          </p:blipFill>
+          <p:spPr>
+            <a:xfrm>
+              <a:off x="7886398" y="3962176"/>
+              <a:ext cx="513654" cy="1011860"/>
+            </a:xfrm>
+            <a:prstGeom prst="rect">
+              <a:avLst/>
+            </a:prstGeom>
+          </p:spPr>
+        </p:pic>
+      </p:grpSp>
     </p:spTree>
     <p:extLst>
       <p:ext uri="{BB962C8B-B14F-4D97-AF65-F5344CB8AC3E}">
@@ -3877,126 +3970,6 @@
   <p:clrMapOvr>
     <a:masterClrMapping/>
   </p:clrMapOvr>
-  <p:timing>
-    <p:tnLst>
-      <p:par>
-        <p:cTn id="1" dur="indefinite" restart="never" nodeType="tmRoot">
-          <p:childTnLst>
-            <p:seq concurrent="1" nextAc="seek">
-              <p:cTn id="2" dur="indefinite" nodeType="mainSeq">
-                <p:childTnLst>
-                  <p:par>
-                    <p:cTn id="3" fill="hold">
-                      <p:stCondLst>
-                        <p:cond delay="indefinite"/>
-                      </p:stCondLst>
-                      <p:childTnLst>
-                        <p:par>
-                          <p:cTn id="4" fill="hold">
-                            <p:stCondLst>
-                              <p:cond delay="0"/>
-                            </p:stCondLst>
-                            <p:childTnLst>
-                              <p:par>
-                                <p:cTn id="5" presetID="1" presetClass="entr" presetSubtype="0" fill="hold" nodeType="clickEffect">
-                                  <p:stCondLst>
-                                    <p:cond delay="0"/>
-                                  </p:stCondLst>
-                                  <p:childTnLst>
-                                    <p:set>
-                                      <p:cBhvr>
-                                        <p:cTn id="6" dur="1" fill="hold">
-                                          <p:stCondLst>
-                                            <p:cond delay="0"/>
-                                          </p:stCondLst>
-                                        </p:cTn>
-                                        <p:tgtEl>
-                                          <p:spTgt spid="6"/>
-                                        </p:tgtEl>
-                                        <p:attrNameLst>
-                                          <p:attrName>style.visibility</p:attrName>
-                                        </p:attrNameLst>
-                                      </p:cBhvr>
-                                      <p:to>
-                                        <p:strVal val="visible"/>
-                                      </p:to>
-                                    </p:set>
-                                  </p:childTnLst>
-                                </p:cTn>
-                              </p:par>
-                            </p:childTnLst>
-                          </p:cTn>
-                        </p:par>
-                      </p:childTnLst>
-                    </p:cTn>
-                  </p:par>
-                  <p:par>
-                    <p:cTn id="7" fill="hold">
-                      <p:stCondLst>
-                        <p:cond delay="indefinite"/>
-                      </p:stCondLst>
-                      <p:childTnLst>
-                        <p:par>
-                          <p:cTn id="8" fill="hold">
-                            <p:stCondLst>
-                              <p:cond delay="0"/>
-                            </p:stCondLst>
-                            <p:childTnLst>
-                              <p:par>
-                                <p:cTn id="9" presetID="1" presetClass="entr" presetSubtype="0" fill="hold" nodeType="clickEffect">
-                                  <p:stCondLst>
-                                    <p:cond delay="0"/>
-                                  </p:stCondLst>
-                                  <p:childTnLst>
-                                    <p:set>
-                                      <p:cBhvr>
-                                        <p:cTn id="10" dur="1" fill="hold">
-                                          <p:stCondLst>
-                                            <p:cond delay="0"/>
-                                          </p:stCondLst>
-                                        </p:cTn>
-                                        <p:tgtEl>
-                                          <p:spTgt spid="10"/>
-                                        </p:tgtEl>
-                                        <p:attrNameLst>
-                                          <p:attrName>style.visibility</p:attrName>
-                                        </p:attrNameLst>
-                                      </p:cBhvr>
-                                      <p:to>
-                                        <p:strVal val="visible"/>
-                                      </p:to>
-                                    </p:set>
-                                  </p:childTnLst>
-                                </p:cTn>
-                              </p:par>
-                            </p:childTnLst>
-                          </p:cTn>
-                        </p:par>
-                      </p:childTnLst>
-                    </p:cTn>
-                  </p:par>
-                </p:childTnLst>
-              </p:cTn>
-              <p:prevCondLst>
-                <p:cond evt="onPrev" delay="0">
-                  <p:tgtEl>
-                    <p:sldTgt/>
-                  </p:tgtEl>
-                </p:cond>
-              </p:prevCondLst>
-              <p:nextCondLst>
-                <p:cond evt="onNext" delay="0">
-                  <p:tgtEl>
-                    <p:sldTgt/>
-                  </p:tgtEl>
-                </p:cond>
-              </p:nextCondLst>
-            </p:seq>
-          </p:childTnLst>
-        </p:cTn>
-      </p:par>
-    </p:tnLst>
-  </p:timing>
 </p:sld>
 </file>
 
@@ -4017,95 +3990,171 @@
           <a:chExt cx="0" cy="0"/>
         </a:xfrm>
       </p:grpSpPr>
-      <p:pic>
-        <p:nvPicPr>
-          <p:cNvPr id="5" name="Picture 4">
-            <a:extLst>
-              <a:ext uri="{FF2B5EF4-FFF2-40B4-BE49-F238E27FC236}">
-                <a16:creationId xmlns:a16="http://schemas.microsoft.com/office/drawing/2014/main" id="{A135A028-A28F-B741-5FD8-0050C12E8D53}"/>
-              </a:ext>
-            </a:extLst>
-          </p:cNvPr>
-          <p:cNvPicPr>
-            <a:picLocks noChangeAspect="1"/>
-          </p:cNvPicPr>
+      <p:grpSp>
+        <p:nvGrpSpPr>
+          <p:cNvPr id="4" name="Group 3">
+            <a:extLst>
+              <a:ext uri="{FF2B5EF4-FFF2-40B4-BE49-F238E27FC236}">
+                <a16:creationId xmlns:a16="http://schemas.microsoft.com/office/drawing/2014/main" id="{0AC7B62E-0045-0A77-FE05-A52F13399535}"/>
+              </a:ext>
+            </a:extLst>
+          </p:cNvPr>
+          <p:cNvGrpSpPr/>
           <p:nvPr/>
-        </p:nvPicPr>
-        <p:blipFill>
-          <a:blip r:embed="rId2"/>
-          <a:stretch>
-            <a:fillRect/>
-          </a:stretch>
-        </p:blipFill>
-        <p:spPr>
+        </p:nvGrpSpPr>
+        <p:grpSpPr>
           <a:xfrm>
-            <a:off x="0" y="718458"/>
+            <a:off x="5991998" y="1054697"/>
+            <a:ext cx="6200001" cy="4459358"/>
+            <a:chOff x="5991998" y="1054697"/>
+            <a:chExt cx="6200001" cy="4459358"/>
+          </a:xfrm>
+        </p:grpSpPr>
+        <p:pic>
+          <p:nvPicPr>
+            <p:cNvPr id="7" name="Picture 6">
+              <a:extLst>
+                <a:ext uri="{FF2B5EF4-FFF2-40B4-BE49-F238E27FC236}">
+                  <a16:creationId xmlns:a16="http://schemas.microsoft.com/office/drawing/2014/main" id="{A71B505F-5768-C046-7F1E-0B8004FC38E8}"/>
+                </a:ext>
+              </a:extLst>
+            </p:cNvPr>
+            <p:cNvPicPr>
+              <a:picLocks noChangeAspect="1"/>
+            </p:cNvPicPr>
+            <p:nvPr/>
+          </p:nvPicPr>
+          <p:blipFill>
+            <a:blip r:embed="rId2">
+              <a:extLst>
+                <a:ext uri="{28A0092B-C50C-407E-A947-70E740481C1C}">
+                  <a14:useLocalDpi xmlns:a14="http://schemas.microsoft.com/office/drawing/2010/main" val="0"/>
+                </a:ext>
+              </a:extLst>
+            </a:blip>
+            <a:srcRect/>
+            <a:stretch/>
+          </p:blipFill>
+          <p:spPr>
+            <a:xfrm>
+              <a:off x="5991998" y="1054697"/>
+              <a:ext cx="6200001" cy="4459358"/>
+            </a:xfrm>
+            <a:prstGeom prst="rect">
+              <a:avLst/>
+            </a:prstGeom>
+          </p:spPr>
+        </p:pic>
+        <p:pic>
+          <p:nvPicPr>
+            <p:cNvPr id="9" name="Picture 8">
+              <a:extLst>
+                <a:ext uri="{FF2B5EF4-FFF2-40B4-BE49-F238E27FC236}">
+                  <a16:creationId xmlns:a16="http://schemas.microsoft.com/office/drawing/2014/main" id="{B2876AE8-92D2-C5D1-970D-44407EF9E5DB}"/>
+                </a:ext>
+              </a:extLst>
+            </p:cNvPr>
+            <p:cNvPicPr>
+              <a:picLocks noChangeAspect="1"/>
+            </p:cNvPicPr>
+            <p:nvPr/>
+          </p:nvPicPr>
+          <p:blipFill rotWithShape="1">
+            <a:blip r:embed="rId3"/>
+            <a:srcRect l="890" b="1755"/>
+            <a:stretch/>
+          </p:blipFill>
+          <p:spPr>
+            <a:xfrm>
+              <a:off x="7412831" y="1633674"/>
+              <a:ext cx="1502569" cy="488997"/>
+            </a:xfrm>
+            <a:prstGeom prst="rect">
+              <a:avLst/>
+            </a:prstGeom>
+          </p:spPr>
+        </p:pic>
+      </p:grpSp>
+      <p:grpSp>
+        <p:nvGrpSpPr>
+          <p:cNvPr id="3" name="Group 2">
+            <a:extLst>
+              <a:ext uri="{FF2B5EF4-FFF2-40B4-BE49-F238E27FC236}">
+                <a16:creationId xmlns:a16="http://schemas.microsoft.com/office/drawing/2014/main" id="{7138012E-BBB3-0299-BDE9-C073CA804B0C}"/>
+              </a:ext>
+            </a:extLst>
+          </p:cNvPr>
+          <p:cNvGrpSpPr/>
+          <p:nvPr/>
+        </p:nvGrpSpPr>
+        <p:grpSpPr>
+          <a:xfrm>
+            <a:off x="0" y="732372"/>
             <a:ext cx="6078178" cy="5131837"/>
+            <a:chOff x="0" y="718458"/>
+            <a:chExt cx="6078178" cy="5131837"/>
           </a:xfrm>
-          <a:prstGeom prst="rect">
-            <a:avLst/>
-          </a:prstGeom>
-        </p:spPr>
-      </p:pic>
-      <p:pic>
-        <p:nvPicPr>
-          <p:cNvPr id="7" name="Picture 6">
-            <a:extLst>
-              <a:ext uri="{FF2B5EF4-FFF2-40B4-BE49-F238E27FC236}">
-                <a16:creationId xmlns:a16="http://schemas.microsoft.com/office/drawing/2014/main" id="{A71B505F-5768-C046-7F1E-0B8004FC38E8}"/>
-              </a:ext>
-            </a:extLst>
-          </p:cNvPr>
-          <p:cNvPicPr>
-            <a:picLocks noChangeAspect="1"/>
-          </p:cNvPicPr>
-          <p:nvPr/>
-        </p:nvPicPr>
-        <p:blipFill>
-          <a:blip r:embed="rId3"/>
-          <a:stretch>
-            <a:fillRect/>
-          </a:stretch>
-        </p:blipFill>
-        <p:spPr>
-          <a:xfrm>
-            <a:off x="5991998" y="718458"/>
-            <a:ext cx="6200001" cy="5131837"/>
-          </a:xfrm>
-          <a:prstGeom prst="rect">
-            <a:avLst/>
-          </a:prstGeom>
-        </p:spPr>
-      </p:pic>
-      <p:pic>
-        <p:nvPicPr>
-          <p:cNvPr id="9" name="Picture 8">
-            <a:extLst>
-              <a:ext uri="{FF2B5EF4-FFF2-40B4-BE49-F238E27FC236}">
-                <a16:creationId xmlns:a16="http://schemas.microsoft.com/office/drawing/2014/main" id="{B2876AE8-92D2-C5D1-970D-44407EF9E5DB}"/>
-              </a:ext>
-            </a:extLst>
-          </p:cNvPr>
-          <p:cNvPicPr>
-            <a:picLocks noChangeAspect="1"/>
-          </p:cNvPicPr>
-          <p:nvPr/>
-        </p:nvPicPr>
-        <p:blipFill rotWithShape="1">
-          <a:blip r:embed="rId4"/>
-          <a:srcRect l="890" b="1755"/>
-          <a:stretch/>
-        </p:blipFill>
-        <p:spPr>
-          <a:xfrm>
-            <a:off x="7412831" y="1633674"/>
-            <a:ext cx="2501995" cy="814251"/>
-          </a:xfrm>
-          <a:prstGeom prst="rect">
-            <a:avLst/>
-          </a:prstGeom>
-        </p:spPr>
-      </p:pic>
+        </p:grpSpPr>
+        <p:pic>
+          <p:nvPicPr>
+            <p:cNvPr id="5" name="Picture 4">
+              <a:extLst>
+                <a:ext uri="{FF2B5EF4-FFF2-40B4-BE49-F238E27FC236}">
+                  <a16:creationId xmlns:a16="http://schemas.microsoft.com/office/drawing/2014/main" id="{A135A028-A28F-B741-5FD8-0050C12E8D53}"/>
+                </a:ext>
+              </a:extLst>
+            </p:cNvPr>
+            <p:cNvPicPr>
+              <a:picLocks noChangeAspect="1"/>
+            </p:cNvPicPr>
+            <p:nvPr/>
+          </p:nvPicPr>
+          <p:blipFill>
+            <a:blip r:embed="rId4"/>
+            <a:stretch>
+              <a:fillRect/>
+            </a:stretch>
+          </p:blipFill>
+          <p:spPr>
+            <a:xfrm>
+              <a:off x="0" y="718458"/>
+              <a:ext cx="6078178" cy="5131837"/>
+            </a:xfrm>
+            <a:prstGeom prst="rect">
+              <a:avLst/>
+            </a:prstGeom>
+          </p:spPr>
+        </p:pic>
+        <p:pic>
+          <p:nvPicPr>
+            <p:cNvPr id="2" name="Picture 1">
+              <a:extLst>
+                <a:ext uri="{FF2B5EF4-FFF2-40B4-BE49-F238E27FC236}">
+                  <a16:creationId xmlns:a16="http://schemas.microsoft.com/office/drawing/2014/main" id="{9514704E-2238-F80F-72D6-3B63F27A3ACA}"/>
+                </a:ext>
+              </a:extLst>
+            </p:cNvPr>
+            <p:cNvPicPr>
+              <a:picLocks noChangeAspect="1"/>
+            </p:cNvPicPr>
+            <p:nvPr/>
+          </p:nvPicPr>
+          <p:blipFill rotWithShape="1">
+            <a:blip r:embed="rId3"/>
+            <a:srcRect l="890" b="1755"/>
+            <a:stretch/>
+          </p:blipFill>
+          <p:spPr>
+            <a:xfrm>
+              <a:off x="4129141" y="1633674"/>
+              <a:ext cx="1534542" cy="499402"/>
+            </a:xfrm>
+            <a:prstGeom prst="rect">
+              <a:avLst/>
+            </a:prstGeom>
+          </p:spPr>
+        </p:pic>
+      </p:grpSp>
     </p:spTree>
     <p:extLst>
       <p:ext uri="{BB962C8B-B14F-4D97-AF65-F5344CB8AC3E}">
@@ -4186,7 +4235,7 @@
           <p:nvPr>
             <p:extLst>
               <p:ext uri="{D42A27DB-BD31-4B8C-83A1-F6EECF244321}">
-                <p14:modId xmlns:p14="http://schemas.microsoft.com/office/powerpoint/2010/main" val="1296858900"/>
+                <p14:modId xmlns:p14="http://schemas.microsoft.com/office/powerpoint/2010/main" val="1802614236"/>
               </p:ext>
             </p:extLst>
           </p:nvPr>
@@ -4674,16 +4723,30 @@
                     <a:bodyPr/>
                     <a:lstStyle/>
                     <a:p>
-                      <a:pPr algn="ctr" fontAlgn="b"/>
+                      <a:pPr marL="0" algn="ctr" defTabSz="914400" rtl="0" eaLnBrk="1" fontAlgn="b" latinLnBrk="0" hangingPunct="1"/>
                       <a:r>
-                        <a:rPr lang="en-DE" sz="1100" b="0" i="0" u="none" strike="noStrike">
+                        <a:rPr lang="en-GB" sz="1100" b="0" i="0" u="none" strike="noStrike" kern="1200" dirty="0">
                           <a:solidFill>
                             <a:srgbClr val="000000"/>
                           </a:solidFill>
                           <a:effectLst/>
                           <a:latin typeface="Calibri" panose="020F0502020204030204" pitchFamily="34" charset="0"/>
+                          <a:ea typeface="+mn-ea"/>
+                          <a:cs typeface="+mn-cs"/>
                         </a:rPr>
-                        <a:t>100%</a:t>
+                        <a:t>95</a:t>
+                      </a:r>
+                      <a:r>
+                        <a:rPr lang="en-DE" sz="1100" b="0" i="0" u="none" strike="noStrike" kern="1200" dirty="0">
+                          <a:solidFill>
+                            <a:srgbClr val="000000"/>
+                          </a:solidFill>
+                          <a:effectLst/>
+                          <a:latin typeface="Calibri" panose="020F0502020204030204" pitchFamily="34" charset="0"/>
+                          <a:ea typeface="+mn-ea"/>
+                          <a:cs typeface="+mn-cs"/>
+                        </a:rPr>
+                        <a:t>%</a:t>
                       </a:r>
                     </a:p>
                   </a:txBody>
@@ -5221,7 +5284,7 @@
                     <a:p>
                       <a:pPr algn="ctr" fontAlgn="b"/>
                       <a:r>
-                        <a:rPr lang="en-DE" sz="1100" b="0" i="0" u="none" strike="noStrike">
+                        <a:rPr lang="en-DE" sz="1100" b="0" i="0" u="none" strike="noStrike" dirty="0">
                           <a:solidFill>
                             <a:srgbClr val="000000"/>
                           </a:solidFill>
@@ -5781,106 +5844,178 @@
           </a:p>
         </p:txBody>
       </p:sp>
-      <p:pic>
-        <p:nvPicPr>
-          <p:cNvPr id="6" name="Picture 5">
-            <a:extLst>
-              <a:ext uri="{FF2B5EF4-FFF2-40B4-BE49-F238E27FC236}">
-                <a16:creationId xmlns:a16="http://schemas.microsoft.com/office/drawing/2014/main" id="{82FE952A-875B-3096-319D-9F497EDCB1B1}"/>
-              </a:ext>
-            </a:extLst>
-          </p:cNvPr>
-          <p:cNvPicPr>
-            <a:picLocks noChangeAspect="1"/>
-          </p:cNvPicPr>
+      <p:grpSp>
+        <p:nvGrpSpPr>
+          <p:cNvPr id="3" name="Group 2">
+            <a:extLst>
+              <a:ext uri="{FF2B5EF4-FFF2-40B4-BE49-F238E27FC236}">
+                <a16:creationId xmlns:a16="http://schemas.microsoft.com/office/drawing/2014/main" id="{DD9178E3-2074-7BA6-E189-CE72296EDB6A}"/>
+              </a:ext>
+            </a:extLst>
+          </p:cNvPr>
+          <p:cNvGrpSpPr/>
           <p:nvPr/>
-        </p:nvPicPr>
-        <p:blipFill>
-          <a:blip r:embed="rId2">
-            <a:extLst>
-              <a:ext uri="{28A0092B-C50C-407E-A947-70E740481C1C}">
-                <a14:useLocalDpi xmlns:a14="http://schemas.microsoft.com/office/drawing/2010/main" val="0"/>
-              </a:ext>
-            </a:extLst>
-          </a:blip>
-          <a:srcRect/>
-          <a:stretch/>
-        </p:blipFill>
-        <p:spPr>
+        </p:nvGrpSpPr>
+        <p:grpSpPr>
           <a:xfrm>
             <a:off x="862506" y="-1"/>
             <a:ext cx="7101917" cy="5175041"/>
+            <a:chOff x="862506" y="-1"/>
+            <a:chExt cx="7101917" cy="5175041"/>
           </a:xfrm>
-          <a:prstGeom prst="rect">
-            <a:avLst/>
-          </a:prstGeom>
-        </p:spPr>
-      </p:pic>
-      <p:pic>
-        <p:nvPicPr>
-          <p:cNvPr id="10" name="Picture 9">
-            <a:extLst>
-              <a:ext uri="{FF2B5EF4-FFF2-40B4-BE49-F238E27FC236}">
-                <a16:creationId xmlns:a16="http://schemas.microsoft.com/office/drawing/2014/main" id="{DCA74904-619B-BA6C-3B60-07387DF21255}"/>
-              </a:ext>
-            </a:extLst>
-          </p:cNvPr>
-          <p:cNvPicPr>
-            <a:picLocks noChangeAspect="1"/>
-          </p:cNvPicPr>
+        </p:grpSpPr>
+        <p:pic>
+          <p:nvPicPr>
+            <p:cNvPr id="6" name="Picture 5">
+              <a:extLst>
+                <a:ext uri="{FF2B5EF4-FFF2-40B4-BE49-F238E27FC236}">
+                  <a16:creationId xmlns:a16="http://schemas.microsoft.com/office/drawing/2014/main" id="{82FE952A-875B-3096-319D-9F497EDCB1B1}"/>
+                </a:ext>
+              </a:extLst>
+            </p:cNvPr>
+            <p:cNvPicPr>
+              <a:picLocks noChangeAspect="1"/>
+            </p:cNvPicPr>
+            <p:nvPr/>
+          </p:nvPicPr>
+          <p:blipFill>
+            <a:blip r:embed="rId2">
+              <a:extLst>
+                <a:ext uri="{28A0092B-C50C-407E-A947-70E740481C1C}">
+                  <a14:useLocalDpi xmlns:a14="http://schemas.microsoft.com/office/drawing/2010/main" val="0"/>
+                </a:ext>
+              </a:extLst>
+            </a:blip>
+            <a:srcRect/>
+            <a:stretch/>
+          </p:blipFill>
+          <p:spPr>
+            <a:xfrm>
+              <a:off x="862506" y="-1"/>
+              <a:ext cx="7101917" cy="5175041"/>
+            </a:xfrm>
+            <a:prstGeom prst="rect">
+              <a:avLst/>
+            </a:prstGeom>
+          </p:spPr>
+        </p:pic>
+        <p:pic>
+          <p:nvPicPr>
+            <p:cNvPr id="14" name="Picture 13">
+              <a:extLst>
+                <a:ext uri="{FF2B5EF4-FFF2-40B4-BE49-F238E27FC236}">
+                  <a16:creationId xmlns:a16="http://schemas.microsoft.com/office/drawing/2014/main" id="{6E278801-AEA4-78D0-072F-85307257564A}"/>
+                </a:ext>
+              </a:extLst>
+            </p:cNvPr>
+            <p:cNvPicPr>
+              <a:picLocks noChangeAspect="1"/>
+            </p:cNvPicPr>
+            <p:nvPr/>
+          </p:nvPicPr>
+          <p:blipFill>
+            <a:blip r:embed="rId3"/>
+            <a:stretch>
+              <a:fillRect/>
+            </a:stretch>
+          </p:blipFill>
+          <p:spPr>
+            <a:xfrm>
+              <a:off x="7103222" y="94564"/>
+              <a:ext cx="745744" cy="1469060"/>
+            </a:xfrm>
+            <a:prstGeom prst="rect">
+              <a:avLst/>
+            </a:prstGeom>
+          </p:spPr>
+        </p:pic>
+      </p:grpSp>
+      <p:grpSp>
+        <p:nvGrpSpPr>
+          <p:cNvPr id="4" name="Group 3">
+            <a:extLst>
+              <a:ext uri="{FF2B5EF4-FFF2-40B4-BE49-F238E27FC236}">
+                <a16:creationId xmlns:a16="http://schemas.microsoft.com/office/drawing/2014/main" id="{649A89BA-B56C-6E99-4625-0F03A858199A}"/>
+              </a:ext>
+            </a:extLst>
+          </p:cNvPr>
+          <p:cNvGrpSpPr/>
           <p:nvPr/>
-        </p:nvPicPr>
-        <p:blipFill>
-          <a:blip r:embed="rId3">
-            <a:extLst>
-              <a:ext uri="{28A0092B-C50C-407E-A947-70E740481C1C}">
-                <a14:useLocalDpi xmlns:a14="http://schemas.microsoft.com/office/drawing/2010/main" val="0"/>
-              </a:ext>
-            </a:extLst>
-          </a:blip>
-          <a:srcRect/>
-          <a:stretch/>
-        </p:blipFill>
-        <p:spPr>
+        </p:nvGrpSpPr>
+        <p:grpSpPr>
           <a:xfrm>
-            <a:off x="5129784" y="1869229"/>
-            <a:ext cx="6726653" cy="4885063"/>
+            <a:off x="1996362" y="2029967"/>
+            <a:ext cx="7101917" cy="5157589"/>
+            <a:chOff x="1996362" y="2029967"/>
+            <a:chExt cx="7101917" cy="5157589"/>
           </a:xfrm>
-          <a:prstGeom prst="rect">
-            <a:avLst/>
-          </a:prstGeom>
-        </p:spPr>
-      </p:pic>
-      <p:pic>
-        <p:nvPicPr>
-          <p:cNvPr id="14" name="Picture 13">
-            <a:extLst>
-              <a:ext uri="{FF2B5EF4-FFF2-40B4-BE49-F238E27FC236}">
-                <a16:creationId xmlns:a16="http://schemas.microsoft.com/office/drawing/2014/main" id="{6E278801-AEA4-78D0-072F-85307257564A}"/>
-              </a:ext>
-            </a:extLst>
-          </p:cNvPr>
-          <p:cNvPicPr>
-            <a:picLocks noChangeAspect="1"/>
-          </p:cNvPicPr>
-          <p:nvPr/>
-        </p:nvPicPr>
-        <p:blipFill>
-          <a:blip r:embed="rId4"/>
-          <a:stretch>
-            <a:fillRect/>
-          </a:stretch>
-        </p:blipFill>
-        <p:spPr>
-          <a:xfrm>
-            <a:off x="8493110" y="186004"/>
-            <a:ext cx="1267002" cy="2495898"/>
-          </a:xfrm>
-          <a:prstGeom prst="rect">
-            <a:avLst/>
-          </a:prstGeom>
-        </p:spPr>
-      </p:pic>
+        </p:grpSpPr>
+        <p:pic>
+          <p:nvPicPr>
+            <p:cNvPr id="10" name="Picture 9">
+              <a:extLst>
+                <a:ext uri="{FF2B5EF4-FFF2-40B4-BE49-F238E27FC236}">
+                  <a16:creationId xmlns:a16="http://schemas.microsoft.com/office/drawing/2014/main" id="{DCA74904-619B-BA6C-3B60-07387DF21255}"/>
+                </a:ext>
+              </a:extLst>
+            </p:cNvPr>
+            <p:cNvPicPr>
+              <a:picLocks noChangeAspect="1"/>
+            </p:cNvPicPr>
+            <p:nvPr/>
+          </p:nvPicPr>
+          <p:blipFill>
+            <a:blip r:embed="rId4">
+              <a:extLst>
+                <a:ext uri="{28A0092B-C50C-407E-A947-70E740481C1C}">
+                  <a14:useLocalDpi xmlns:a14="http://schemas.microsoft.com/office/drawing/2010/main" val="0"/>
+                </a:ext>
+              </a:extLst>
+            </a:blip>
+            <a:srcRect/>
+            <a:stretch/>
+          </p:blipFill>
+          <p:spPr>
+            <a:xfrm>
+              <a:off x="1996362" y="2029967"/>
+              <a:ext cx="7101917" cy="5157589"/>
+            </a:xfrm>
+            <a:prstGeom prst="rect">
+              <a:avLst/>
+            </a:prstGeom>
+          </p:spPr>
+        </p:pic>
+        <p:pic>
+          <p:nvPicPr>
+            <p:cNvPr id="2" name="Picture 1">
+              <a:extLst>
+                <a:ext uri="{FF2B5EF4-FFF2-40B4-BE49-F238E27FC236}">
+                  <a16:creationId xmlns:a16="http://schemas.microsoft.com/office/drawing/2014/main" id="{BA967A30-E2DD-E11C-17C9-B027070043AD}"/>
+                </a:ext>
+              </a:extLst>
+            </p:cNvPr>
+            <p:cNvPicPr>
+              <a:picLocks noChangeAspect="1"/>
+            </p:cNvPicPr>
+            <p:nvPr/>
+          </p:nvPicPr>
+          <p:blipFill>
+            <a:blip r:embed="rId3"/>
+            <a:stretch>
+              <a:fillRect/>
+            </a:stretch>
+          </p:blipFill>
+          <p:spPr>
+            <a:xfrm>
+              <a:off x="5938886" y="5243966"/>
+              <a:ext cx="745744" cy="1469060"/>
+            </a:xfrm>
+            <a:prstGeom prst="rect">
+              <a:avLst/>
+            </a:prstGeom>
+          </p:spPr>
+        </p:pic>
+      </p:grpSp>
     </p:spTree>
     <p:extLst>
       <p:ext uri="{BB962C8B-B14F-4D97-AF65-F5344CB8AC3E}">
@@ -5891,126 +6026,6 @@
   <p:clrMapOvr>
     <a:masterClrMapping/>
   </p:clrMapOvr>
-  <p:timing>
-    <p:tnLst>
-      <p:par>
-        <p:cTn id="1" dur="indefinite" restart="never" nodeType="tmRoot">
-          <p:childTnLst>
-            <p:seq concurrent="1" nextAc="seek">
-              <p:cTn id="2" dur="indefinite" nodeType="mainSeq">
-                <p:childTnLst>
-                  <p:par>
-                    <p:cTn id="3" fill="hold">
-                      <p:stCondLst>
-                        <p:cond delay="indefinite"/>
-                      </p:stCondLst>
-                      <p:childTnLst>
-                        <p:par>
-                          <p:cTn id="4" fill="hold">
-                            <p:stCondLst>
-                              <p:cond delay="0"/>
-                            </p:stCondLst>
-                            <p:childTnLst>
-                              <p:par>
-                                <p:cTn id="5" presetID="1" presetClass="entr" presetSubtype="0" fill="hold" nodeType="clickEffect">
-                                  <p:stCondLst>
-                                    <p:cond delay="0"/>
-                                  </p:stCondLst>
-                                  <p:childTnLst>
-                                    <p:set>
-                                      <p:cBhvr>
-                                        <p:cTn id="6" dur="1" fill="hold">
-                                          <p:stCondLst>
-                                            <p:cond delay="0"/>
-                                          </p:stCondLst>
-                                        </p:cTn>
-                                        <p:tgtEl>
-                                          <p:spTgt spid="6"/>
-                                        </p:tgtEl>
-                                        <p:attrNameLst>
-                                          <p:attrName>style.visibility</p:attrName>
-                                        </p:attrNameLst>
-                                      </p:cBhvr>
-                                      <p:to>
-                                        <p:strVal val="visible"/>
-                                      </p:to>
-                                    </p:set>
-                                  </p:childTnLst>
-                                </p:cTn>
-                              </p:par>
-                            </p:childTnLst>
-                          </p:cTn>
-                        </p:par>
-                      </p:childTnLst>
-                    </p:cTn>
-                  </p:par>
-                  <p:par>
-                    <p:cTn id="7" fill="hold">
-                      <p:stCondLst>
-                        <p:cond delay="indefinite"/>
-                      </p:stCondLst>
-                      <p:childTnLst>
-                        <p:par>
-                          <p:cTn id="8" fill="hold">
-                            <p:stCondLst>
-                              <p:cond delay="0"/>
-                            </p:stCondLst>
-                            <p:childTnLst>
-                              <p:par>
-                                <p:cTn id="9" presetID="1" presetClass="entr" presetSubtype="0" fill="hold" nodeType="clickEffect">
-                                  <p:stCondLst>
-                                    <p:cond delay="0"/>
-                                  </p:stCondLst>
-                                  <p:childTnLst>
-                                    <p:set>
-                                      <p:cBhvr>
-                                        <p:cTn id="10" dur="1" fill="hold">
-                                          <p:stCondLst>
-                                            <p:cond delay="0"/>
-                                          </p:stCondLst>
-                                        </p:cTn>
-                                        <p:tgtEl>
-                                          <p:spTgt spid="10"/>
-                                        </p:tgtEl>
-                                        <p:attrNameLst>
-                                          <p:attrName>style.visibility</p:attrName>
-                                        </p:attrNameLst>
-                                      </p:cBhvr>
-                                      <p:to>
-                                        <p:strVal val="visible"/>
-                                      </p:to>
-                                    </p:set>
-                                  </p:childTnLst>
-                                </p:cTn>
-                              </p:par>
-                            </p:childTnLst>
-                          </p:cTn>
-                        </p:par>
-                      </p:childTnLst>
-                    </p:cTn>
-                  </p:par>
-                </p:childTnLst>
-              </p:cTn>
-              <p:prevCondLst>
-                <p:cond evt="onPrev" delay="0">
-                  <p:tgtEl>
-                    <p:sldTgt/>
-                  </p:tgtEl>
-                </p:cond>
-              </p:prevCondLst>
-              <p:nextCondLst>
-                <p:cond evt="onNext" delay="0">
-                  <p:tgtEl>
-                    <p:sldTgt/>
-                  </p:tgtEl>
-                </p:cond>
-              </p:nextCondLst>
-            </p:seq>
-          </p:childTnLst>
-        </p:cTn>
-      </p:par>
-    </p:tnLst>
-  </p:timing>
 </p:sld>
 </file>
 
@@ -6099,7 +6114,7 @@
         </p:blipFill>
         <p:spPr>
           <a:xfrm>
-            <a:off x="3558412" y="0"/>
+            <a:off x="3293356" y="0"/>
             <a:ext cx="2849748" cy="6858000"/>
           </a:xfrm>
           <a:prstGeom prst="rect">
@@ -6134,7 +6149,7 @@
         </p:blipFill>
         <p:spPr>
           <a:xfrm>
-            <a:off x="6472076" y="0"/>
+            <a:off x="6444074" y="0"/>
             <a:ext cx="2788695" cy="6858000"/>
           </a:xfrm>
           <a:prstGeom prst="rect">
@@ -6235,7 +6250,7 @@
         </p:blipFill>
         <p:spPr>
           <a:xfrm>
-            <a:off x="2311306" y="832618"/>
+            <a:off x="2330260" y="1664722"/>
             <a:ext cx="1165895" cy="858146"/>
           </a:xfrm>
           <a:prstGeom prst="rect">
@@ -6265,7 +6280,7 @@
         </p:blipFill>
         <p:spPr>
           <a:xfrm>
-            <a:off x="7970542" y="1690764"/>
+            <a:off x="10503430" y="4507116"/>
             <a:ext cx="1454842" cy="436453"/>
           </a:xfrm>
           <a:prstGeom prst="rect">
@@ -6380,71 +6395,92 @@
           </a:prstGeom>
         </p:spPr>
       </p:pic>
-      <p:pic>
-        <p:nvPicPr>
-          <p:cNvPr id="4" name="Picture 3">
-            <a:extLst>
-              <a:ext uri="{FF2B5EF4-FFF2-40B4-BE49-F238E27FC236}">
-                <a16:creationId xmlns:a16="http://schemas.microsoft.com/office/drawing/2014/main" id="{429B0FFA-2333-479E-C33E-3D3AD58586EC}"/>
-              </a:ext>
-            </a:extLst>
-          </p:cNvPr>
-          <p:cNvPicPr>
-            <a:picLocks noChangeAspect="1"/>
-          </p:cNvPicPr>
+      <p:grpSp>
+        <p:nvGrpSpPr>
+          <p:cNvPr id="2" name="Group 1">
+            <a:extLst>
+              <a:ext uri="{FF2B5EF4-FFF2-40B4-BE49-F238E27FC236}">
+                <a16:creationId xmlns:a16="http://schemas.microsoft.com/office/drawing/2014/main" id="{1F8E47C9-0F15-B3EB-4B2F-63C9D80E7071}"/>
+              </a:ext>
+            </a:extLst>
+          </p:cNvPr>
+          <p:cNvGrpSpPr/>
           <p:nvPr/>
-        </p:nvPicPr>
-        <p:blipFill>
-          <a:blip r:embed="rId3">
-            <a:extLst>
-              <a:ext uri="{28A0092B-C50C-407E-A947-70E740481C1C}">
-                <a14:useLocalDpi xmlns:a14="http://schemas.microsoft.com/office/drawing/2010/main" val="0"/>
-              </a:ext>
-            </a:extLst>
-          </a:blip>
-          <a:srcRect/>
-          <a:stretch/>
-        </p:blipFill>
-        <p:spPr>
+        </p:nvGrpSpPr>
+        <p:grpSpPr>
           <a:xfrm>
             <a:off x="5868329" y="0"/>
             <a:ext cx="3534442" cy="6858000"/>
+            <a:chOff x="5868329" y="0"/>
+            <a:chExt cx="3534442" cy="6858000"/>
           </a:xfrm>
-          <a:prstGeom prst="rect">
-            <a:avLst/>
-          </a:prstGeom>
-        </p:spPr>
-      </p:pic>
-      <p:pic>
-        <p:nvPicPr>
-          <p:cNvPr id="7" name="Picture 6">
-            <a:extLst>
-              <a:ext uri="{FF2B5EF4-FFF2-40B4-BE49-F238E27FC236}">
-                <a16:creationId xmlns:a16="http://schemas.microsoft.com/office/drawing/2014/main" id="{D51EC2D6-A64E-E5C0-17D6-F47BBC444DF7}"/>
-              </a:ext>
-            </a:extLst>
-          </p:cNvPr>
-          <p:cNvPicPr>
-            <a:picLocks noChangeAspect="1"/>
-          </p:cNvPicPr>
-          <p:nvPr/>
-        </p:nvPicPr>
-        <p:blipFill>
-          <a:blip r:embed="rId4"/>
-          <a:stretch>
-            <a:fillRect/>
-          </a:stretch>
-        </p:blipFill>
-        <p:spPr>
-          <a:xfrm>
-            <a:off x="9531428" y="1416525"/>
-            <a:ext cx="1190791" cy="1076475"/>
-          </a:xfrm>
-          <a:prstGeom prst="rect">
-            <a:avLst/>
-          </a:prstGeom>
-        </p:spPr>
-      </p:pic>
+        </p:grpSpPr>
+        <p:pic>
+          <p:nvPicPr>
+            <p:cNvPr id="4" name="Picture 3">
+              <a:extLst>
+                <a:ext uri="{FF2B5EF4-FFF2-40B4-BE49-F238E27FC236}">
+                  <a16:creationId xmlns:a16="http://schemas.microsoft.com/office/drawing/2014/main" id="{429B0FFA-2333-479E-C33E-3D3AD58586EC}"/>
+                </a:ext>
+              </a:extLst>
+            </p:cNvPr>
+            <p:cNvPicPr>
+              <a:picLocks noChangeAspect="1"/>
+            </p:cNvPicPr>
+            <p:nvPr/>
+          </p:nvPicPr>
+          <p:blipFill>
+            <a:blip r:embed="rId3">
+              <a:extLst>
+                <a:ext uri="{28A0092B-C50C-407E-A947-70E740481C1C}">
+                  <a14:useLocalDpi xmlns:a14="http://schemas.microsoft.com/office/drawing/2010/main" val="0"/>
+                </a:ext>
+              </a:extLst>
+            </a:blip>
+            <a:srcRect/>
+            <a:stretch/>
+          </p:blipFill>
+          <p:spPr>
+            <a:xfrm>
+              <a:off x="5868329" y="0"/>
+              <a:ext cx="3534442" cy="6858000"/>
+            </a:xfrm>
+            <a:prstGeom prst="rect">
+              <a:avLst/>
+            </a:prstGeom>
+          </p:spPr>
+        </p:pic>
+        <p:pic>
+          <p:nvPicPr>
+            <p:cNvPr id="7" name="Picture 6">
+              <a:extLst>
+                <a:ext uri="{FF2B5EF4-FFF2-40B4-BE49-F238E27FC236}">
+                  <a16:creationId xmlns:a16="http://schemas.microsoft.com/office/drawing/2014/main" id="{D51EC2D6-A64E-E5C0-17D6-F47BBC444DF7}"/>
+                </a:ext>
+              </a:extLst>
+            </p:cNvPr>
+            <p:cNvPicPr>
+              <a:picLocks noChangeAspect="1"/>
+            </p:cNvPicPr>
+            <p:nvPr/>
+          </p:nvPicPr>
+          <p:blipFill>
+            <a:blip r:embed="rId4"/>
+            <a:stretch>
+              <a:fillRect/>
+            </a:stretch>
+          </p:blipFill>
+          <p:spPr>
+            <a:xfrm>
+              <a:off x="7227140" y="3803109"/>
+              <a:ext cx="1190791" cy="1076475"/>
+            </a:xfrm>
+            <a:prstGeom prst="rect">
+              <a:avLst/>
+            </a:prstGeom>
+          </p:spPr>
+        </p:pic>
+      </p:grpSp>
     </p:spTree>
     <p:extLst>
       <p:ext uri="{BB962C8B-B14F-4D97-AF65-F5344CB8AC3E}">
@@ -6517,106 +6553,178 @@
           </a:p>
         </p:txBody>
       </p:sp>
-      <p:pic>
-        <p:nvPicPr>
-          <p:cNvPr id="6" name="Picture 5">
-            <a:extLst>
-              <a:ext uri="{FF2B5EF4-FFF2-40B4-BE49-F238E27FC236}">
-                <a16:creationId xmlns:a16="http://schemas.microsoft.com/office/drawing/2014/main" id="{63854AC3-061E-6C06-E516-A1A91A31B225}"/>
-              </a:ext>
-            </a:extLst>
-          </p:cNvPr>
-          <p:cNvPicPr>
-            <a:picLocks noChangeAspect="1"/>
-          </p:cNvPicPr>
+      <p:grpSp>
+        <p:nvGrpSpPr>
+          <p:cNvPr id="3" name="Group 2">
+            <a:extLst>
+              <a:ext uri="{FF2B5EF4-FFF2-40B4-BE49-F238E27FC236}">
+                <a16:creationId xmlns:a16="http://schemas.microsoft.com/office/drawing/2014/main" id="{01B5E886-8C88-F6D5-7554-5A7BBDFC57FB}"/>
+              </a:ext>
+            </a:extLst>
+          </p:cNvPr>
+          <p:cNvGrpSpPr/>
           <p:nvPr/>
-        </p:nvPicPr>
-        <p:blipFill>
-          <a:blip r:embed="rId2">
-            <a:extLst>
-              <a:ext uri="{28A0092B-C50C-407E-A947-70E740481C1C}">
-                <a14:useLocalDpi xmlns:a14="http://schemas.microsoft.com/office/drawing/2010/main" val="0"/>
-              </a:ext>
-            </a:extLst>
-          </a:blip>
-          <a:srcRect/>
-          <a:stretch/>
-        </p:blipFill>
-        <p:spPr>
+        </p:nvGrpSpPr>
+        <p:grpSpPr>
           <a:xfrm>
             <a:off x="862507" y="0"/>
             <a:ext cx="7010396" cy="5098470"/>
+            <a:chOff x="862507" y="0"/>
+            <a:chExt cx="7010396" cy="5098470"/>
           </a:xfrm>
-          <a:prstGeom prst="rect">
-            <a:avLst/>
-          </a:prstGeom>
-        </p:spPr>
-      </p:pic>
-      <p:pic>
-        <p:nvPicPr>
-          <p:cNvPr id="10" name="Picture 9">
-            <a:extLst>
-              <a:ext uri="{FF2B5EF4-FFF2-40B4-BE49-F238E27FC236}">
-                <a16:creationId xmlns:a16="http://schemas.microsoft.com/office/drawing/2014/main" id="{93E5C378-75C1-4E1B-A091-1F804791252E}"/>
-              </a:ext>
-            </a:extLst>
-          </p:cNvPr>
-          <p:cNvPicPr>
-            <a:picLocks noChangeAspect="1"/>
-          </p:cNvPicPr>
+        </p:grpSpPr>
+        <p:pic>
+          <p:nvPicPr>
+            <p:cNvPr id="6" name="Picture 5">
+              <a:extLst>
+                <a:ext uri="{FF2B5EF4-FFF2-40B4-BE49-F238E27FC236}">
+                  <a16:creationId xmlns:a16="http://schemas.microsoft.com/office/drawing/2014/main" id="{63854AC3-061E-6C06-E516-A1A91A31B225}"/>
+                </a:ext>
+              </a:extLst>
+            </p:cNvPr>
+            <p:cNvPicPr>
+              <a:picLocks noChangeAspect="1"/>
+            </p:cNvPicPr>
+            <p:nvPr/>
+          </p:nvPicPr>
+          <p:blipFill>
+            <a:blip r:embed="rId2">
+              <a:extLst>
+                <a:ext uri="{28A0092B-C50C-407E-A947-70E740481C1C}">
+                  <a14:useLocalDpi xmlns:a14="http://schemas.microsoft.com/office/drawing/2010/main" val="0"/>
+                </a:ext>
+              </a:extLst>
+            </a:blip>
+            <a:srcRect/>
+            <a:stretch/>
+          </p:blipFill>
+          <p:spPr>
+            <a:xfrm>
+              <a:off x="862507" y="0"/>
+              <a:ext cx="7010396" cy="5098470"/>
+            </a:xfrm>
+            <a:prstGeom prst="rect">
+              <a:avLst/>
+            </a:prstGeom>
+          </p:spPr>
+        </p:pic>
+        <p:pic>
+          <p:nvPicPr>
+            <p:cNvPr id="14" name="Picture 13">
+              <a:extLst>
+                <a:ext uri="{FF2B5EF4-FFF2-40B4-BE49-F238E27FC236}">
+                  <a16:creationId xmlns:a16="http://schemas.microsoft.com/office/drawing/2014/main" id="{C4B8302A-4CB7-F51A-E8C0-E23725AC919D}"/>
+                </a:ext>
+              </a:extLst>
+            </p:cNvPr>
+            <p:cNvPicPr>
+              <a:picLocks noChangeAspect="1"/>
+            </p:cNvPicPr>
+            <p:nvPr/>
+          </p:nvPicPr>
+          <p:blipFill>
+            <a:blip r:embed="rId3"/>
+            <a:stretch>
+              <a:fillRect/>
+            </a:stretch>
+          </p:blipFill>
+          <p:spPr>
+            <a:xfrm>
+              <a:off x="7014169" y="0"/>
+              <a:ext cx="858734" cy="1691640"/>
+            </a:xfrm>
+            <a:prstGeom prst="rect">
+              <a:avLst/>
+            </a:prstGeom>
+          </p:spPr>
+        </p:pic>
+      </p:grpSp>
+      <p:grpSp>
+        <p:nvGrpSpPr>
+          <p:cNvPr id="4" name="Group 3">
+            <a:extLst>
+              <a:ext uri="{FF2B5EF4-FFF2-40B4-BE49-F238E27FC236}">
+                <a16:creationId xmlns:a16="http://schemas.microsoft.com/office/drawing/2014/main" id="{9EB5D433-8204-A1D8-6E7A-02C46788F8DB}"/>
+              </a:ext>
+            </a:extLst>
+          </p:cNvPr>
+          <p:cNvGrpSpPr/>
           <p:nvPr/>
-        </p:nvPicPr>
-        <p:blipFill>
-          <a:blip r:embed="rId3">
-            <a:extLst>
-              <a:ext uri="{28A0092B-C50C-407E-A947-70E740481C1C}">
-                <a14:useLocalDpi xmlns:a14="http://schemas.microsoft.com/office/drawing/2010/main" val="0"/>
-              </a:ext>
-            </a:extLst>
-          </a:blip>
-          <a:srcRect/>
-          <a:stretch/>
-        </p:blipFill>
-        <p:spPr>
+        </p:nvGrpSpPr>
+        <p:grpSpPr>
           <a:xfrm>
-            <a:off x="4870580" y="1785497"/>
+            <a:off x="3306956" y="1889204"/>
             <a:ext cx="7083473" cy="4968796"/>
+            <a:chOff x="3306956" y="1889204"/>
+            <a:chExt cx="7083473" cy="4968796"/>
           </a:xfrm>
-          <a:prstGeom prst="rect">
-            <a:avLst/>
-          </a:prstGeom>
-        </p:spPr>
-      </p:pic>
-      <p:pic>
-        <p:nvPicPr>
-          <p:cNvPr id="14" name="Picture 13">
-            <a:extLst>
-              <a:ext uri="{FF2B5EF4-FFF2-40B4-BE49-F238E27FC236}">
-                <a16:creationId xmlns:a16="http://schemas.microsoft.com/office/drawing/2014/main" id="{C4B8302A-4CB7-F51A-E8C0-E23725AC919D}"/>
-              </a:ext>
-            </a:extLst>
-          </p:cNvPr>
-          <p:cNvPicPr>
-            <a:picLocks noChangeAspect="1"/>
-          </p:cNvPicPr>
-          <p:nvPr/>
-        </p:nvPicPr>
-        <p:blipFill>
-          <a:blip r:embed="rId4"/>
-          <a:stretch>
-            <a:fillRect/>
-          </a:stretch>
-        </p:blipFill>
-        <p:spPr>
-          <a:xfrm>
-            <a:off x="10062491" y="103708"/>
-            <a:ext cx="1267002" cy="2495898"/>
-          </a:xfrm>
-          <a:prstGeom prst="rect">
-            <a:avLst/>
-          </a:prstGeom>
-        </p:spPr>
-      </p:pic>
+        </p:grpSpPr>
+        <p:pic>
+          <p:nvPicPr>
+            <p:cNvPr id="10" name="Picture 9">
+              <a:extLst>
+                <a:ext uri="{FF2B5EF4-FFF2-40B4-BE49-F238E27FC236}">
+                  <a16:creationId xmlns:a16="http://schemas.microsoft.com/office/drawing/2014/main" id="{93E5C378-75C1-4E1B-A091-1F804791252E}"/>
+                </a:ext>
+              </a:extLst>
+            </p:cNvPr>
+            <p:cNvPicPr>
+              <a:picLocks noChangeAspect="1"/>
+            </p:cNvPicPr>
+            <p:nvPr/>
+          </p:nvPicPr>
+          <p:blipFill>
+            <a:blip r:embed="rId4">
+              <a:extLst>
+                <a:ext uri="{28A0092B-C50C-407E-A947-70E740481C1C}">
+                  <a14:useLocalDpi xmlns:a14="http://schemas.microsoft.com/office/drawing/2010/main" val="0"/>
+                </a:ext>
+              </a:extLst>
+            </a:blip>
+            <a:srcRect/>
+            <a:stretch/>
+          </p:blipFill>
+          <p:spPr>
+            <a:xfrm>
+              <a:off x="3306956" y="1889204"/>
+              <a:ext cx="7083473" cy="4968796"/>
+            </a:xfrm>
+            <a:prstGeom prst="rect">
+              <a:avLst/>
+            </a:prstGeom>
+          </p:spPr>
+        </p:pic>
+        <p:pic>
+          <p:nvPicPr>
+            <p:cNvPr id="2" name="Picture 1">
+              <a:extLst>
+                <a:ext uri="{FF2B5EF4-FFF2-40B4-BE49-F238E27FC236}">
+                  <a16:creationId xmlns:a16="http://schemas.microsoft.com/office/drawing/2014/main" id="{0D5C233E-7BBD-369F-C7D0-918CDDA2E6BD}"/>
+                </a:ext>
+              </a:extLst>
+            </p:cNvPr>
+            <p:cNvPicPr>
+              <a:picLocks noChangeAspect="1"/>
+            </p:cNvPicPr>
+            <p:nvPr/>
+          </p:nvPicPr>
+          <p:blipFill>
+            <a:blip r:embed="rId3"/>
+            <a:stretch>
+              <a:fillRect/>
+            </a:stretch>
+          </p:blipFill>
+          <p:spPr>
+            <a:xfrm>
+              <a:off x="7014169" y="1947166"/>
+              <a:ext cx="858734" cy="1691640"/>
+            </a:xfrm>
+            <a:prstGeom prst="rect">
+              <a:avLst/>
+            </a:prstGeom>
+          </p:spPr>
+        </p:pic>
+      </p:grpSp>
     </p:spTree>
     <p:extLst>
       <p:ext uri="{BB962C8B-B14F-4D97-AF65-F5344CB8AC3E}">
@@ -6627,126 +6735,6 @@
   <p:clrMapOvr>
     <a:masterClrMapping/>
   </p:clrMapOvr>
-  <p:timing>
-    <p:tnLst>
-      <p:par>
-        <p:cTn id="1" dur="indefinite" restart="never" nodeType="tmRoot">
-          <p:childTnLst>
-            <p:seq concurrent="1" nextAc="seek">
-              <p:cTn id="2" dur="indefinite" nodeType="mainSeq">
-                <p:childTnLst>
-                  <p:par>
-                    <p:cTn id="3" fill="hold">
-                      <p:stCondLst>
-                        <p:cond delay="indefinite"/>
-                      </p:stCondLst>
-                      <p:childTnLst>
-                        <p:par>
-                          <p:cTn id="4" fill="hold">
-                            <p:stCondLst>
-                              <p:cond delay="0"/>
-                            </p:stCondLst>
-                            <p:childTnLst>
-                              <p:par>
-                                <p:cTn id="5" presetID="1" presetClass="entr" presetSubtype="0" fill="hold" nodeType="clickEffect">
-                                  <p:stCondLst>
-                                    <p:cond delay="0"/>
-                                  </p:stCondLst>
-                                  <p:childTnLst>
-                                    <p:set>
-                                      <p:cBhvr>
-                                        <p:cTn id="6" dur="1" fill="hold">
-                                          <p:stCondLst>
-                                            <p:cond delay="0"/>
-                                          </p:stCondLst>
-                                        </p:cTn>
-                                        <p:tgtEl>
-                                          <p:spTgt spid="6"/>
-                                        </p:tgtEl>
-                                        <p:attrNameLst>
-                                          <p:attrName>style.visibility</p:attrName>
-                                        </p:attrNameLst>
-                                      </p:cBhvr>
-                                      <p:to>
-                                        <p:strVal val="visible"/>
-                                      </p:to>
-                                    </p:set>
-                                  </p:childTnLst>
-                                </p:cTn>
-                              </p:par>
-                            </p:childTnLst>
-                          </p:cTn>
-                        </p:par>
-                      </p:childTnLst>
-                    </p:cTn>
-                  </p:par>
-                  <p:par>
-                    <p:cTn id="7" fill="hold">
-                      <p:stCondLst>
-                        <p:cond delay="indefinite"/>
-                      </p:stCondLst>
-                      <p:childTnLst>
-                        <p:par>
-                          <p:cTn id="8" fill="hold">
-                            <p:stCondLst>
-                              <p:cond delay="0"/>
-                            </p:stCondLst>
-                            <p:childTnLst>
-                              <p:par>
-                                <p:cTn id="9" presetID="1" presetClass="entr" presetSubtype="0" fill="hold" nodeType="clickEffect">
-                                  <p:stCondLst>
-                                    <p:cond delay="0"/>
-                                  </p:stCondLst>
-                                  <p:childTnLst>
-                                    <p:set>
-                                      <p:cBhvr>
-                                        <p:cTn id="10" dur="1" fill="hold">
-                                          <p:stCondLst>
-                                            <p:cond delay="0"/>
-                                          </p:stCondLst>
-                                        </p:cTn>
-                                        <p:tgtEl>
-                                          <p:spTgt spid="10"/>
-                                        </p:tgtEl>
-                                        <p:attrNameLst>
-                                          <p:attrName>style.visibility</p:attrName>
-                                        </p:attrNameLst>
-                                      </p:cBhvr>
-                                      <p:to>
-                                        <p:strVal val="visible"/>
-                                      </p:to>
-                                    </p:set>
-                                  </p:childTnLst>
-                                </p:cTn>
-                              </p:par>
-                            </p:childTnLst>
-                          </p:cTn>
-                        </p:par>
-                      </p:childTnLst>
-                    </p:cTn>
-                  </p:par>
-                </p:childTnLst>
-              </p:cTn>
-              <p:prevCondLst>
-                <p:cond evt="onPrev" delay="0">
-                  <p:tgtEl>
-                    <p:sldTgt/>
-                  </p:tgtEl>
-                </p:cond>
-              </p:prevCondLst>
-              <p:nextCondLst>
-                <p:cond evt="onNext" delay="0">
-                  <p:tgtEl>
-                    <p:sldTgt/>
-                  </p:tgtEl>
-                </p:cond>
-              </p:nextCondLst>
-            </p:seq>
-          </p:childTnLst>
-        </p:cTn>
-      </p:par>
-    </p:tnLst>
-  </p:timing>
 </p:sld>
 </file>
 
@@ -6805,10 +6793,10 @@
       </p:pic>
       <p:pic>
         <p:nvPicPr>
-          <p:cNvPr id="7" name="Picture 6">
-            <a:extLst>
-              <a:ext uri="{FF2B5EF4-FFF2-40B4-BE49-F238E27FC236}">
-                <a16:creationId xmlns:a16="http://schemas.microsoft.com/office/drawing/2014/main" id="{B0779FDC-B1E5-560F-3162-9807230DF2CB}"/>
+          <p:cNvPr id="9" name="Picture 8">
+            <a:extLst>
+              <a:ext uri="{FF2B5EF4-FFF2-40B4-BE49-F238E27FC236}">
+                <a16:creationId xmlns:a16="http://schemas.microsoft.com/office/drawing/2014/main" id="{141DF485-A900-C461-6BB8-D031F206EF1E}"/>
               </a:ext>
             </a:extLst>
           </p:cNvPr>
@@ -6825,68 +6813,8 @@
         </p:blipFill>
         <p:spPr>
           <a:xfrm>
-            <a:off x="3538388" y="0"/>
-            <a:ext cx="2889796" cy="6858000"/>
-          </a:xfrm>
-          <a:prstGeom prst="rect">
-            <a:avLst/>
-          </a:prstGeom>
-        </p:spPr>
-      </p:pic>
-      <p:pic>
-        <p:nvPicPr>
-          <p:cNvPr id="9" name="Picture 8">
-            <a:extLst>
-              <a:ext uri="{FF2B5EF4-FFF2-40B4-BE49-F238E27FC236}">
-                <a16:creationId xmlns:a16="http://schemas.microsoft.com/office/drawing/2014/main" id="{141DF485-A900-C461-6BB8-D031F206EF1E}"/>
-              </a:ext>
-            </a:extLst>
-          </p:cNvPr>
-          <p:cNvPicPr>
-            <a:picLocks noChangeAspect="1"/>
-          </p:cNvPicPr>
-          <p:nvPr/>
-        </p:nvPicPr>
-        <p:blipFill>
-          <a:blip r:embed="rId4"/>
-          <a:stretch>
-            <a:fillRect/>
-          </a:stretch>
-        </p:blipFill>
-        <p:spPr>
-          <a:xfrm>
-            <a:off x="6428184" y="0"/>
+            <a:off x="3609516" y="0"/>
             <a:ext cx="2876479" cy="6858000"/>
-          </a:xfrm>
-          <a:prstGeom prst="rect">
-            <a:avLst/>
-          </a:prstGeom>
-        </p:spPr>
-      </p:pic>
-      <p:pic>
-        <p:nvPicPr>
-          <p:cNvPr id="11" name="Picture 10">
-            <a:extLst>
-              <a:ext uri="{FF2B5EF4-FFF2-40B4-BE49-F238E27FC236}">
-                <a16:creationId xmlns:a16="http://schemas.microsoft.com/office/drawing/2014/main" id="{645B9FA1-B2FC-C39C-95BE-2A4262DFEBD3}"/>
-              </a:ext>
-            </a:extLst>
-          </p:cNvPr>
-          <p:cNvPicPr>
-            <a:picLocks noChangeAspect="1"/>
-          </p:cNvPicPr>
-          <p:nvPr/>
-        </p:nvPicPr>
-        <p:blipFill>
-          <a:blip r:embed="rId5"/>
-          <a:stretch>
-            <a:fillRect/>
-          </a:stretch>
-        </p:blipFill>
-        <p:spPr>
-          <a:xfrm>
-            <a:off x="9298859" y="0"/>
-            <a:ext cx="2895600" cy="6858000"/>
           </a:xfrm>
           <a:prstGeom prst="rect">
             <a:avLst/>
@@ -6929,66 +6857,147 @@
           </a:p>
         </p:txBody>
       </p:sp>
-      <p:pic>
-        <p:nvPicPr>
-          <p:cNvPr id="15" name="Picture 14">
-            <a:extLst>
-              <a:ext uri="{FF2B5EF4-FFF2-40B4-BE49-F238E27FC236}">
-                <a16:creationId xmlns:a16="http://schemas.microsoft.com/office/drawing/2014/main" id="{6A5C6D69-7FE8-DC10-AF12-722A59E8C7FE}"/>
-              </a:ext>
-            </a:extLst>
-          </p:cNvPr>
-          <p:cNvPicPr>
-            <a:picLocks noChangeAspect="1"/>
-          </p:cNvPicPr>
+      <p:grpSp>
+        <p:nvGrpSpPr>
+          <p:cNvPr id="2" name="Group 1">
+            <a:extLst>
+              <a:ext uri="{FF2B5EF4-FFF2-40B4-BE49-F238E27FC236}">
+                <a16:creationId xmlns:a16="http://schemas.microsoft.com/office/drawing/2014/main" id="{AD28571A-4A0A-635C-C6B1-0CC04281348A}"/>
+              </a:ext>
+            </a:extLst>
+          </p:cNvPr>
+          <p:cNvGrpSpPr/>
           <p:nvPr/>
-        </p:nvPicPr>
-        <p:blipFill>
-          <a:blip r:embed="rId6"/>
-          <a:stretch>
-            <a:fillRect/>
-          </a:stretch>
-        </p:blipFill>
-        <p:spPr>
+        </p:nvGrpSpPr>
+        <p:grpSpPr>
           <a:xfrm>
-            <a:off x="4390778" y="1478708"/>
-            <a:ext cx="1165895" cy="858146"/>
+            <a:off x="6491799" y="0"/>
+            <a:ext cx="5702660" cy="6858000"/>
+            <a:chOff x="6491799" y="0"/>
+            <a:chExt cx="5702660" cy="6858000"/>
           </a:xfrm>
-          <a:prstGeom prst="rect">
-            <a:avLst/>
-          </a:prstGeom>
-        </p:spPr>
-      </p:pic>
-      <p:pic>
-        <p:nvPicPr>
-          <p:cNvPr id="17" name="Picture 16">
-            <a:extLst>
-              <a:ext uri="{FF2B5EF4-FFF2-40B4-BE49-F238E27FC236}">
-                <a16:creationId xmlns:a16="http://schemas.microsoft.com/office/drawing/2014/main" id="{E219763D-CCBF-9AD6-4B28-E7F80C409BC2}"/>
-              </a:ext>
-            </a:extLst>
-          </p:cNvPr>
-          <p:cNvPicPr>
-            <a:picLocks noChangeAspect="1"/>
-          </p:cNvPicPr>
-          <p:nvPr/>
-        </p:nvPicPr>
-        <p:blipFill>
-          <a:blip r:embed="rId7"/>
-          <a:stretch>
-            <a:fillRect/>
-          </a:stretch>
-        </p:blipFill>
-        <p:spPr>
-          <a:xfrm>
-            <a:off x="7970542" y="1690764"/>
-            <a:ext cx="1454842" cy="436453"/>
-          </a:xfrm>
-          <a:prstGeom prst="rect">
-            <a:avLst/>
-          </a:prstGeom>
-        </p:spPr>
-      </p:pic>
+        </p:grpSpPr>
+        <p:pic>
+          <p:nvPicPr>
+            <p:cNvPr id="7" name="Picture 6">
+              <a:extLst>
+                <a:ext uri="{FF2B5EF4-FFF2-40B4-BE49-F238E27FC236}">
+                  <a16:creationId xmlns:a16="http://schemas.microsoft.com/office/drawing/2014/main" id="{B0779FDC-B1E5-560F-3162-9807230DF2CB}"/>
+                </a:ext>
+              </a:extLst>
+            </p:cNvPr>
+            <p:cNvPicPr>
+              <a:picLocks noChangeAspect="1"/>
+            </p:cNvPicPr>
+            <p:nvPr/>
+          </p:nvPicPr>
+          <p:blipFill>
+            <a:blip r:embed="rId4"/>
+            <a:stretch>
+              <a:fillRect/>
+            </a:stretch>
+          </p:blipFill>
+          <p:spPr>
+            <a:xfrm>
+              <a:off x="6491799" y="0"/>
+              <a:ext cx="2889796" cy="6858000"/>
+            </a:xfrm>
+            <a:prstGeom prst="rect">
+              <a:avLst/>
+            </a:prstGeom>
+          </p:spPr>
+        </p:pic>
+        <p:pic>
+          <p:nvPicPr>
+            <p:cNvPr id="11" name="Picture 10">
+              <a:extLst>
+                <a:ext uri="{FF2B5EF4-FFF2-40B4-BE49-F238E27FC236}">
+                  <a16:creationId xmlns:a16="http://schemas.microsoft.com/office/drawing/2014/main" id="{645B9FA1-B2FC-C39C-95BE-2A4262DFEBD3}"/>
+                </a:ext>
+              </a:extLst>
+            </p:cNvPr>
+            <p:cNvPicPr>
+              <a:picLocks noChangeAspect="1"/>
+            </p:cNvPicPr>
+            <p:nvPr/>
+          </p:nvPicPr>
+          <p:blipFill>
+            <a:blip r:embed="rId5"/>
+            <a:stretch>
+              <a:fillRect/>
+            </a:stretch>
+          </p:blipFill>
+          <p:spPr>
+            <a:xfrm>
+              <a:off x="9298859" y="0"/>
+              <a:ext cx="2895600" cy="6858000"/>
+            </a:xfrm>
+            <a:prstGeom prst="rect">
+              <a:avLst/>
+            </a:prstGeom>
+          </p:spPr>
+        </p:pic>
+        <p:pic>
+          <p:nvPicPr>
+            <p:cNvPr id="15" name="Picture 14">
+              <a:extLst>
+                <a:ext uri="{FF2B5EF4-FFF2-40B4-BE49-F238E27FC236}">
+                  <a16:creationId xmlns:a16="http://schemas.microsoft.com/office/drawing/2014/main" id="{6A5C6D69-7FE8-DC10-AF12-722A59E8C7FE}"/>
+                </a:ext>
+              </a:extLst>
+            </p:cNvPr>
+            <p:cNvPicPr>
+              <a:picLocks noChangeAspect="1"/>
+            </p:cNvPicPr>
+            <p:nvPr/>
+          </p:nvPicPr>
+          <p:blipFill>
+            <a:blip r:embed="rId6"/>
+            <a:stretch>
+              <a:fillRect/>
+            </a:stretch>
+          </p:blipFill>
+          <p:spPr>
+            <a:xfrm>
+              <a:off x="7353749" y="1487852"/>
+              <a:ext cx="1165895" cy="858146"/>
+            </a:xfrm>
+            <a:prstGeom prst="rect">
+              <a:avLst/>
+            </a:prstGeom>
+          </p:spPr>
+        </p:pic>
+        <p:pic>
+          <p:nvPicPr>
+            <p:cNvPr id="17" name="Picture 16">
+              <a:extLst>
+                <a:ext uri="{FF2B5EF4-FFF2-40B4-BE49-F238E27FC236}">
+                  <a16:creationId xmlns:a16="http://schemas.microsoft.com/office/drawing/2014/main" id="{E219763D-CCBF-9AD6-4B28-E7F80C409BC2}"/>
+                </a:ext>
+              </a:extLst>
+            </p:cNvPr>
+            <p:cNvPicPr>
+              <a:picLocks noChangeAspect="1"/>
+            </p:cNvPicPr>
+            <p:nvPr/>
+          </p:nvPicPr>
+          <p:blipFill>
+            <a:blip r:embed="rId7"/>
+            <a:stretch>
+              <a:fillRect/>
+            </a:stretch>
+          </p:blipFill>
+          <p:spPr>
+            <a:xfrm>
+              <a:off x="10565303" y="3873470"/>
+              <a:ext cx="1454842" cy="436453"/>
+            </a:xfrm>
+            <a:prstGeom prst="rect">
+              <a:avLst/>
+            </a:prstGeom>
+          </p:spPr>
+        </p:pic>
+      </p:grpSp>
     </p:spTree>
     <p:extLst>
       <p:ext uri="{BB962C8B-B14F-4D97-AF65-F5344CB8AC3E}">
@@ -7091,71 +7100,92 @@
           </a:prstGeom>
         </p:spPr>
       </p:pic>
-      <p:pic>
-        <p:nvPicPr>
-          <p:cNvPr id="4" name="Picture 3">
-            <a:extLst>
-              <a:ext uri="{FF2B5EF4-FFF2-40B4-BE49-F238E27FC236}">
-                <a16:creationId xmlns:a16="http://schemas.microsoft.com/office/drawing/2014/main" id="{60B0AD99-3004-E785-3BDC-E196A2C8506B}"/>
-              </a:ext>
-            </a:extLst>
-          </p:cNvPr>
-          <p:cNvPicPr>
-            <a:picLocks noChangeAspect="1"/>
-          </p:cNvPicPr>
+      <p:grpSp>
+        <p:nvGrpSpPr>
+          <p:cNvPr id="2" name="Group 1">
+            <a:extLst>
+              <a:ext uri="{FF2B5EF4-FFF2-40B4-BE49-F238E27FC236}">
+                <a16:creationId xmlns:a16="http://schemas.microsoft.com/office/drawing/2014/main" id="{082616BB-1124-0FB7-4BE5-F1F018BB48D1}"/>
+              </a:ext>
+            </a:extLst>
+          </p:cNvPr>
+          <p:cNvGrpSpPr/>
           <p:nvPr/>
-        </p:nvPicPr>
-        <p:blipFill>
-          <a:blip r:embed="rId3">
-            <a:extLst>
-              <a:ext uri="{28A0092B-C50C-407E-A947-70E740481C1C}">
-                <a14:useLocalDpi xmlns:a14="http://schemas.microsoft.com/office/drawing/2010/main" val="0"/>
-              </a:ext>
-            </a:extLst>
-          </a:blip>
-          <a:srcRect/>
-          <a:stretch/>
-        </p:blipFill>
-        <p:spPr>
+        </p:nvGrpSpPr>
+        <p:grpSpPr>
           <a:xfrm>
             <a:off x="6800604" y="0"/>
-            <a:ext cx="3517354" cy="6858000"/>
+            <a:ext cx="3640098" cy="6858000"/>
+            <a:chOff x="6800604" y="0"/>
+            <a:chExt cx="3640098" cy="6858000"/>
           </a:xfrm>
-          <a:prstGeom prst="rect">
-            <a:avLst/>
-          </a:prstGeom>
-        </p:spPr>
-      </p:pic>
-      <p:pic>
-        <p:nvPicPr>
-          <p:cNvPr id="7" name="Picture 6">
-            <a:extLst>
-              <a:ext uri="{FF2B5EF4-FFF2-40B4-BE49-F238E27FC236}">
-                <a16:creationId xmlns:a16="http://schemas.microsoft.com/office/drawing/2014/main" id="{7409D990-F4B6-9086-99E3-C24DA5C69B52}"/>
-              </a:ext>
-            </a:extLst>
-          </p:cNvPr>
-          <p:cNvPicPr>
-            <a:picLocks noChangeAspect="1"/>
-          </p:cNvPicPr>
-          <p:nvPr/>
-        </p:nvPicPr>
-        <p:blipFill>
-          <a:blip r:embed="rId4"/>
-          <a:stretch>
-            <a:fillRect/>
-          </a:stretch>
-        </p:blipFill>
-        <p:spPr>
-          <a:xfrm>
-            <a:off x="10814682" y="105477"/>
-            <a:ext cx="1162212" cy="1086002"/>
-          </a:xfrm>
-          <a:prstGeom prst="rect">
-            <a:avLst/>
-          </a:prstGeom>
-        </p:spPr>
-      </p:pic>
+        </p:grpSpPr>
+        <p:pic>
+          <p:nvPicPr>
+            <p:cNvPr id="4" name="Picture 3">
+              <a:extLst>
+                <a:ext uri="{FF2B5EF4-FFF2-40B4-BE49-F238E27FC236}">
+                  <a16:creationId xmlns:a16="http://schemas.microsoft.com/office/drawing/2014/main" id="{60B0AD99-3004-E785-3BDC-E196A2C8506B}"/>
+                </a:ext>
+              </a:extLst>
+            </p:cNvPr>
+            <p:cNvPicPr>
+              <a:picLocks noChangeAspect="1"/>
+            </p:cNvPicPr>
+            <p:nvPr/>
+          </p:nvPicPr>
+          <p:blipFill>
+            <a:blip r:embed="rId3">
+              <a:extLst>
+                <a:ext uri="{28A0092B-C50C-407E-A947-70E740481C1C}">
+                  <a14:useLocalDpi xmlns:a14="http://schemas.microsoft.com/office/drawing/2010/main" val="0"/>
+                </a:ext>
+              </a:extLst>
+            </a:blip>
+            <a:srcRect/>
+            <a:stretch/>
+          </p:blipFill>
+          <p:spPr>
+            <a:xfrm>
+              <a:off x="6800604" y="0"/>
+              <a:ext cx="3517354" cy="6858000"/>
+            </a:xfrm>
+            <a:prstGeom prst="rect">
+              <a:avLst/>
+            </a:prstGeom>
+          </p:spPr>
+        </p:pic>
+        <p:pic>
+          <p:nvPicPr>
+            <p:cNvPr id="7" name="Picture 6">
+              <a:extLst>
+                <a:ext uri="{FF2B5EF4-FFF2-40B4-BE49-F238E27FC236}">
+                  <a16:creationId xmlns:a16="http://schemas.microsoft.com/office/drawing/2014/main" id="{7409D990-F4B6-9086-99E3-C24DA5C69B52}"/>
+                </a:ext>
+              </a:extLst>
+            </p:cNvPr>
+            <p:cNvPicPr>
+              <a:picLocks noChangeAspect="1"/>
+            </p:cNvPicPr>
+            <p:nvPr/>
+          </p:nvPicPr>
+          <p:blipFill>
+            <a:blip r:embed="rId4"/>
+            <a:stretch>
+              <a:fillRect/>
+            </a:stretch>
+          </p:blipFill>
+          <p:spPr>
+            <a:xfrm>
+              <a:off x="9278490" y="1833693"/>
+              <a:ext cx="1162212" cy="1086002"/>
+            </a:xfrm>
+            <a:prstGeom prst="rect">
+              <a:avLst/>
+            </a:prstGeom>
+          </p:spPr>
+        </p:pic>
+      </p:grpSp>
     </p:spTree>
     <p:extLst>
       <p:ext uri="{BB962C8B-B14F-4D97-AF65-F5344CB8AC3E}">

</xml_diff>